<commit_message>
moving Insertion Sort into les03, + refactoring
</commit_message>
<xml_diff>
--- a/docs/slides/03/03_analysis_sort.pptx
+++ b/docs/slides/03/03_analysis_sort.pptx
@@ -5,7 +5,7 @@
     <p:sldMasterId id="2147483648" r:id="rId1"/>
   </p:sldMasterIdLst>
   <p:notesMasterIdLst>
-    <p:notesMasterId r:id="rId48"/>
+    <p:notesMasterId r:id="rId51"/>
   </p:notesMasterIdLst>
   <p:sldIdLst>
     <p:sldId id="283" r:id="rId2"/>
@@ -49,11 +49,14 @@
     <p:sldId id="299" r:id="rId40"/>
     <p:sldId id="300" r:id="rId41"/>
     <p:sldId id="301" r:id="rId42"/>
-    <p:sldId id="302" r:id="rId43"/>
-    <p:sldId id="303" r:id="rId44"/>
-    <p:sldId id="304" r:id="rId45"/>
-    <p:sldId id="305" r:id="rId46"/>
-    <p:sldId id="284" r:id="rId47"/>
+    <p:sldId id="307" r:id="rId43"/>
+    <p:sldId id="302" r:id="rId44"/>
+    <p:sldId id="303" r:id="rId45"/>
+    <p:sldId id="304" r:id="rId46"/>
+    <p:sldId id="305" r:id="rId47"/>
+    <p:sldId id="308" r:id="rId48"/>
+    <p:sldId id="309" r:id="rId49"/>
+    <p:sldId id="284" r:id="rId50"/>
   </p:sldIdLst>
   <p:sldSz cx="13004800" cy="9753600"/>
   <p:notesSz cx="6858000" cy="9144000"/>
@@ -2323,7 +2326,7 @@
           </a:ln>
           <a:extLst>
             <a:ext uri="{C572A759-6A51-4108-AA02-DFA0A04FC94B}">
-              <ma14:wrappingTextBoxFlag xmlns:ma14="http://schemas.microsoft.com/office/mac/drawingml/2011/main" xmlns="" val="1"/>
+              <ma14:wrappingTextBoxFlag xmlns="" xmlns:ma14="http://schemas.microsoft.com/office/mac/drawingml/2011/main" val="1"/>
             </a:ext>
           </a:extLst>
         </p:spPr>
@@ -2362,7 +2365,7 @@
           </a:ln>
           <a:extLst>
             <a:ext uri="{C572A759-6A51-4108-AA02-DFA0A04FC94B}">
-              <ma14:wrappingTextBoxFlag xmlns:ma14="http://schemas.microsoft.com/office/mac/drawingml/2011/main" xmlns="" val="1"/>
+              <ma14:wrappingTextBoxFlag xmlns="" xmlns:ma14="http://schemas.microsoft.com/office/mac/drawingml/2011/main" val="1"/>
             </a:ext>
           </a:extLst>
         </p:spPr>
@@ -3345,15 +3348,7 @@
             <a:pPr algn="r"/>
             <a:r>
               <a:rPr lang="en-US" dirty="0" smtClean="0"/>
-              <a:t>Prof</a:t>
-            </a:r>
-            <a:r>
-              <a:rPr lang="en-US" dirty="0" smtClean="0"/>
-              <a:t>. </a:t>
-            </a:r>
-            <a:r>
-              <a:rPr lang="en-US" dirty="0" smtClean="0"/>
-              <a:t>Andrea Arcuri</a:t>
+              <a:t>Prof. Andrea Arcuri</a:t>
             </a:r>
             <a:endParaRPr lang="en-US" dirty="0"/>
           </a:p>
@@ -7854,7 +7849,7 @@
               </a:ln>
               <a:extLst>
                 <a:ext uri="{C572A759-6A51-4108-AA02-DFA0A04FC94B}">
-                  <ma14:wrappingTextBoxFlag xmlns:ma14="http://schemas.microsoft.com/office/mac/drawingml/2011/main" xmlns="" val="1"/>
+                  <ma14:wrappingTextBoxFlag xmlns="" xmlns:ma14="http://schemas.microsoft.com/office/mac/drawingml/2011/main" val="1"/>
                 </a:ext>
               </a:extLst>
             </p:spPr>
@@ -20137,18 +20132,26 @@
           </a:xfrm>
         </p:spPr>
         <p:txBody>
-          <a:bodyPr/>
+          <a:bodyPr>
+            <a:normAutofit fontScale="85000" lnSpcReduction="20000"/>
+          </a:bodyPr>
           <a:lstStyle/>
           <a:p>
             <a:r>
               <a:rPr lang="en-US" dirty="0" smtClean="0"/>
-              <a:t>Sorting is a very common operations in programming</a:t>
-            </a:r>
-          </a:p>
-          <a:p>
+              <a:t>Many </a:t>
+            </a:r>
             <a:r>
               <a:rPr lang="en-US" dirty="0" smtClean="0"/>
-              <a:t>Many different algorithms, with different properties</a:t>
+              <a:t>different </a:t>
+            </a:r>
+            <a:r>
+              <a:rPr lang="en-US" dirty="0" smtClean="0"/>
+              <a:t>sorting algorithms</a:t>
+            </a:r>
+            <a:r>
+              <a:rPr lang="en-US" dirty="0" smtClean="0"/>
+              <a:t>, with different properties</a:t>
             </a:r>
           </a:p>
           <a:p>
@@ -20207,7 +20210,48 @@
           <a:p>
             <a:r>
               <a:rPr lang="en-US" dirty="0" smtClean="0"/>
-              <a:t>Sorting algorithms are good examples for runtime analysis</a:t>
+              <a:t>Most </a:t>
+            </a:r>
+            <a:r>
+              <a:rPr lang="en-US" dirty="0"/>
+              <a:t>language APIs provides good defaults</a:t>
+            </a:r>
+          </a:p>
+          <a:p>
+            <a:pPr lvl="1"/>
+            <a:r>
+              <a:rPr lang="en-US" dirty="0"/>
+              <a:t>Unless very large data, default will be fine 99% of the cases</a:t>
+            </a:r>
+          </a:p>
+          <a:p>
+            <a:r>
+              <a:rPr lang="en-US" dirty="0"/>
+              <a:t>Sorting is very popular in programming</a:t>
+            </a:r>
+          </a:p>
+          <a:p>
+            <a:pPr lvl="1"/>
+            <a:r>
+              <a:rPr lang="en-US" dirty="0"/>
+              <a:t>Important to understand how it works under the hood</a:t>
+            </a:r>
+          </a:p>
+          <a:p>
+            <a:r>
+              <a:rPr lang="en-US" dirty="0"/>
+              <a:t>Tractable mathematically</a:t>
+            </a:r>
+          </a:p>
+          <a:p>
+            <a:pPr lvl="1"/>
+            <a:r>
+              <a:rPr lang="en-US" dirty="0"/>
+              <a:t>So good example to show how to analyze </a:t>
+            </a:r>
+            <a:r>
+              <a:rPr lang="en-US" dirty="0" smtClean="0"/>
+              <a:t>algorithms</a:t>
             </a:r>
             <a:endParaRPr lang="en-US" dirty="0"/>
           </a:p>
@@ -20268,6 +20312,149 @@
           <a:p>
             <a:r>
               <a:rPr lang="en-US" dirty="0" smtClean="0"/>
+              <a:t>Sorting Algorithms</a:t>
+            </a:r>
+            <a:endParaRPr lang="en-US" dirty="0"/>
+          </a:p>
+        </p:txBody>
+      </p:sp>
+      <p:sp>
+        <p:nvSpPr>
+          <p:cNvPr id="3" name="Text Placeholder 2"/>
+          <p:cNvSpPr>
+            <a:spLocks noGrp="1"/>
+          </p:cNvSpPr>
+          <p:nvPr>
+            <p:ph type="body" idx="1"/>
+          </p:nvPr>
+        </p:nvSpPr>
+        <p:spPr/>
+        <p:txBody>
+          <a:bodyPr>
+            <a:normAutofit fontScale="92500" lnSpcReduction="20000"/>
+          </a:bodyPr>
+          <a:lstStyle/>
+          <a:p>
+            <a:r>
+              <a:rPr lang="en-US" b="1" dirty="0" smtClean="0"/>
+              <a:t>Bubble Sort</a:t>
+            </a:r>
+          </a:p>
+          <a:p>
+            <a:r>
+              <a:rPr lang="en-US" b="1" dirty="0" smtClean="0"/>
+              <a:t>Insertion </a:t>
+            </a:r>
+            <a:r>
+              <a:rPr lang="en-US" b="1" dirty="0" smtClean="0"/>
+              <a:t>Sort</a:t>
+            </a:r>
+          </a:p>
+          <a:p>
+            <a:r>
+              <a:rPr lang="en-US" b="1" dirty="0" smtClean="0"/>
+              <a:t>Merge </a:t>
+            </a:r>
+            <a:r>
+              <a:rPr lang="en-US" b="1" dirty="0" smtClean="0"/>
+              <a:t>Sort</a:t>
+            </a:r>
+            <a:r>
+              <a:rPr lang="en-US" dirty="0" smtClean="0"/>
+              <a:t> (next class)</a:t>
+            </a:r>
+            <a:endParaRPr lang="en-US" dirty="0" smtClean="0"/>
+          </a:p>
+          <a:p>
+            <a:r>
+              <a:rPr lang="en-US" b="1" dirty="0" smtClean="0"/>
+              <a:t>Quick </a:t>
+            </a:r>
+            <a:r>
+              <a:rPr lang="en-US" b="1" dirty="0"/>
+              <a:t>Sort </a:t>
+            </a:r>
+            <a:r>
+              <a:rPr lang="en-US" dirty="0"/>
+              <a:t>(next class)</a:t>
+            </a:r>
+            <a:endParaRPr lang="en-US" dirty="0" smtClean="0"/>
+          </a:p>
+          <a:p>
+            <a:r>
+              <a:rPr lang="en-US" dirty="0" smtClean="0"/>
+              <a:t>There are more, but those are the most famous that you need to know </a:t>
+            </a:r>
+            <a:endParaRPr lang="en-US" dirty="0" smtClean="0"/>
+          </a:p>
+          <a:p>
+            <a:r>
+              <a:rPr lang="en-US" dirty="0" smtClean="0"/>
+              <a:t>Good </a:t>
+            </a:r>
+            <a:r>
+              <a:rPr lang="en-US" dirty="0" smtClean="0"/>
+              <a:t>way to see a problem been solved in many different ways</a:t>
+            </a:r>
+            <a:endParaRPr lang="en-US" dirty="0"/>
+          </a:p>
+        </p:txBody>
+      </p:sp>
+    </p:spTree>
+    <p:extLst>
+      <p:ext uri="{BB962C8B-B14F-4D97-AF65-F5344CB8AC3E}">
+        <p14:creationId xmlns:p14="http://schemas.microsoft.com/office/powerpoint/2010/main" val="859377593"/>
+      </p:ext>
+    </p:extLst>
+  </p:cSld>
+  <p:clrMapOvr>
+    <a:masterClrMapping/>
+  </p:clrMapOvr>
+  <p:transition spd="med"/>
+  <p:timing>
+    <p:tnLst>
+      <p:par>
+        <p:cTn id="1" dur="indefinite" restart="never" nodeType="tmRoot"/>
+      </p:par>
+    </p:tnLst>
+  </p:timing>
+</p:sld>
+</file>
+
+<file path=ppt/slides/slide43.xml><?xml version="1.0" encoding="utf-8"?>
+<p:sld xmlns:a="http://schemas.openxmlformats.org/drawingml/2006/main" xmlns:r="http://schemas.openxmlformats.org/officeDocument/2006/relationships" xmlns:p="http://schemas.openxmlformats.org/presentationml/2006/main">
+  <p:cSld>
+    <p:spTree>
+      <p:nvGrpSpPr>
+        <p:cNvPr id="1" name=""/>
+        <p:cNvGrpSpPr/>
+        <p:nvPr/>
+      </p:nvGrpSpPr>
+      <p:grpSpPr>
+        <a:xfrm>
+          <a:off x="0" y="0"/>
+          <a:ext cx="0" cy="0"/>
+          <a:chOff x="0" y="0"/>
+          <a:chExt cx="0" cy="0"/>
+        </a:xfrm>
+      </p:grpSpPr>
+      <p:sp>
+        <p:nvSpPr>
+          <p:cNvPr id="2" name="Title 1"/>
+          <p:cNvSpPr>
+            <a:spLocks noGrp="1"/>
+          </p:cNvSpPr>
+          <p:nvPr>
+            <p:ph type="title"/>
+          </p:nvPr>
+        </p:nvSpPr>
+        <p:spPr/>
+        <p:txBody>
+          <a:bodyPr/>
+          <a:lstStyle/>
+          <a:p>
+            <a:r>
+              <a:rPr lang="en-US" dirty="0" smtClean="0"/>
               <a:t>Bubble Sort</a:t>
             </a:r>
             <a:endParaRPr lang="en-US" dirty="0"/>
@@ -20340,7 +20527,7 @@
 </p:sld>
 </file>
 
-<file path=ppt/slides/slide43.xml><?xml version="1.0" encoding="utf-8"?>
+<file path=ppt/slides/slide44.xml><?xml version="1.0" encoding="utf-8"?>
 <p:sld xmlns:a="http://schemas.openxmlformats.org/drawingml/2006/main" xmlns:r="http://schemas.openxmlformats.org/officeDocument/2006/relationships" xmlns:p="http://schemas.openxmlformats.org/presentationml/2006/main">
   <p:cSld>
     <p:spTree>
@@ -21544,7 +21731,7 @@
 </p:sld>
 </file>
 
-<file path=ppt/slides/slide44.xml><?xml version="1.0" encoding="utf-8"?>
+<file path=ppt/slides/slide45.xml><?xml version="1.0" encoding="utf-8"?>
 <p:sld xmlns:a="http://schemas.openxmlformats.org/drawingml/2006/main" xmlns:r="http://schemas.openxmlformats.org/officeDocument/2006/relationships" xmlns:p="http://schemas.openxmlformats.org/presentationml/2006/main">
   <p:cSld>
     <p:spTree>
@@ -22375,7 +22562,7 @@
 </p:sld>
 </file>
 
-<file path=ppt/slides/slide45.xml><?xml version="1.0" encoding="utf-8"?>
+<file path=ppt/slides/slide46.xml><?xml version="1.0" encoding="utf-8"?>
 <p:sld xmlns:a="http://schemas.openxmlformats.org/drawingml/2006/main" xmlns:r="http://schemas.openxmlformats.org/officeDocument/2006/relationships" xmlns:p="http://schemas.openxmlformats.org/presentationml/2006/main">
   <p:cSld>
     <p:spTree>
@@ -22614,7 +22801,4382 @@
 </p:sld>
 </file>
 
-<file path=ppt/slides/slide46.xml><?xml version="1.0" encoding="utf-8"?>
+<file path=ppt/slides/slide47.xml><?xml version="1.0" encoding="utf-8"?>
+<p:sld xmlns:a="http://schemas.openxmlformats.org/drawingml/2006/main" xmlns:r="http://schemas.openxmlformats.org/officeDocument/2006/relationships" xmlns:p="http://schemas.openxmlformats.org/presentationml/2006/main">
+  <p:cSld>
+    <p:spTree>
+      <p:nvGrpSpPr>
+        <p:cNvPr id="1" name=""/>
+        <p:cNvGrpSpPr/>
+        <p:nvPr/>
+      </p:nvGrpSpPr>
+      <p:grpSpPr>
+        <a:xfrm>
+          <a:off x="0" y="0"/>
+          <a:ext cx="0" cy="0"/>
+          <a:chOff x="0" y="0"/>
+          <a:chExt cx="0" cy="0"/>
+        </a:xfrm>
+      </p:grpSpPr>
+      <p:sp>
+        <p:nvSpPr>
+          <p:cNvPr id="2" name="Title 1"/>
+          <p:cNvSpPr>
+            <a:spLocks noGrp="1"/>
+          </p:cNvSpPr>
+          <p:nvPr>
+            <p:ph type="title"/>
+          </p:nvPr>
+        </p:nvSpPr>
+        <p:spPr/>
+        <p:txBody>
+          <a:bodyPr/>
+          <a:lstStyle/>
+          <a:p>
+            <a:r>
+              <a:rPr lang="en-US" dirty="0" smtClean="0"/>
+              <a:t>Insertion Sort</a:t>
+            </a:r>
+            <a:endParaRPr lang="en-US" dirty="0"/>
+          </a:p>
+        </p:txBody>
+      </p:sp>
+      <p:sp>
+        <p:nvSpPr>
+          <p:cNvPr id="3" name="Text Placeholder 2"/>
+          <p:cNvSpPr>
+            <a:spLocks noGrp="1"/>
+          </p:cNvSpPr>
+          <p:nvPr>
+            <p:ph type="body" idx="1"/>
+          </p:nvPr>
+        </p:nvSpPr>
+        <p:spPr>
+          <a:xfrm>
+            <a:off x="320904" y="2595775"/>
+            <a:ext cx="6570090" cy="6286500"/>
+          </a:xfrm>
+        </p:spPr>
+        <p:txBody>
+          <a:bodyPr/>
+          <a:lstStyle/>
+          <a:p>
+            <a:r>
+              <a:rPr lang="en-US" dirty="0" smtClean="0"/>
+              <a:t>An array of size 0 or 1 is always considered sorted</a:t>
+            </a:r>
+          </a:p>
+          <a:p>
+            <a:r>
+              <a:rPr lang="en-US" dirty="0" smtClean="0"/>
+              <a:t>From left to right, till length N</a:t>
+            </a:r>
+          </a:p>
+          <a:p>
+            <a:r>
+              <a:rPr lang="en-US" dirty="0" smtClean="0"/>
+              <a:t>K-leftmost values are sorted</a:t>
+            </a:r>
+          </a:p>
+          <a:p>
+            <a:r>
+              <a:rPr lang="en-US" dirty="0" smtClean="0"/>
+              <a:t>Position K+1 is not sorted, insert it in the first K</a:t>
+            </a:r>
+          </a:p>
+          <a:p>
+            <a:pPr lvl="1"/>
+            <a:r>
+              <a:rPr lang="en-US" dirty="0"/>
+              <a:t>b</a:t>
+            </a:r>
+            <a:r>
+              <a:rPr lang="en-US" dirty="0" smtClean="0"/>
+              <a:t>y swapping adjacent elements, like in Bubble Sort</a:t>
+            </a:r>
+            <a:endParaRPr lang="en-US" dirty="0"/>
+          </a:p>
+        </p:txBody>
+      </p:sp>
+      <p:graphicFrame>
+        <p:nvGraphicFramePr>
+          <p:cNvPr id="4" name="Table 3"/>
+          <p:cNvGraphicFramePr>
+            <a:graphicFrameLocks noGrp="1"/>
+          </p:cNvGraphicFramePr>
+          <p:nvPr>
+            <p:extLst/>
+          </p:nvPr>
+        </p:nvGraphicFramePr>
+        <p:xfrm>
+          <a:off x="7227842" y="2906930"/>
+          <a:ext cx="4150782" cy="370840"/>
+        </p:xfrm>
+        <a:graphic>
+          <a:graphicData uri="http://schemas.openxmlformats.org/drawingml/2006/table">
+            <a:tbl>
+              <a:tblPr firstRow="1" bandRow="1">
+                <a:tableStyleId>{5940675A-B579-460E-94D1-54222C63F5DA}</a:tableStyleId>
+              </a:tblPr>
+              <a:tblGrid>
+                <a:gridCol w="691797">
+                  <a:extLst>
+                    <a:ext uri="{9D8B030D-6E8A-4147-A177-3AD203B41FA5}">
+                      <a16:colId xmlns:a16="http://schemas.microsoft.com/office/drawing/2014/main" val="1527688708"/>
+                    </a:ext>
+                  </a:extLst>
+                </a:gridCol>
+                <a:gridCol w="691797">
+                  <a:extLst>
+                    <a:ext uri="{9D8B030D-6E8A-4147-A177-3AD203B41FA5}">
+                      <a16:colId xmlns:a16="http://schemas.microsoft.com/office/drawing/2014/main" val="653538617"/>
+                    </a:ext>
+                  </a:extLst>
+                </a:gridCol>
+                <a:gridCol w="691797">
+                  <a:extLst>
+                    <a:ext uri="{9D8B030D-6E8A-4147-A177-3AD203B41FA5}">
+                      <a16:colId xmlns:a16="http://schemas.microsoft.com/office/drawing/2014/main" val="2554237578"/>
+                    </a:ext>
+                  </a:extLst>
+                </a:gridCol>
+                <a:gridCol w="691797">
+                  <a:extLst>
+                    <a:ext uri="{9D8B030D-6E8A-4147-A177-3AD203B41FA5}">
+                      <a16:colId xmlns:a16="http://schemas.microsoft.com/office/drawing/2014/main" val="2946659525"/>
+                    </a:ext>
+                  </a:extLst>
+                </a:gridCol>
+                <a:gridCol w="691797">
+                  <a:extLst>
+                    <a:ext uri="{9D8B030D-6E8A-4147-A177-3AD203B41FA5}">
+                      <a16:colId xmlns:a16="http://schemas.microsoft.com/office/drawing/2014/main" val="2043106262"/>
+                    </a:ext>
+                  </a:extLst>
+                </a:gridCol>
+                <a:gridCol w="691797">
+                  <a:extLst>
+                    <a:ext uri="{9D8B030D-6E8A-4147-A177-3AD203B41FA5}">
+                      <a16:colId xmlns:a16="http://schemas.microsoft.com/office/drawing/2014/main" val="3337530176"/>
+                    </a:ext>
+                  </a:extLst>
+                </a:gridCol>
+              </a:tblGrid>
+              <a:tr h="370840">
+                <a:tc>
+                  <a:txBody>
+                    <a:bodyPr/>
+                    <a:lstStyle/>
+                    <a:p>
+                      <a:r>
+                        <a:rPr lang="en-US" dirty="0" smtClean="0"/>
+                        <a:t>4</a:t>
+                      </a:r>
+                      <a:endParaRPr lang="en-US" dirty="0"/>
+                    </a:p>
+                  </a:txBody>
+                  <a:tcPr>
+                    <a:noFill/>
+                  </a:tcPr>
+                </a:tc>
+                <a:tc>
+                  <a:txBody>
+                    <a:bodyPr/>
+                    <a:lstStyle/>
+                    <a:p>
+                      <a:r>
+                        <a:rPr lang="en-US" dirty="0" smtClean="0"/>
+                        <a:t>5</a:t>
+                      </a:r>
+                      <a:endParaRPr lang="en-US" dirty="0"/>
+                    </a:p>
+                  </a:txBody>
+                  <a:tcPr>
+                    <a:noFill/>
+                  </a:tcPr>
+                </a:tc>
+                <a:tc>
+                  <a:txBody>
+                    <a:bodyPr/>
+                    <a:lstStyle/>
+                    <a:p>
+                      <a:r>
+                        <a:rPr lang="en-US" dirty="0" smtClean="0"/>
+                        <a:t>1</a:t>
+                      </a:r>
+                      <a:endParaRPr lang="en-US" dirty="0"/>
+                    </a:p>
+                  </a:txBody>
+                  <a:tcPr>
+                    <a:noFill/>
+                  </a:tcPr>
+                </a:tc>
+                <a:tc>
+                  <a:txBody>
+                    <a:bodyPr/>
+                    <a:lstStyle/>
+                    <a:p>
+                      <a:r>
+                        <a:rPr lang="en-US" dirty="0" smtClean="0"/>
+                        <a:t>3</a:t>
+                      </a:r>
+                      <a:endParaRPr lang="en-US" dirty="0"/>
+                    </a:p>
+                  </a:txBody>
+                  <a:tcPr>
+                    <a:noFill/>
+                  </a:tcPr>
+                </a:tc>
+                <a:tc>
+                  <a:txBody>
+                    <a:bodyPr/>
+                    <a:lstStyle/>
+                    <a:p>
+                      <a:r>
+                        <a:rPr lang="en-US" dirty="0" smtClean="0"/>
+                        <a:t>2</a:t>
+                      </a:r>
+                      <a:endParaRPr lang="en-US" dirty="0"/>
+                    </a:p>
+                  </a:txBody>
+                  <a:tcPr>
+                    <a:noFill/>
+                  </a:tcPr>
+                </a:tc>
+                <a:tc>
+                  <a:txBody>
+                    <a:bodyPr/>
+                    <a:lstStyle/>
+                    <a:p>
+                      <a:r>
+                        <a:rPr lang="en-US" dirty="0" smtClean="0"/>
+                        <a:t>6</a:t>
+                      </a:r>
+                      <a:endParaRPr lang="en-US" dirty="0"/>
+                    </a:p>
+                  </a:txBody>
+                  <a:tcPr>
+                    <a:noFill/>
+                  </a:tcPr>
+                </a:tc>
+                <a:extLst>
+                  <a:ext uri="{0D108BD9-81ED-4DB2-BD59-A6C34878D82A}">
+                    <a16:rowId xmlns:a16="http://schemas.microsoft.com/office/drawing/2014/main" val="1945647981"/>
+                  </a:ext>
+                </a:extLst>
+              </a:tr>
+            </a:tbl>
+          </a:graphicData>
+        </a:graphic>
+      </p:graphicFrame>
+      <p:graphicFrame>
+        <p:nvGraphicFramePr>
+          <p:cNvPr id="5" name="Table 4"/>
+          <p:cNvGraphicFramePr>
+            <a:graphicFrameLocks noGrp="1"/>
+          </p:cNvGraphicFramePr>
+          <p:nvPr>
+            <p:extLst/>
+          </p:nvPr>
+        </p:nvGraphicFramePr>
+        <p:xfrm>
+          <a:off x="7227842" y="3952040"/>
+          <a:ext cx="4150782" cy="370840"/>
+        </p:xfrm>
+        <a:graphic>
+          <a:graphicData uri="http://schemas.openxmlformats.org/drawingml/2006/table">
+            <a:tbl>
+              <a:tblPr firstRow="1" bandRow="1">
+                <a:tableStyleId>{5940675A-B579-460E-94D1-54222C63F5DA}</a:tableStyleId>
+              </a:tblPr>
+              <a:tblGrid>
+                <a:gridCol w="691797">
+                  <a:extLst>
+                    <a:ext uri="{9D8B030D-6E8A-4147-A177-3AD203B41FA5}">
+                      <a16:colId xmlns:a16="http://schemas.microsoft.com/office/drawing/2014/main" val="1527688708"/>
+                    </a:ext>
+                  </a:extLst>
+                </a:gridCol>
+                <a:gridCol w="691797">
+                  <a:extLst>
+                    <a:ext uri="{9D8B030D-6E8A-4147-A177-3AD203B41FA5}">
+                      <a16:colId xmlns:a16="http://schemas.microsoft.com/office/drawing/2014/main" val="653538617"/>
+                    </a:ext>
+                  </a:extLst>
+                </a:gridCol>
+                <a:gridCol w="691797">
+                  <a:extLst>
+                    <a:ext uri="{9D8B030D-6E8A-4147-A177-3AD203B41FA5}">
+                      <a16:colId xmlns:a16="http://schemas.microsoft.com/office/drawing/2014/main" val="2554237578"/>
+                    </a:ext>
+                  </a:extLst>
+                </a:gridCol>
+                <a:gridCol w="691797">
+                  <a:extLst>
+                    <a:ext uri="{9D8B030D-6E8A-4147-A177-3AD203B41FA5}">
+                      <a16:colId xmlns:a16="http://schemas.microsoft.com/office/drawing/2014/main" val="2946659525"/>
+                    </a:ext>
+                  </a:extLst>
+                </a:gridCol>
+                <a:gridCol w="691797">
+                  <a:extLst>
+                    <a:ext uri="{9D8B030D-6E8A-4147-A177-3AD203B41FA5}">
+                      <a16:colId xmlns:a16="http://schemas.microsoft.com/office/drawing/2014/main" val="2043106262"/>
+                    </a:ext>
+                  </a:extLst>
+                </a:gridCol>
+                <a:gridCol w="691797">
+                  <a:extLst>
+                    <a:ext uri="{9D8B030D-6E8A-4147-A177-3AD203B41FA5}">
+                      <a16:colId xmlns:a16="http://schemas.microsoft.com/office/drawing/2014/main" val="3337530176"/>
+                    </a:ext>
+                  </a:extLst>
+                </a:gridCol>
+              </a:tblGrid>
+              <a:tr h="370840">
+                <a:tc>
+                  <a:txBody>
+                    <a:bodyPr/>
+                    <a:lstStyle/>
+                    <a:p>
+                      <a:r>
+                        <a:rPr lang="en-US" dirty="0" smtClean="0"/>
+                        <a:t>4</a:t>
+                      </a:r>
+                      <a:endParaRPr lang="en-US" dirty="0"/>
+                    </a:p>
+                  </a:txBody>
+                  <a:tcPr>
+                    <a:solidFill>
+                      <a:schemeClr val="accent1">
+                        <a:lumMod val="60000"/>
+                        <a:lumOff val="40000"/>
+                      </a:schemeClr>
+                    </a:solidFill>
+                  </a:tcPr>
+                </a:tc>
+                <a:tc>
+                  <a:txBody>
+                    <a:bodyPr/>
+                    <a:lstStyle/>
+                    <a:p>
+                      <a:r>
+                        <a:rPr lang="en-US" dirty="0" smtClean="0"/>
+                        <a:t>5</a:t>
+                      </a:r>
+                      <a:endParaRPr lang="en-US" dirty="0"/>
+                    </a:p>
+                  </a:txBody>
+                  <a:tcPr>
+                    <a:noFill/>
+                  </a:tcPr>
+                </a:tc>
+                <a:tc>
+                  <a:txBody>
+                    <a:bodyPr/>
+                    <a:lstStyle/>
+                    <a:p>
+                      <a:r>
+                        <a:rPr lang="en-US" dirty="0" smtClean="0"/>
+                        <a:t>1</a:t>
+                      </a:r>
+                      <a:endParaRPr lang="en-US" dirty="0"/>
+                    </a:p>
+                  </a:txBody>
+                  <a:tcPr>
+                    <a:noFill/>
+                  </a:tcPr>
+                </a:tc>
+                <a:tc>
+                  <a:txBody>
+                    <a:bodyPr/>
+                    <a:lstStyle/>
+                    <a:p>
+                      <a:r>
+                        <a:rPr lang="en-US" dirty="0" smtClean="0"/>
+                        <a:t>3</a:t>
+                      </a:r>
+                      <a:endParaRPr lang="en-US" dirty="0"/>
+                    </a:p>
+                  </a:txBody>
+                  <a:tcPr>
+                    <a:noFill/>
+                  </a:tcPr>
+                </a:tc>
+                <a:tc>
+                  <a:txBody>
+                    <a:bodyPr/>
+                    <a:lstStyle/>
+                    <a:p>
+                      <a:r>
+                        <a:rPr lang="en-US" dirty="0" smtClean="0"/>
+                        <a:t>2</a:t>
+                      </a:r>
+                      <a:endParaRPr lang="en-US" dirty="0"/>
+                    </a:p>
+                  </a:txBody>
+                  <a:tcPr>
+                    <a:noFill/>
+                  </a:tcPr>
+                </a:tc>
+                <a:tc>
+                  <a:txBody>
+                    <a:bodyPr/>
+                    <a:lstStyle/>
+                    <a:p>
+                      <a:r>
+                        <a:rPr lang="en-US" dirty="0" smtClean="0"/>
+                        <a:t>6</a:t>
+                      </a:r>
+                      <a:endParaRPr lang="en-US" dirty="0"/>
+                    </a:p>
+                  </a:txBody>
+                  <a:tcPr>
+                    <a:noFill/>
+                  </a:tcPr>
+                </a:tc>
+                <a:extLst>
+                  <a:ext uri="{0D108BD9-81ED-4DB2-BD59-A6C34878D82A}">
+                    <a16:rowId xmlns:a16="http://schemas.microsoft.com/office/drawing/2014/main" val="1945647981"/>
+                  </a:ext>
+                </a:extLst>
+              </a:tr>
+            </a:tbl>
+          </a:graphicData>
+        </a:graphic>
+      </p:graphicFrame>
+      <p:graphicFrame>
+        <p:nvGraphicFramePr>
+          <p:cNvPr id="6" name="Table 5"/>
+          <p:cNvGraphicFramePr>
+            <a:graphicFrameLocks noGrp="1"/>
+          </p:cNvGraphicFramePr>
+          <p:nvPr>
+            <p:extLst/>
+          </p:nvPr>
+        </p:nvGraphicFramePr>
+        <p:xfrm>
+          <a:off x="7227842" y="4997150"/>
+          <a:ext cx="4150782" cy="370840"/>
+        </p:xfrm>
+        <a:graphic>
+          <a:graphicData uri="http://schemas.openxmlformats.org/drawingml/2006/table">
+            <a:tbl>
+              <a:tblPr firstRow="1" bandRow="1">
+                <a:tableStyleId>{5940675A-B579-460E-94D1-54222C63F5DA}</a:tableStyleId>
+              </a:tblPr>
+              <a:tblGrid>
+                <a:gridCol w="691797">
+                  <a:extLst>
+                    <a:ext uri="{9D8B030D-6E8A-4147-A177-3AD203B41FA5}">
+                      <a16:colId xmlns:a16="http://schemas.microsoft.com/office/drawing/2014/main" val="1527688708"/>
+                    </a:ext>
+                  </a:extLst>
+                </a:gridCol>
+                <a:gridCol w="691797">
+                  <a:extLst>
+                    <a:ext uri="{9D8B030D-6E8A-4147-A177-3AD203B41FA5}">
+                      <a16:colId xmlns:a16="http://schemas.microsoft.com/office/drawing/2014/main" val="653538617"/>
+                    </a:ext>
+                  </a:extLst>
+                </a:gridCol>
+                <a:gridCol w="691797">
+                  <a:extLst>
+                    <a:ext uri="{9D8B030D-6E8A-4147-A177-3AD203B41FA5}">
+                      <a16:colId xmlns:a16="http://schemas.microsoft.com/office/drawing/2014/main" val="2554237578"/>
+                    </a:ext>
+                  </a:extLst>
+                </a:gridCol>
+                <a:gridCol w="691797">
+                  <a:extLst>
+                    <a:ext uri="{9D8B030D-6E8A-4147-A177-3AD203B41FA5}">
+                      <a16:colId xmlns:a16="http://schemas.microsoft.com/office/drawing/2014/main" val="2946659525"/>
+                    </a:ext>
+                  </a:extLst>
+                </a:gridCol>
+                <a:gridCol w="691797">
+                  <a:extLst>
+                    <a:ext uri="{9D8B030D-6E8A-4147-A177-3AD203B41FA5}">
+                      <a16:colId xmlns:a16="http://schemas.microsoft.com/office/drawing/2014/main" val="2043106262"/>
+                    </a:ext>
+                  </a:extLst>
+                </a:gridCol>
+                <a:gridCol w="691797">
+                  <a:extLst>
+                    <a:ext uri="{9D8B030D-6E8A-4147-A177-3AD203B41FA5}">
+                      <a16:colId xmlns:a16="http://schemas.microsoft.com/office/drawing/2014/main" val="3337530176"/>
+                    </a:ext>
+                  </a:extLst>
+                </a:gridCol>
+              </a:tblGrid>
+              <a:tr h="370840">
+                <a:tc>
+                  <a:txBody>
+                    <a:bodyPr/>
+                    <a:lstStyle/>
+                    <a:p>
+                      <a:r>
+                        <a:rPr lang="en-US" dirty="0" smtClean="0"/>
+                        <a:t>4</a:t>
+                      </a:r>
+                      <a:endParaRPr lang="en-US" dirty="0"/>
+                    </a:p>
+                  </a:txBody>
+                  <a:tcPr>
+                    <a:solidFill>
+                      <a:schemeClr val="accent1">
+                        <a:lumMod val="60000"/>
+                        <a:lumOff val="40000"/>
+                      </a:schemeClr>
+                    </a:solidFill>
+                  </a:tcPr>
+                </a:tc>
+                <a:tc>
+                  <a:txBody>
+                    <a:bodyPr/>
+                    <a:lstStyle/>
+                    <a:p>
+                      <a:r>
+                        <a:rPr lang="en-US" dirty="0" smtClean="0"/>
+                        <a:t>5</a:t>
+                      </a:r>
+                      <a:endParaRPr lang="en-US" dirty="0"/>
+                    </a:p>
+                  </a:txBody>
+                  <a:tcPr>
+                    <a:solidFill>
+                      <a:schemeClr val="accent1">
+                        <a:lumMod val="60000"/>
+                        <a:lumOff val="40000"/>
+                      </a:schemeClr>
+                    </a:solidFill>
+                  </a:tcPr>
+                </a:tc>
+                <a:tc>
+                  <a:txBody>
+                    <a:bodyPr/>
+                    <a:lstStyle/>
+                    <a:p>
+                      <a:r>
+                        <a:rPr lang="en-US" dirty="0" smtClean="0"/>
+                        <a:t>1</a:t>
+                      </a:r>
+                      <a:endParaRPr lang="en-US" dirty="0"/>
+                    </a:p>
+                  </a:txBody>
+                  <a:tcPr>
+                    <a:noFill/>
+                  </a:tcPr>
+                </a:tc>
+                <a:tc>
+                  <a:txBody>
+                    <a:bodyPr/>
+                    <a:lstStyle/>
+                    <a:p>
+                      <a:r>
+                        <a:rPr lang="en-US" dirty="0" smtClean="0"/>
+                        <a:t>3</a:t>
+                      </a:r>
+                      <a:endParaRPr lang="en-US" dirty="0"/>
+                    </a:p>
+                  </a:txBody>
+                  <a:tcPr>
+                    <a:noFill/>
+                  </a:tcPr>
+                </a:tc>
+                <a:tc>
+                  <a:txBody>
+                    <a:bodyPr/>
+                    <a:lstStyle/>
+                    <a:p>
+                      <a:r>
+                        <a:rPr lang="en-US" dirty="0" smtClean="0"/>
+                        <a:t>2</a:t>
+                      </a:r>
+                      <a:endParaRPr lang="en-US" dirty="0"/>
+                    </a:p>
+                  </a:txBody>
+                  <a:tcPr>
+                    <a:noFill/>
+                  </a:tcPr>
+                </a:tc>
+                <a:tc>
+                  <a:txBody>
+                    <a:bodyPr/>
+                    <a:lstStyle/>
+                    <a:p>
+                      <a:r>
+                        <a:rPr lang="en-US" dirty="0" smtClean="0"/>
+                        <a:t>6</a:t>
+                      </a:r>
+                      <a:endParaRPr lang="en-US" dirty="0"/>
+                    </a:p>
+                  </a:txBody>
+                  <a:tcPr>
+                    <a:noFill/>
+                  </a:tcPr>
+                </a:tc>
+                <a:extLst>
+                  <a:ext uri="{0D108BD9-81ED-4DB2-BD59-A6C34878D82A}">
+                    <a16:rowId xmlns:a16="http://schemas.microsoft.com/office/drawing/2014/main" val="1945647981"/>
+                  </a:ext>
+                </a:extLst>
+              </a:tr>
+            </a:tbl>
+          </a:graphicData>
+        </a:graphic>
+      </p:graphicFrame>
+      <p:graphicFrame>
+        <p:nvGraphicFramePr>
+          <p:cNvPr id="7" name="Table 6"/>
+          <p:cNvGraphicFramePr>
+            <a:graphicFrameLocks noGrp="1"/>
+          </p:cNvGraphicFramePr>
+          <p:nvPr>
+            <p:extLst/>
+          </p:nvPr>
+        </p:nvGraphicFramePr>
+        <p:xfrm>
+          <a:off x="7227842" y="6042260"/>
+          <a:ext cx="4150782" cy="370840"/>
+        </p:xfrm>
+        <a:graphic>
+          <a:graphicData uri="http://schemas.openxmlformats.org/drawingml/2006/table">
+            <a:tbl>
+              <a:tblPr firstRow="1" bandRow="1">
+                <a:tableStyleId>{5940675A-B579-460E-94D1-54222C63F5DA}</a:tableStyleId>
+              </a:tblPr>
+              <a:tblGrid>
+                <a:gridCol w="691797">
+                  <a:extLst>
+                    <a:ext uri="{9D8B030D-6E8A-4147-A177-3AD203B41FA5}">
+                      <a16:colId xmlns:a16="http://schemas.microsoft.com/office/drawing/2014/main" val="1527688708"/>
+                    </a:ext>
+                  </a:extLst>
+                </a:gridCol>
+                <a:gridCol w="691797">
+                  <a:extLst>
+                    <a:ext uri="{9D8B030D-6E8A-4147-A177-3AD203B41FA5}">
+                      <a16:colId xmlns:a16="http://schemas.microsoft.com/office/drawing/2014/main" val="653538617"/>
+                    </a:ext>
+                  </a:extLst>
+                </a:gridCol>
+                <a:gridCol w="691797">
+                  <a:extLst>
+                    <a:ext uri="{9D8B030D-6E8A-4147-A177-3AD203B41FA5}">
+                      <a16:colId xmlns:a16="http://schemas.microsoft.com/office/drawing/2014/main" val="2554237578"/>
+                    </a:ext>
+                  </a:extLst>
+                </a:gridCol>
+                <a:gridCol w="691797">
+                  <a:extLst>
+                    <a:ext uri="{9D8B030D-6E8A-4147-A177-3AD203B41FA5}">
+                      <a16:colId xmlns:a16="http://schemas.microsoft.com/office/drawing/2014/main" val="2946659525"/>
+                    </a:ext>
+                  </a:extLst>
+                </a:gridCol>
+                <a:gridCol w="691797">
+                  <a:extLst>
+                    <a:ext uri="{9D8B030D-6E8A-4147-A177-3AD203B41FA5}">
+                      <a16:colId xmlns:a16="http://schemas.microsoft.com/office/drawing/2014/main" val="2043106262"/>
+                    </a:ext>
+                  </a:extLst>
+                </a:gridCol>
+                <a:gridCol w="691797">
+                  <a:extLst>
+                    <a:ext uri="{9D8B030D-6E8A-4147-A177-3AD203B41FA5}">
+                      <a16:colId xmlns:a16="http://schemas.microsoft.com/office/drawing/2014/main" val="3337530176"/>
+                    </a:ext>
+                  </a:extLst>
+                </a:gridCol>
+              </a:tblGrid>
+              <a:tr h="370840">
+                <a:tc>
+                  <a:txBody>
+                    <a:bodyPr/>
+                    <a:lstStyle/>
+                    <a:p>
+                      <a:r>
+                        <a:rPr lang="en-US" dirty="0" smtClean="0"/>
+                        <a:t>4</a:t>
+                      </a:r>
+                      <a:endParaRPr lang="en-US" dirty="0"/>
+                    </a:p>
+                  </a:txBody>
+                  <a:tcPr>
+                    <a:solidFill>
+                      <a:schemeClr val="accent1">
+                        <a:lumMod val="60000"/>
+                        <a:lumOff val="40000"/>
+                      </a:schemeClr>
+                    </a:solidFill>
+                  </a:tcPr>
+                </a:tc>
+                <a:tc>
+                  <a:txBody>
+                    <a:bodyPr/>
+                    <a:lstStyle/>
+                    <a:p>
+                      <a:r>
+                        <a:rPr lang="en-US" dirty="0" smtClean="0"/>
+                        <a:t>5</a:t>
+                      </a:r>
+                      <a:endParaRPr lang="en-US" dirty="0"/>
+                    </a:p>
+                  </a:txBody>
+                  <a:tcPr>
+                    <a:solidFill>
+                      <a:schemeClr val="accent1">
+                        <a:lumMod val="60000"/>
+                        <a:lumOff val="40000"/>
+                      </a:schemeClr>
+                    </a:solidFill>
+                  </a:tcPr>
+                </a:tc>
+                <a:tc>
+                  <a:txBody>
+                    <a:bodyPr/>
+                    <a:lstStyle/>
+                    <a:p>
+                      <a:r>
+                        <a:rPr lang="en-US" dirty="0" smtClean="0"/>
+                        <a:t>1</a:t>
+                      </a:r>
+                      <a:endParaRPr lang="en-US" dirty="0"/>
+                    </a:p>
+                  </a:txBody>
+                  <a:tcPr>
+                    <a:solidFill>
+                      <a:schemeClr val="accent2">
+                        <a:lumMod val="60000"/>
+                        <a:lumOff val="40000"/>
+                      </a:schemeClr>
+                    </a:solidFill>
+                  </a:tcPr>
+                </a:tc>
+                <a:tc>
+                  <a:txBody>
+                    <a:bodyPr/>
+                    <a:lstStyle/>
+                    <a:p>
+                      <a:r>
+                        <a:rPr lang="en-US" dirty="0" smtClean="0"/>
+                        <a:t>3</a:t>
+                      </a:r>
+                      <a:endParaRPr lang="en-US" dirty="0"/>
+                    </a:p>
+                  </a:txBody>
+                  <a:tcPr>
+                    <a:noFill/>
+                  </a:tcPr>
+                </a:tc>
+                <a:tc>
+                  <a:txBody>
+                    <a:bodyPr/>
+                    <a:lstStyle/>
+                    <a:p>
+                      <a:r>
+                        <a:rPr lang="en-US" dirty="0" smtClean="0"/>
+                        <a:t>2</a:t>
+                      </a:r>
+                      <a:endParaRPr lang="en-US" dirty="0"/>
+                    </a:p>
+                  </a:txBody>
+                  <a:tcPr>
+                    <a:noFill/>
+                  </a:tcPr>
+                </a:tc>
+                <a:tc>
+                  <a:txBody>
+                    <a:bodyPr/>
+                    <a:lstStyle/>
+                    <a:p>
+                      <a:r>
+                        <a:rPr lang="en-US" dirty="0" smtClean="0"/>
+                        <a:t>6</a:t>
+                      </a:r>
+                      <a:endParaRPr lang="en-US" dirty="0"/>
+                    </a:p>
+                  </a:txBody>
+                  <a:tcPr>
+                    <a:noFill/>
+                  </a:tcPr>
+                </a:tc>
+                <a:extLst>
+                  <a:ext uri="{0D108BD9-81ED-4DB2-BD59-A6C34878D82A}">
+                    <a16:rowId xmlns:a16="http://schemas.microsoft.com/office/drawing/2014/main" val="1945647981"/>
+                  </a:ext>
+                </a:extLst>
+              </a:tr>
+            </a:tbl>
+          </a:graphicData>
+        </a:graphic>
+      </p:graphicFrame>
+      <p:graphicFrame>
+        <p:nvGraphicFramePr>
+          <p:cNvPr id="8" name="Table 7"/>
+          <p:cNvGraphicFramePr>
+            <a:graphicFrameLocks noGrp="1"/>
+          </p:cNvGraphicFramePr>
+          <p:nvPr>
+            <p:extLst/>
+          </p:nvPr>
+        </p:nvGraphicFramePr>
+        <p:xfrm>
+          <a:off x="7227842" y="7087370"/>
+          <a:ext cx="4150782" cy="370840"/>
+        </p:xfrm>
+        <a:graphic>
+          <a:graphicData uri="http://schemas.openxmlformats.org/drawingml/2006/table">
+            <a:tbl>
+              <a:tblPr firstRow="1" bandRow="1">
+                <a:tableStyleId>{5940675A-B579-460E-94D1-54222C63F5DA}</a:tableStyleId>
+              </a:tblPr>
+              <a:tblGrid>
+                <a:gridCol w="691797">
+                  <a:extLst>
+                    <a:ext uri="{9D8B030D-6E8A-4147-A177-3AD203B41FA5}">
+                      <a16:colId xmlns:a16="http://schemas.microsoft.com/office/drawing/2014/main" val="1527688708"/>
+                    </a:ext>
+                  </a:extLst>
+                </a:gridCol>
+                <a:gridCol w="691797">
+                  <a:extLst>
+                    <a:ext uri="{9D8B030D-6E8A-4147-A177-3AD203B41FA5}">
+                      <a16:colId xmlns:a16="http://schemas.microsoft.com/office/drawing/2014/main" val="653538617"/>
+                    </a:ext>
+                  </a:extLst>
+                </a:gridCol>
+                <a:gridCol w="691797">
+                  <a:extLst>
+                    <a:ext uri="{9D8B030D-6E8A-4147-A177-3AD203B41FA5}">
+                      <a16:colId xmlns:a16="http://schemas.microsoft.com/office/drawing/2014/main" val="2554237578"/>
+                    </a:ext>
+                  </a:extLst>
+                </a:gridCol>
+                <a:gridCol w="691797">
+                  <a:extLst>
+                    <a:ext uri="{9D8B030D-6E8A-4147-A177-3AD203B41FA5}">
+                      <a16:colId xmlns:a16="http://schemas.microsoft.com/office/drawing/2014/main" val="2946659525"/>
+                    </a:ext>
+                  </a:extLst>
+                </a:gridCol>
+                <a:gridCol w="691797">
+                  <a:extLst>
+                    <a:ext uri="{9D8B030D-6E8A-4147-A177-3AD203B41FA5}">
+                      <a16:colId xmlns:a16="http://schemas.microsoft.com/office/drawing/2014/main" val="2043106262"/>
+                    </a:ext>
+                  </a:extLst>
+                </a:gridCol>
+                <a:gridCol w="691797">
+                  <a:extLst>
+                    <a:ext uri="{9D8B030D-6E8A-4147-A177-3AD203B41FA5}">
+                      <a16:colId xmlns:a16="http://schemas.microsoft.com/office/drawing/2014/main" val="3337530176"/>
+                    </a:ext>
+                  </a:extLst>
+                </a:gridCol>
+              </a:tblGrid>
+              <a:tr h="370840">
+                <a:tc>
+                  <a:txBody>
+                    <a:bodyPr/>
+                    <a:lstStyle/>
+                    <a:p>
+                      <a:r>
+                        <a:rPr lang="en-US" dirty="0" smtClean="0"/>
+                        <a:t>4</a:t>
+                      </a:r>
+                      <a:endParaRPr lang="en-US" dirty="0"/>
+                    </a:p>
+                  </a:txBody>
+                  <a:tcPr>
+                    <a:solidFill>
+                      <a:schemeClr val="accent1">
+                        <a:lumMod val="60000"/>
+                        <a:lumOff val="40000"/>
+                      </a:schemeClr>
+                    </a:solidFill>
+                  </a:tcPr>
+                </a:tc>
+                <a:tc>
+                  <a:txBody>
+                    <a:bodyPr/>
+                    <a:lstStyle/>
+                    <a:p>
+                      <a:r>
+                        <a:rPr lang="en-US" dirty="0" smtClean="0"/>
+                        <a:t>1</a:t>
+                      </a:r>
+                      <a:endParaRPr lang="en-US" dirty="0"/>
+                    </a:p>
+                  </a:txBody>
+                  <a:tcPr>
+                    <a:solidFill>
+                      <a:schemeClr val="accent2">
+                        <a:lumMod val="60000"/>
+                        <a:lumOff val="40000"/>
+                      </a:schemeClr>
+                    </a:solidFill>
+                  </a:tcPr>
+                </a:tc>
+                <a:tc>
+                  <a:txBody>
+                    <a:bodyPr/>
+                    <a:lstStyle/>
+                    <a:p>
+                      <a:r>
+                        <a:rPr lang="en-US" dirty="0" smtClean="0"/>
+                        <a:t>5</a:t>
+                      </a:r>
+                      <a:endParaRPr lang="en-US" dirty="0"/>
+                    </a:p>
+                  </a:txBody>
+                  <a:tcPr>
+                    <a:solidFill>
+                      <a:schemeClr val="accent1">
+                        <a:lumMod val="60000"/>
+                        <a:lumOff val="40000"/>
+                      </a:schemeClr>
+                    </a:solidFill>
+                  </a:tcPr>
+                </a:tc>
+                <a:tc>
+                  <a:txBody>
+                    <a:bodyPr/>
+                    <a:lstStyle/>
+                    <a:p>
+                      <a:r>
+                        <a:rPr lang="en-US" dirty="0" smtClean="0"/>
+                        <a:t>3</a:t>
+                      </a:r>
+                      <a:endParaRPr lang="en-US" dirty="0"/>
+                    </a:p>
+                  </a:txBody>
+                  <a:tcPr>
+                    <a:noFill/>
+                  </a:tcPr>
+                </a:tc>
+                <a:tc>
+                  <a:txBody>
+                    <a:bodyPr/>
+                    <a:lstStyle/>
+                    <a:p>
+                      <a:r>
+                        <a:rPr lang="en-US" dirty="0" smtClean="0"/>
+                        <a:t>2</a:t>
+                      </a:r>
+                      <a:endParaRPr lang="en-US" dirty="0"/>
+                    </a:p>
+                  </a:txBody>
+                  <a:tcPr>
+                    <a:noFill/>
+                  </a:tcPr>
+                </a:tc>
+                <a:tc>
+                  <a:txBody>
+                    <a:bodyPr/>
+                    <a:lstStyle/>
+                    <a:p>
+                      <a:r>
+                        <a:rPr lang="en-US" dirty="0" smtClean="0"/>
+                        <a:t>6</a:t>
+                      </a:r>
+                      <a:endParaRPr lang="en-US" dirty="0"/>
+                    </a:p>
+                  </a:txBody>
+                  <a:tcPr>
+                    <a:noFill/>
+                  </a:tcPr>
+                </a:tc>
+                <a:extLst>
+                  <a:ext uri="{0D108BD9-81ED-4DB2-BD59-A6C34878D82A}">
+                    <a16:rowId xmlns:a16="http://schemas.microsoft.com/office/drawing/2014/main" val="1945647981"/>
+                  </a:ext>
+                </a:extLst>
+              </a:tr>
+            </a:tbl>
+          </a:graphicData>
+        </a:graphic>
+      </p:graphicFrame>
+      <p:graphicFrame>
+        <p:nvGraphicFramePr>
+          <p:cNvPr id="9" name="Table 8"/>
+          <p:cNvGraphicFramePr>
+            <a:graphicFrameLocks noGrp="1"/>
+          </p:cNvGraphicFramePr>
+          <p:nvPr>
+            <p:extLst/>
+          </p:nvPr>
+        </p:nvGraphicFramePr>
+        <p:xfrm>
+          <a:off x="7227842" y="8132480"/>
+          <a:ext cx="4150782" cy="370840"/>
+        </p:xfrm>
+        <a:graphic>
+          <a:graphicData uri="http://schemas.openxmlformats.org/drawingml/2006/table">
+            <a:tbl>
+              <a:tblPr firstRow="1" bandRow="1">
+                <a:tableStyleId>{5940675A-B579-460E-94D1-54222C63F5DA}</a:tableStyleId>
+              </a:tblPr>
+              <a:tblGrid>
+                <a:gridCol w="691797">
+                  <a:extLst>
+                    <a:ext uri="{9D8B030D-6E8A-4147-A177-3AD203B41FA5}">
+                      <a16:colId xmlns:a16="http://schemas.microsoft.com/office/drawing/2014/main" val="1527688708"/>
+                    </a:ext>
+                  </a:extLst>
+                </a:gridCol>
+                <a:gridCol w="691797">
+                  <a:extLst>
+                    <a:ext uri="{9D8B030D-6E8A-4147-A177-3AD203B41FA5}">
+                      <a16:colId xmlns:a16="http://schemas.microsoft.com/office/drawing/2014/main" val="653538617"/>
+                    </a:ext>
+                  </a:extLst>
+                </a:gridCol>
+                <a:gridCol w="691797">
+                  <a:extLst>
+                    <a:ext uri="{9D8B030D-6E8A-4147-A177-3AD203B41FA5}">
+                      <a16:colId xmlns:a16="http://schemas.microsoft.com/office/drawing/2014/main" val="2554237578"/>
+                    </a:ext>
+                  </a:extLst>
+                </a:gridCol>
+                <a:gridCol w="691797">
+                  <a:extLst>
+                    <a:ext uri="{9D8B030D-6E8A-4147-A177-3AD203B41FA5}">
+                      <a16:colId xmlns:a16="http://schemas.microsoft.com/office/drawing/2014/main" val="2946659525"/>
+                    </a:ext>
+                  </a:extLst>
+                </a:gridCol>
+                <a:gridCol w="691797">
+                  <a:extLst>
+                    <a:ext uri="{9D8B030D-6E8A-4147-A177-3AD203B41FA5}">
+                      <a16:colId xmlns:a16="http://schemas.microsoft.com/office/drawing/2014/main" val="2043106262"/>
+                    </a:ext>
+                  </a:extLst>
+                </a:gridCol>
+                <a:gridCol w="691797">
+                  <a:extLst>
+                    <a:ext uri="{9D8B030D-6E8A-4147-A177-3AD203B41FA5}">
+                      <a16:colId xmlns:a16="http://schemas.microsoft.com/office/drawing/2014/main" val="3337530176"/>
+                    </a:ext>
+                  </a:extLst>
+                </a:gridCol>
+              </a:tblGrid>
+              <a:tr h="370840">
+                <a:tc>
+                  <a:txBody>
+                    <a:bodyPr/>
+                    <a:lstStyle/>
+                    <a:p>
+                      <a:r>
+                        <a:rPr lang="en-US" dirty="0" smtClean="0"/>
+                        <a:t>1</a:t>
+                      </a:r>
+                      <a:endParaRPr lang="en-US" dirty="0"/>
+                    </a:p>
+                  </a:txBody>
+                  <a:tcPr>
+                    <a:solidFill>
+                      <a:schemeClr val="accent2">
+                        <a:lumMod val="60000"/>
+                        <a:lumOff val="40000"/>
+                      </a:schemeClr>
+                    </a:solidFill>
+                  </a:tcPr>
+                </a:tc>
+                <a:tc>
+                  <a:txBody>
+                    <a:bodyPr/>
+                    <a:lstStyle/>
+                    <a:p>
+                      <a:r>
+                        <a:rPr lang="en-US" dirty="0" smtClean="0"/>
+                        <a:t>4</a:t>
+                      </a:r>
+                      <a:endParaRPr lang="en-US" dirty="0"/>
+                    </a:p>
+                  </a:txBody>
+                  <a:tcPr>
+                    <a:solidFill>
+                      <a:schemeClr val="accent1">
+                        <a:lumMod val="60000"/>
+                        <a:lumOff val="40000"/>
+                      </a:schemeClr>
+                    </a:solidFill>
+                  </a:tcPr>
+                </a:tc>
+                <a:tc>
+                  <a:txBody>
+                    <a:bodyPr/>
+                    <a:lstStyle/>
+                    <a:p>
+                      <a:r>
+                        <a:rPr lang="en-US" dirty="0" smtClean="0"/>
+                        <a:t>5</a:t>
+                      </a:r>
+                      <a:endParaRPr lang="en-US" dirty="0"/>
+                    </a:p>
+                  </a:txBody>
+                  <a:tcPr>
+                    <a:solidFill>
+                      <a:schemeClr val="accent1">
+                        <a:lumMod val="60000"/>
+                        <a:lumOff val="40000"/>
+                      </a:schemeClr>
+                    </a:solidFill>
+                  </a:tcPr>
+                </a:tc>
+                <a:tc>
+                  <a:txBody>
+                    <a:bodyPr/>
+                    <a:lstStyle/>
+                    <a:p>
+                      <a:r>
+                        <a:rPr lang="en-US" dirty="0" smtClean="0"/>
+                        <a:t>3</a:t>
+                      </a:r>
+                      <a:endParaRPr lang="en-US" dirty="0"/>
+                    </a:p>
+                  </a:txBody>
+                  <a:tcPr>
+                    <a:noFill/>
+                  </a:tcPr>
+                </a:tc>
+                <a:tc>
+                  <a:txBody>
+                    <a:bodyPr/>
+                    <a:lstStyle/>
+                    <a:p>
+                      <a:r>
+                        <a:rPr lang="en-US" dirty="0" smtClean="0"/>
+                        <a:t>2</a:t>
+                      </a:r>
+                      <a:endParaRPr lang="en-US" dirty="0"/>
+                    </a:p>
+                  </a:txBody>
+                  <a:tcPr>
+                    <a:noFill/>
+                  </a:tcPr>
+                </a:tc>
+                <a:tc>
+                  <a:txBody>
+                    <a:bodyPr/>
+                    <a:lstStyle/>
+                    <a:p>
+                      <a:r>
+                        <a:rPr lang="en-US" dirty="0" smtClean="0"/>
+                        <a:t>6</a:t>
+                      </a:r>
+                      <a:endParaRPr lang="en-US" dirty="0"/>
+                    </a:p>
+                  </a:txBody>
+                  <a:tcPr>
+                    <a:noFill/>
+                  </a:tcPr>
+                </a:tc>
+                <a:extLst>
+                  <a:ext uri="{0D108BD9-81ED-4DB2-BD59-A6C34878D82A}">
+                    <a16:rowId xmlns:a16="http://schemas.microsoft.com/office/drawing/2014/main" val="1945647981"/>
+                  </a:ext>
+                </a:extLst>
+              </a:tr>
+            </a:tbl>
+          </a:graphicData>
+        </a:graphic>
+      </p:graphicFrame>
+      <p:sp>
+        <p:nvSpPr>
+          <p:cNvPr id="10" name="TextBox 9"/>
+          <p:cNvSpPr txBox="1"/>
+          <p:nvPr/>
+        </p:nvSpPr>
+        <p:spPr>
+          <a:xfrm>
+            <a:off x="11575324" y="2813045"/>
+            <a:ext cx="751808" cy="533479"/>
+          </a:xfrm>
+          <a:prstGeom prst="rect">
+            <a:avLst/>
+          </a:prstGeom>
+          <a:noFill/>
+          <a:ln w="12700" cap="flat">
+            <a:noFill/>
+            <a:miter lim="400000"/>
+          </a:ln>
+          <a:effectLst/>
+          <a:sp3d/>
+        </p:spPr>
+        <p:style>
+          <a:lnRef idx="0">
+            <a:scrgbClr r="0" g="0" b="0"/>
+          </a:lnRef>
+          <a:fillRef idx="0">
+            <a:scrgbClr r="0" g="0" b="0"/>
+          </a:fillRef>
+          <a:effectRef idx="0">
+            <a:scrgbClr r="0" g="0" b="0"/>
+          </a:effectRef>
+          <a:fontRef idx="none"/>
+        </p:style>
+        <p:txBody>
+          <a:bodyPr rot="0" spcFirstLastPara="1" vertOverflow="overflow" horzOverflow="overflow" vert="horz" wrap="none" lIns="50800" tIns="50800" rIns="50800" bIns="50800" numCol="1" spcCol="38100" rtlCol="0" anchor="ctr">
+            <a:spAutoFit/>
+          </a:bodyPr>
+          <a:lstStyle/>
+          <a:p>
+            <a:pPr marL="0" marR="0" indent="0" algn="ctr" defTabSz="584200" rtl="0" fontAlgn="auto" latinLnBrk="0" hangingPunct="0">
+              <a:lnSpc>
+                <a:spcPct val="100000"/>
+              </a:lnSpc>
+              <a:spcBef>
+                <a:spcPts val="0"/>
+              </a:spcBef>
+              <a:spcAft>
+                <a:spcPts val="0"/>
+              </a:spcAft>
+              <a:buClrTx/>
+              <a:buSzTx/>
+              <a:buFontTx/>
+              <a:buNone/>
+              <a:tabLst/>
+            </a:pPr>
+            <a:r>
+              <a:rPr kumimoji="0" lang="en-US" sz="2800" b="0" i="0" u="none" strike="noStrike" cap="none" spc="0" normalizeH="0" baseline="0" dirty="0" smtClean="0">
+                <a:ln>
+                  <a:noFill/>
+                </a:ln>
+                <a:solidFill>
+                  <a:srgbClr val="000000"/>
+                </a:solidFill>
+                <a:effectLst/>
+                <a:uFillTx/>
+                <a:latin typeface="+mn-lt"/>
+                <a:ea typeface="+mn-ea"/>
+                <a:cs typeface="+mn-cs"/>
+                <a:sym typeface="Helvetica Light"/>
+              </a:rPr>
+              <a:t>K=0</a:t>
+            </a:r>
+            <a:endParaRPr kumimoji="0" lang="en-US" sz="2800" b="0" i="0" u="none" strike="noStrike" cap="none" spc="0" normalizeH="0" baseline="0" dirty="0">
+              <a:ln>
+                <a:noFill/>
+              </a:ln>
+              <a:solidFill>
+                <a:srgbClr val="000000"/>
+              </a:solidFill>
+              <a:effectLst/>
+              <a:uFillTx/>
+              <a:latin typeface="+mn-lt"/>
+              <a:ea typeface="+mn-ea"/>
+              <a:cs typeface="+mn-cs"/>
+              <a:sym typeface="Helvetica Light"/>
+            </a:endParaRPr>
+          </a:p>
+        </p:txBody>
+      </p:sp>
+      <p:sp>
+        <p:nvSpPr>
+          <p:cNvPr id="11" name="TextBox 10"/>
+          <p:cNvSpPr txBox="1"/>
+          <p:nvPr/>
+        </p:nvSpPr>
+        <p:spPr>
+          <a:xfrm>
+            <a:off x="11581017" y="3852841"/>
+            <a:ext cx="751809" cy="533479"/>
+          </a:xfrm>
+          <a:prstGeom prst="rect">
+            <a:avLst/>
+          </a:prstGeom>
+          <a:noFill/>
+          <a:ln w="12700" cap="flat">
+            <a:noFill/>
+            <a:miter lim="400000"/>
+          </a:ln>
+          <a:effectLst/>
+          <a:sp3d/>
+        </p:spPr>
+        <p:style>
+          <a:lnRef idx="0">
+            <a:scrgbClr r="0" g="0" b="0"/>
+          </a:lnRef>
+          <a:fillRef idx="0">
+            <a:scrgbClr r="0" g="0" b="0"/>
+          </a:fillRef>
+          <a:effectRef idx="0">
+            <a:scrgbClr r="0" g="0" b="0"/>
+          </a:effectRef>
+          <a:fontRef idx="none"/>
+        </p:style>
+        <p:txBody>
+          <a:bodyPr rot="0" spcFirstLastPara="1" vertOverflow="overflow" horzOverflow="overflow" vert="horz" wrap="none" lIns="50800" tIns="50800" rIns="50800" bIns="50800" numCol="1" spcCol="38100" rtlCol="0" anchor="ctr">
+            <a:spAutoFit/>
+          </a:bodyPr>
+          <a:lstStyle/>
+          <a:p>
+            <a:pPr marL="0" marR="0" indent="0" algn="ctr" defTabSz="584200" rtl="0" fontAlgn="auto" latinLnBrk="0" hangingPunct="0">
+              <a:lnSpc>
+                <a:spcPct val="100000"/>
+              </a:lnSpc>
+              <a:spcBef>
+                <a:spcPts val="0"/>
+              </a:spcBef>
+              <a:spcAft>
+                <a:spcPts val="0"/>
+              </a:spcAft>
+              <a:buClrTx/>
+              <a:buSzTx/>
+              <a:buFontTx/>
+              <a:buNone/>
+              <a:tabLst/>
+            </a:pPr>
+            <a:r>
+              <a:rPr kumimoji="0" lang="en-US" sz="2800" b="0" i="0" u="none" strike="noStrike" cap="none" spc="0" normalizeH="0" baseline="0" dirty="0" smtClean="0">
+                <a:ln>
+                  <a:noFill/>
+                </a:ln>
+                <a:solidFill>
+                  <a:srgbClr val="000000"/>
+                </a:solidFill>
+                <a:effectLst/>
+                <a:uFillTx/>
+                <a:latin typeface="+mn-lt"/>
+                <a:ea typeface="+mn-ea"/>
+                <a:cs typeface="+mn-cs"/>
+                <a:sym typeface="Helvetica Light"/>
+              </a:rPr>
+              <a:t>K=1</a:t>
+            </a:r>
+            <a:endParaRPr kumimoji="0" lang="en-US" sz="2800" b="0" i="0" u="none" strike="noStrike" cap="none" spc="0" normalizeH="0" baseline="0" dirty="0">
+              <a:ln>
+                <a:noFill/>
+              </a:ln>
+              <a:solidFill>
+                <a:srgbClr val="000000"/>
+              </a:solidFill>
+              <a:effectLst/>
+              <a:uFillTx/>
+              <a:latin typeface="+mn-lt"/>
+              <a:ea typeface="+mn-ea"/>
+              <a:cs typeface="+mn-cs"/>
+              <a:sym typeface="Helvetica Light"/>
+            </a:endParaRPr>
+          </a:p>
+        </p:txBody>
+      </p:sp>
+      <p:sp>
+        <p:nvSpPr>
+          <p:cNvPr id="12" name="TextBox 11"/>
+          <p:cNvSpPr txBox="1"/>
+          <p:nvPr/>
+        </p:nvSpPr>
+        <p:spPr>
+          <a:xfrm>
+            <a:off x="11581017" y="4927913"/>
+            <a:ext cx="751809" cy="533479"/>
+          </a:xfrm>
+          <a:prstGeom prst="rect">
+            <a:avLst/>
+          </a:prstGeom>
+          <a:noFill/>
+          <a:ln w="12700" cap="flat">
+            <a:noFill/>
+            <a:miter lim="400000"/>
+          </a:ln>
+          <a:effectLst/>
+          <a:sp3d/>
+        </p:spPr>
+        <p:style>
+          <a:lnRef idx="0">
+            <a:scrgbClr r="0" g="0" b="0"/>
+          </a:lnRef>
+          <a:fillRef idx="0">
+            <a:scrgbClr r="0" g="0" b="0"/>
+          </a:fillRef>
+          <a:effectRef idx="0">
+            <a:scrgbClr r="0" g="0" b="0"/>
+          </a:effectRef>
+          <a:fontRef idx="none"/>
+        </p:style>
+        <p:txBody>
+          <a:bodyPr rot="0" spcFirstLastPara="1" vertOverflow="overflow" horzOverflow="overflow" vert="horz" wrap="none" lIns="50800" tIns="50800" rIns="50800" bIns="50800" numCol="1" spcCol="38100" rtlCol="0" anchor="ctr">
+            <a:spAutoFit/>
+          </a:bodyPr>
+          <a:lstStyle/>
+          <a:p>
+            <a:pPr marL="0" marR="0" indent="0" algn="ctr" defTabSz="584200" rtl="0" fontAlgn="auto" latinLnBrk="0" hangingPunct="0">
+              <a:lnSpc>
+                <a:spcPct val="100000"/>
+              </a:lnSpc>
+              <a:spcBef>
+                <a:spcPts val="0"/>
+              </a:spcBef>
+              <a:spcAft>
+                <a:spcPts val="0"/>
+              </a:spcAft>
+              <a:buClrTx/>
+              <a:buSzTx/>
+              <a:buFontTx/>
+              <a:buNone/>
+              <a:tabLst/>
+            </a:pPr>
+            <a:r>
+              <a:rPr kumimoji="0" lang="en-US" sz="2800" b="0" i="0" u="none" strike="noStrike" cap="none" spc="0" normalizeH="0" baseline="0" dirty="0" smtClean="0">
+                <a:ln>
+                  <a:noFill/>
+                </a:ln>
+                <a:solidFill>
+                  <a:srgbClr val="000000"/>
+                </a:solidFill>
+                <a:effectLst/>
+                <a:uFillTx/>
+                <a:latin typeface="+mn-lt"/>
+                <a:ea typeface="+mn-ea"/>
+                <a:cs typeface="+mn-cs"/>
+                <a:sym typeface="Helvetica Light"/>
+              </a:rPr>
+              <a:t>K=2</a:t>
+            </a:r>
+            <a:endParaRPr kumimoji="0" lang="en-US" sz="2800" b="0" i="0" u="none" strike="noStrike" cap="none" spc="0" normalizeH="0" baseline="0" dirty="0">
+              <a:ln>
+                <a:noFill/>
+              </a:ln>
+              <a:solidFill>
+                <a:srgbClr val="000000"/>
+              </a:solidFill>
+              <a:effectLst/>
+              <a:uFillTx/>
+              <a:latin typeface="+mn-lt"/>
+              <a:ea typeface="+mn-ea"/>
+              <a:cs typeface="+mn-cs"/>
+              <a:sym typeface="Helvetica Light"/>
+            </a:endParaRPr>
+          </a:p>
+        </p:txBody>
+      </p:sp>
+      <p:sp>
+        <p:nvSpPr>
+          <p:cNvPr id="13" name="TextBox 12"/>
+          <p:cNvSpPr txBox="1"/>
+          <p:nvPr/>
+        </p:nvSpPr>
+        <p:spPr>
+          <a:xfrm>
+            <a:off x="11581017" y="5971511"/>
+            <a:ext cx="751809" cy="533479"/>
+          </a:xfrm>
+          <a:prstGeom prst="rect">
+            <a:avLst/>
+          </a:prstGeom>
+          <a:noFill/>
+          <a:ln w="12700" cap="flat">
+            <a:noFill/>
+            <a:miter lim="400000"/>
+          </a:ln>
+          <a:effectLst/>
+          <a:sp3d/>
+        </p:spPr>
+        <p:style>
+          <a:lnRef idx="0">
+            <a:scrgbClr r="0" g="0" b="0"/>
+          </a:lnRef>
+          <a:fillRef idx="0">
+            <a:scrgbClr r="0" g="0" b="0"/>
+          </a:fillRef>
+          <a:effectRef idx="0">
+            <a:scrgbClr r="0" g="0" b="0"/>
+          </a:effectRef>
+          <a:fontRef idx="none"/>
+        </p:style>
+        <p:txBody>
+          <a:bodyPr rot="0" spcFirstLastPara="1" vertOverflow="overflow" horzOverflow="overflow" vert="horz" wrap="none" lIns="50800" tIns="50800" rIns="50800" bIns="50800" numCol="1" spcCol="38100" rtlCol="0" anchor="ctr">
+            <a:spAutoFit/>
+          </a:bodyPr>
+          <a:lstStyle/>
+          <a:p>
+            <a:pPr marL="0" marR="0" indent="0" algn="ctr" defTabSz="584200" rtl="0" fontAlgn="auto" latinLnBrk="0" hangingPunct="0">
+              <a:lnSpc>
+                <a:spcPct val="100000"/>
+              </a:lnSpc>
+              <a:spcBef>
+                <a:spcPts val="0"/>
+              </a:spcBef>
+              <a:spcAft>
+                <a:spcPts val="0"/>
+              </a:spcAft>
+              <a:buClrTx/>
+              <a:buSzTx/>
+              <a:buFontTx/>
+              <a:buNone/>
+              <a:tabLst/>
+            </a:pPr>
+            <a:r>
+              <a:rPr kumimoji="0" lang="en-US" sz="2800" b="0" i="0" u="none" strike="noStrike" cap="none" spc="0" normalizeH="0" baseline="0" dirty="0" smtClean="0">
+                <a:ln>
+                  <a:noFill/>
+                </a:ln>
+                <a:solidFill>
+                  <a:srgbClr val="000000"/>
+                </a:solidFill>
+                <a:effectLst/>
+                <a:uFillTx/>
+                <a:latin typeface="+mn-lt"/>
+                <a:ea typeface="+mn-ea"/>
+                <a:cs typeface="+mn-cs"/>
+                <a:sym typeface="Helvetica Light"/>
+              </a:rPr>
+              <a:t>K=3</a:t>
+            </a:r>
+            <a:endParaRPr kumimoji="0" lang="en-US" sz="2800" b="0" i="0" u="none" strike="noStrike" cap="none" spc="0" normalizeH="0" baseline="0" dirty="0">
+              <a:ln>
+                <a:noFill/>
+              </a:ln>
+              <a:solidFill>
+                <a:srgbClr val="000000"/>
+              </a:solidFill>
+              <a:effectLst/>
+              <a:uFillTx/>
+              <a:latin typeface="+mn-lt"/>
+              <a:ea typeface="+mn-ea"/>
+              <a:cs typeface="+mn-cs"/>
+              <a:sym typeface="Helvetica Light"/>
+            </a:endParaRPr>
+          </a:p>
+        </p:txBody>
+      </p:sp>
+      <p:sp>
+        <p:nvSpPr>
+          <p:cNvPr id="14" name="TextBox 13"/>
+          <p:cNvSpPr txBox="1"/>
+          <p:nvPr/>
+        </p:nvSpPr>
+        <p:spPr>
+          <a:xfrm>
+            <a:off x="11581017" y="6924731"/>
+            <a:ext cx="942566" cy="533479"/>
+          </a:xfrm>
+          <a:prstGeom prst="rect">
+            <a:avLst/>
+          </a:prstGeom>
+          <a:noFill/>
+          <a:ln w="12700" cap="flat">
+            <a:noFill/>
+            <a:miter lim="400000"/>
+          </a:ln>
+          <a:effectLst/>
+          <a:sp3d/>
+        </p:spPr>
+        <p:style>
+          <a:lnRef idx="0">
+            <a:scrgbClr r="0" g="0" b="0"/>
+          </a:lnRef>
+          <a:fillRef idx="0">
+            <a:scrgbClr r="0" g="0" b="0"/>
+          </a:fillRef>
+          <a:effectRef idx="0">
+            <a:scrgbClr r="0" g="0" b="0"/>
+          </a:effectRef>
+          <a:fontRef idx="none"/>
+        </p:style>
+        <p:txBody>
+          <a:bodyPr rot="0" spcFirstLastPara="1" vertOverflow="overflow" horzOverflow="overflow" vert="horz" wrap="none" lIns="50800" tIns="50800" rIns="50800" bIns="50800" numCol="1" spcCol="38100" rtlCol="0" anchor="ctr">
+            <a:spAutoFit/>
+          </a:bodyPr>
+          <a:lstStyle/>
+          <a:p>
+            <a:pPr marL="0" marR="0" indent="0" algn="ctr" defTabSz="584200" rtl="0" fontAlgn="auto" latinLnBrk="0" hangingPunct="0">
+              <a:lnSpc>
+                <a:spcPct val="100000"/>
+              </a:lnSpc>
+              <a:spcBef>
+                <a:spcPts val="0"/>
+              </a:spcBef>
+              <a:spcAft>
+                <a:spcPts val="0"/>
+              </a:spcAft>
+              <a:buClrTx/>
+              <a:buSzTx/>
+              <a:buFontTx/>
+              <a:buNone/>
+              <a:tabLst/>
+            </a:pPr>
+            <a:r>
+              <a:rPr kumimoji="0" lang="en-US" sz="2800" b="0" i="0" u="none" strike="noStrike" cap="none" spc="0" normalizeH="0" baseline="0" dirty="0" smtClean="0">
+                <a:ln>
+                  <a:noFill/>
+                </a:ln>
+                <a:solidFill>
+                  <a:srgbClr val="000000"/>
+                </a:solidFill>
+                <a:effectLst/>
+                <a:uFillTx/>
+                <a:latin typeface="+mn-lt"/>
+                <a:ea typeface="+mn-ea"/>
+                <a:cs typeface="+mn-cs"/>
+                <a:sym typeface="Helvetica Light"/>
+              </a:rPr>
+              <a:t>swap</a:t>
+            </a:r>
+            <a:endParaRPr kumimoji="0" lang="en-US" sz="2800" b="0" i="0" u="none" strike="noStrike" cap="none" spc="0" normalizeH="0" baseline="0" dirty="0">
+              <a:ln>
+                <a:noFill/>
+              </a:ln>
+              <a:solidFill>
+                <a:srgbClr val="000000"/>
+              </a:solidFill>
+              <a:effectLst/>
+              <a:uFillTx/>
+              <a:latin typeface="+mn-lt"/>
+              <a:ea typeface="+mn-ea"/>
+              <a:cs typeface="+mn-cs"/>
+              <a:sym typeface="Helvetica Light"/>
+            </a:endParaRPr>
+          </a:p>
+        </p:txBody>
+      </p:sp>
+      <p:sp>
+        <p:nvSpPr>
+          <p:cNvPr id="15" name="TextBox 14"/>
+          <p:cNvSpPr txBox="1"/>
+          <p:nvPr/>
+        </p:nvSpPr>
+        <p:spPr>
+          <a:xfrm>
+            <a:off x="11581017" y="7969841"/>
+            <a:ext cx="942566" cy="533479"/>
+          </a:xfrm>
+          <a:prstGeom prst="rect">
+            <a:avLst/>
+          </a:prstGeom>
+          <a:noFill/>
+          <a:ln w="12700" cap="flat">
+            <a:noFill/>
+            <a:miter lim="400000"/>
+          </a:ln>
+          <a:effectLst/>
+          <a:sp3d/>
+        </p:spPr>
+        <p:style>
+          <a:lnRef idx="0">
+            <a:scrgbClr r="0" g="0" b="0"/>
+          </a:lnRef>
+          <a:fillRef idx="0">
+            <a:scrgbClr r="0" g="0" b="0"/>
+          </a:fillRef>
+          <a:effectRef idx="0">
+            <a:scrgbClr r="0" g="0" b="0"/>
+          </a:effectRef>
+          <a:fontRef idx="none"/>
+        </p:style>
+        <p:txBody>
+          <a:bodyPr rot="0" spcFirstLastPara="1" vertOverflow="overflow" horzOverflow="overflow" vert="horz" wrap="none" lIns="50800" tIns="50800" rIns="50800" bIns="50800" numCol="1" spcCol="38100" rtlCol="0" anchor="ctr">
+            <a:spAutoFit/>
+          </a:bodyPr>
+          <a:lstStyle/>
+          <a:p>
+            <a:pPr marL="0" marR="0" indent="0" algn="ctr" defTabSz="584200" rtl="0" fontAlgn="auto" latinLnBrk="0" hangingPunct="0">
+              <a:lnSpc>
+                <a:spcPct val="100000"/>
+              </a:lnSpc>
+              <a:spcBef>
+                <a:spcPts val="0"/>
+              </a:spcBef>
+              <a:spcAft>
+                <a:spcPts val="0"/>
+              </a:spcAft>
+              <a:buClrTx/>
+              <a:buSzTx/>
+              <a:buFontTx/>
+              <a:buNone/>
+              <a:tabLst/>
+            </a:pPr>
+            <a:r>
+              <a:rPr kumimoji="0" lang="en-US" sz="2800" b="0" i="0" u="none" strike="noStrike" cap="none" spc="0" normalizeH="0" baseline="0" dirty="0" smtClean="0">
+                <a:ln>
+                  <a:noFill/>
+                </a:ln>
+                <a:solidFill>
+                  <a:srgbClr val="000000"/>
+                </a:solidFill>
+                <a:effectLst/>
+                <a:uFillTx/>
+                <a:latin typeface="+mn-lt"/>
+                <a:ea typeface="+mn-ea"/>
+                <a:cs typeface="+mn-cs"/>
+                <a:sym typeface="Helvetica Light"/>
+              </a:rPr>
+              <a:t>swap</a:t>
+            </a:r>
+            <a:endParaRPr kumimoji="0" lang="en-US" sz="2800" b="0" i="0" u="none" strike="noStrike" cap="none" spc="0" normalizeH="0" baseline="0" dirty="0">
+              <a:ln>
+                <a:noFill/>
+              </a:ln>
+              <a:solidFill>
+                <a:srgbClr val="000000"/>
+              </a:solidFill>
+              <a:effectLst/>
+              <a:uFillTx/>
+              <a:latin typeface="+mn-lt"/>
+              <a:ea typeface="+mn-ea"/>
+              <a:cs typeface="+mn-cs"/>
+              <a:sym typeface="Helvetica Light"/>
+            </a:endParaRPr>
+          </a:p>
+        </p:txBody>
+      </p:sp>
+    </p:spTree>
+    <p:extLst>
+      <p:ext uri="{BB962C8B-B14F-4D97-AF65-F5344CB8AC3E}">
+        <p14:creationId xmlns:p14="http://schemas.microsoft.com/office/powerpoint/2010/main" val="3856517758"/>
+      </p:ext>
+    </p:extLst>
+  </p:cSld>
+  <p:clrMapOvr>
+    <a:masterClrMapping/>
+  </p:clrMapOvr>
+  <p:transition spd="med"/>
+  <p:timing>
+    <p:tnLst>
+      <p:par>
+        <p:cTn id="1" dur="indefinite" restart="never" nodeType="tmRoot"/>
+      </p:par>
+    </p:tnLst>
+  </p:timing>
+</p:sld>
+</file>
+
+<file path=ppt/slides/slide48.xml><?xml version="1.0" encoding="utf-8"?>
+<p:sld xmlns:a="http://schemas.openxmlformats.org/drawingml/2006/main" xmlns:r="http://schemas.openxmlformats.org/officeDocument/2006/relationships" xmlns:p="http://schemas.openxmlformats.org/presentationml/2006/main">
+  <p:cSld>
+    <p:spTree>
+      <p:nvGrpSpPr>
+        <p:cNvPr id="1" name=""/>
+        <p:cNvGrpSpPr/>
+        <p:nvPr/>
+      </p:nvGrpSpPr>
+      <p:grpSpPr>
+        <a:xfrm>
+          <a:off x="0" y="0"/>
+          <a:ext cx="0" cy="0"/>
+          <a:chOff x="0" y="0"/>
+          <a:chExt cx="0" cy="0"/>
+        </a:xfrm>
+      </p:grpSpPr>
+      <p:sp>
+        <p:nvSpPr>
+          <p:cNvPr id="2" name="Title 1"/>
+          <p:cNvSpPr>
+            <a:spLocks noGrp="1"/>
+          </p:cNvSpPr>
+          <p:nvPr>
+            <p:ph type="title"/>
+          </p:nvPr>
+        </p:nvSpPr>
+        <p:spPr>
+          <a:xfrm>
+            <a:off x="952500" y="39147"/>
+            <a:ext cx="11099800" cy="1110923"/>
+          </a:xfrm>
+        </p:spPr>
+        <p:txBody>
+          <a:bodyPr>
+            <a:normAutofit fontScale="90000"/>
+          </a:bodyPr>
+          <a:lstStyle/>
+          <a:p>
+            <a:r>
+              <a:rPr lang="en-US" dirty="0" smtClean="0"/>
+              <a:t>Cont.</a:t>
+            </a:r>
+            <a:endParaRPr lang="en-US" dirty="0"/>
+          </a:p>
+        </p:txBody>
+      </p:sp>
+      <p:graphicFrame>
+        <p:nvGraphicFramePr>
+          <p:cNvPr id="4" name="Table 3"/>
+          <p:cNvGraphicFramePr>
+            <a:graphicFrameLocks noGrp="1"/>
+          </p:cNvGraphicFramePr>
+          <p:nvPr>
+            <p:extLst/>
+          </p:nvPr>
+        </p:nvGraphicFramePr>
+        <p:xfrm>
+          <a:off x="479821" y="2003722"/>
+          <a:ext cx="4150782" cy="370840"/>
+        </p:xfrm>
+        <a:graphic>
+          <a:graphicData uri="http://schemas.openxmlformats.org/drawingml/2006/table">
+            <a:tbl>
+              <a:tblPr firstRow="1" bandRow="1">
+                <a:tableStyleId>{5940675A-B579-460E-94D1-54222C63F5DA}</a:tableStyleId>
+              </a:tblPr>
+              <a:tblGrid>
+                <a:gridCol w="691797">
+                  <a:extLst>
+                    <a:ext uri="{9D8B030D-6E8A-4147-A177-3AD203B41FA5}">
+                      <a16:colId xmlns:a16="http://schemas.microsoft.com/office/drawing/2014/main" val="1527688708"/>
+                    </a:ext>
+                  </a:extLst>
+                </a:gridCol>
+                <a:gridCol w="691797">
+                  <a:extLst>
+                    <a:ext uri="{9D8B030D-6E8A-4147-A177-3AD203B41FA5}">
+                      <a16:colId xmlns:a16="http://schemas.microsoft.com/office/drawing/2014/main" val="653538617"/>
+                    </a:ext>
+                  </a:extLst>
+                </a:gridCol>
+                <a:gridCol w="691797">
+                  <a:extLst>
+                    <a:ext uri="{9D8B030D-6E8A-4147-A177-3AD203B41FA5}">
+                      <a16:colId xmlns:a16="http://schemas.microsoft.com/office/drawing/2014/main" val="2554237578"/>
+                    </a:ext>
+                  </a:extLst>
+                </a:gridCol>
+                <a:gridCol w="691797">
+                  <a:extLst>
+                    <a:ext uri="{9D8B030D-6E8A-4147-A177-3AD203B41FA5}">
+                      <a16:colId xmlns:a16="http://schemas.microsoft.com/office/drawing/2014/main" val="2946659525"/>
+                    </a:ext>
+                  </a:extLst>
+                </a:gridCol>
+                <a:gridCol w="691797">
+                  <a:extLst>
+                    <a:ext uri="{9D8B030D-6E8A-4147-A177-3AD203B41FA5}">
+                      <a16:colId xmlns:a16="http://schemas.microsoft.com/office/drawing/2014/main" val="2043106262"/>
+                    </a:ext>
+                  </a:extLst>
+                </a:gridCol>
+                <a:gridCol w="691797">
+                  <a:extLst>
+                    <a:ext uri="{9D8B030D-6E8A-4147-A177-3AD203B41FA5}">
+                      <a16:colId xmlns:a16="http://schemas.microsoft.com/office/drawing/2014/main" val="3337530176"/>
+                    </a:ext>
+                  </a:extLst>
+                </a:gridCol>
+              </a:tblGrid>
+              <a:tr h="370840">
+                <a:tc>
+                  <a:txBody>
+                    <a:bodyPr/>
+                    <a:lstStyle/>
+                    <a:p>
+                      <a:r>
+                        <a:rPr lang="en-US" dirty="0" smtClean="0"/>
+                        <a:t>1</a:t>
+                      </a:r>
+                      <a:endParaRPr lang="en-US" dirty="0"/>
+                    </a:p>
+                  </a:txBody>
+                  <a:tcPr>
+                    <a:solidFill>
+                      <a:schemeClr val="accent1">
+                        <a:lumMod val="60000"/>
+                        <a:lumOff val="40000"/>
+                      </a:schemeClr>
+                    </a:solidFill>
+                  </a:tcPr>
+                </a:tc>
+                <a:tc>
+                  <a:txBody>
+                    <a:bodyPr/>
+                    <a:lstStyle/>
+                    <a:p>
+                      <a:r>
+                        <a:rPr lang="en-US" dirty="0" smtClean="0"/>
+                        <a:t>4</a:t>
+                      </a:r>
+                      <a:endParaRPr lang="en-US" dirty="0"/>
+                    </a:p>
+                  </a:txBody>
+                  <a:tcPr>
+                    <a:solidFill>
+                      <a:schemeClr val="accent1">
+                        <a:lumMod val="60000"/>
+                        <a:lumOff val="40000"/>
+                      </a:schemeClr>
+                    </a:solidFill>
+                  </a:tcPr>
+                </a:tc>
+                <a:tc>
+                  <a:txBody>
+                    <a:bodyPr/>
+                    <a:lstStyle/>
+                    <a:p>
+                      <a:r>
+                        <a:rPr lang="en-US" dirty="0" smtClean="0"/>
+                        <a:t>5</a:t>
+                      </a:r>
+                      <a:endParaRPr lang="en-US" dirty="0"/>
+                    </a:p>
+                  </a:txBody>
+                  <a:tcPr>
+                    <a:solidFill>
+                      <a:schemeClr val="accent1">
+                        <a:lumMod val="60000"/>
+                        <a:lumOff val="40000"/>
+                      </a:schemeClr>
+                    </a:solidFill>
+                  </a:tcPr>
+                </a:tc>
+                <a:tc>
+                  <a:txBody>
+                    <a:bodyPr/>
+                    <a:lstStyle/>
+                    <a:p>
+                      <a:r>
+                        <a:rPr lang="en-US" dirty="0" smtClean="0"/>
+                        <a:t>3</a:t>
+                      </a:r>
+                      <a:endParaRPr lang="en-US" dirty="0"/>
+                    </a:p>
+                  </a:txBody>
+                  <a:tcPr>
+                    <a:solidFill>
+                      <a:schemeClr val="accent2">
+                        <a:lumMod val="60000"/>
+                        <a:lumOff val="40000"/>
+                      </a:schemeClr>
+                    </a:solidFill>
+                  </a:tcPr>
+                </a:tc>
+                <a:tc>
+                  <a:txBody>
+                    <a:bodyPr/>
+                    <a:lstStyle/>
+                    <a:p>
+                      <a:r>
+                        <a:rPr lang="en-US" dirty="0" smtClean="0"/>
+                        <a:t>2</a:t>
+                      </a:r>
+                      <a:endParaRPr lang="en-US" dirty="0"/>
+                    </a:p>
+                  </a:txBody>
+                  <a:tcPr>
+                    <a:noFill/>
+                  </a:tcPr>
+                </a:tc>
+                <a:tc>
+                  <a:txBody>
+                    <a:bodyPr/>
+                    <a:lstStyle/>
+                    <a:p>
+                      <a:r>
+                        <a:rPr lang="en-US" dirty="0" smtClean="0"/>
+                        <a:t>6</a:t>
+                      </a:r>
+                      <a:endParaRPr lang="en-US" dirty="0"/>
+                    </a:p>
+                  </a:txBody>
+                  <a:tcPr>
+                    <a:noFill/>
+                  </a:tcPr>
+                </a:tc>
+                <a:extLst>
+                  <a:ext uri="{0D108BD9-81ED-4DB2-BD59-A6C34878D82A}">
+                    <a16:rowId xmlns:a16="http://schemas.microsoft.com/office/drawing/2014/main" val="1945647981"/>
+                  </a:ext>
+                </a:extLst>
+              </a:tr>
+            </a:tbl>
+          </a:graphicData>
+        </a:graphic>
+      </p:graphicFrame>
+      <p:graphicFrame>
+        <p:nvGraphicFramePr>
+          <p:cNvPr id="5" name="Table 4"/>
+          <p:cNvGraphicFramePr>
+            <a:graphicFrameLocks noGrp="1"/>
+          </p:cNvGraphicFramePr>
+          <p:nvPr>
+            <p:extLst/>
+          </p:nvPr>
+        </p:nvGraphicFramePr>
+        <p:xfrm>
+          <a:off x="479821" y="2811683"/>
+          <a:ext cx="4150782" cy="365760"/>
+        </p:xfrm>
+        <a:graphic>
+          <a:graphicData uri="http://schemas.openxmlformats.org/drawingml/2006/table">
+            <a:tbl>
+              <a:tblPr firstRow="1" bandRow="1">
+                <a:tableStyleId>{5940675A-B579-460E-94D1-54222C63F5DA}</a:tableStyleId>
+              </a:tblPr>
+              <a:tblGrid>
+                <a:gridCol w="691797">
+                  <a:extLst>
+                    <a:ext uri="{9D8B030D-6E8A-4147-A177-3AD203B41FA5}">
+                      <a16:colId xmlns:a16="http://schemas.microsoft.com/office/drawing/2014/main" val="1527688708"/>
+                    </a:ext>
+                  </a:extLst>
+                </a:gridCol>
+                <a:gridCol w="691797">
+                  <a:extLst>
+                    <a:ext uri="{9D8B030D-6E8A-4147-A177-3AD203B41FA5}">
+                      <a16:colId xmlns:a16="http://schemas.microsoft.com/office/drawing/2014/main" val="653538617"/>
+                    </a:ext>
+                  </a:extLst>
+                </a:gridCol>
+                <a:gridCol w="691797">
+                  <a:extLst>
+                    <a:ext uri="{9D8B030D-6E8A-4147-A177-3AD203B41FA5}">
+                      <a16:colId xmlns:a16="http://schemas.microsoft.com/office/drawing/2014/main" val="2554237578"/>
+                    </a:ext>
+                  </a:extLst>
+                </a:gridCol>
+                <a:gridCol w="691797">
+                  <a:extLst>
+                    <a:ext uri="{9D8B030D-6E8A-4147-A177-3AD203B41FA5}">
+                      <a16:colId xmlns:a16="http://schemas.microsoft.com/office/drawing/2014/main" val="2946659525"/>
+                    </a:ext>
+                  </a:extLst>
+                </a:gridCol>
+                <a:gridCol w="691797">
+                  <a:extLst>
+                    <a:ext uri="{9D8B030D-6E8A-4147-A177-3AD203B41FA5}">
+                      <a16:colId xmlns:a16="http://schemas.microsoft.com/office/drawing/2014/main" val="2043106262"/>
+                    </a:ext>
+                  </a:extLst>
+                </a:gridCol>
+                <a:gridCol w="691797">
+                  <a:extLst>
+                    <a:ext uri="{9D8B030D-6E8A-4147-A177-3AD203B41FA5}">
+                      <a16:colId xmlns:a16="http://schemas.microsoft.com/office/drawing/2014/main" val="3337530176"/>
+                    </a:ext>
+                  </a:extLst>
+                </a:gridCol>
+              </a:tblGrid>
+              <a:tr h="0">
+                <a:tc>
+                  <a:txBody>
+                    <a:bodyPr/>
+                    <a:lstStyle/>
+                    <a:p>
+                      <a:r>
+                        <a:rPr lang="en-US" dirty="0" smtClean="0"/>
+                        <a:t>1</a:t>
+                      </a:r>
+                      <a:endParaRPr lang="en-US" dirty="0"/>
+                    </a:p>
+                  </a:txBody>
+                  <a:tcPr>
+                    <a:solidFill>
+                      <a:schemeClr val="accent1">
+                        <a:lumMod val="60000"/>
+                        <a:lumOff val="40000"/>
+                      </a:schemeClr>
+                    </a:solidFill>
+                  </a:tcPr>
+                </a:tc>
+                <a:tc>
+                  <a:txBody>
+                    <a:bodyPr/>
+                    <a:lstStyle/>
+                    <a:p>
+                      <a:r>
+                        <a:rPr lang="en-US" dirty="0" smtClean="0"/>
+                        <a:t>4</a:t>
+                      </a:r>
+                      <a:endParaRPr lang="en-US" dirty="0"/>
+                    </a:p>
+                  </a:txBody>
+                  <a:tcPr>
+                    <a:solidFill>
+                      <a:schemeClr val="accent1">
+                        <a:lumMod val="60000"/>
+                        <a:lumOff val="40000"/>
+                      </a:schemeClr>
+                    </a:solidFill>
+                  </a:tcPr>
+                </a:tc>
+                <a:tc>
+                  <a:txBody>
+                    <a:bodyPr/>
+                    <a:lstStyle/>
+                    <a:p>
+                      <a:r>
+                        <a:rPr lang="en-US" dirty="0" smtClean="0"/>
+                        <a:t>3</a:t>
+                      </a:r>
+                      <a:endParaRPr lang="en-US" dirty="0"/>
+                    </a:p>
+                  </a:txBody>
+                  <a:tcPr>
+                    <a:solidFill>
+                      <a:schemeClr val="accent2">
+                        <a:lumMod val="60000"/>
+                        <a:lumOff val="40000"/>
+                      </a:schemeClr>
+                    </a:solidFill>
+                  </a:tcPr>
+                </a:tc>
+                <a:tc>
+                  <a:txBody>
+                    <a:bodyPr/>
+                    <a:lstStyle/>
+                    <a:p>
+                      <a:r>
+                        <a:rPr lang="en-US" dirty="0" smtClean="0"/>
+                        <a:t>5</a:t>
+                      </a:r>
+                      <a:endParaRPr lang="en-US" dirty="0"/>
+                    </a:p>
+                  </a:txBody>
+                  <a:tcPr>
+                    <a:solidFill>
+                      <a:schemeClr val="accent1">
+                        <a:lumMod val="60000"/>
+                        <a:lumOff val="40000"/>
+                      </a:schemeClr>
+                    </a:solidFill>
+                  </a:tcPr>
+                </a:tc>
+                <a:tc>
+                  <a:txBody>
+                    <a:bodyPr/>
+                    <a:lstStyle/>
+                    <a:p>
+                      <a:r>
+                        <a:rPr lang="en-US" dirty="0" smtClean="0"/>
+                        <a:t>2</a:t>
+                      </a:r>
+                      <a:endParaRPr lang="en-US" dirty="0"/>
+                    </a:p>
+                  </a:txBody>
+                  <a:tcPr>
+                    <a:noFill/>
+                  </a:tcPr>
+                </a:tc>
+                <a:tc>
+                  <a:txBody>
+                    <a:bodyPr/>
+                    <a:lstStyle/>
+                    <a:p>
+                      <a:r>
+                        <a:rPr lang="en-US" dirty="0" smtClean="0"/>
+                        <a:t>6</a:t>
+                      </a:r>
+                      <a:endParaRPr lang="en-US" dirty="0"/>
+                    </a:p>
+                  </a:txBody>
+                  <a:tcPr>
+                    <a:noFill/>
+                  </a:tcPr>
+                </a:tc>
+                <a:extLst>
+                  <a:ext uri="{0D108BD9-81ED-4DB2-BD59-A6C34878D82A}">
+                    <a16:rowId xmlns:a16="http://schemas.microsoft.com/office/drawing/2014/main" val="1945647981"/>
+                  </a:ext>
+                </a:extLst>
+              </a:tr>
+            </a:tbl>
+          </a:graphicData>
+        </a:graphic>
+      </p:graphicFrame>
+      <p:graphicFrame>
+        <p:nvGraphicFramePr>
+          <p:cNvPr id="6" name="Table 5"/>
+          <p:cNvGraphicFramePr>
+            <a:graphicFrameLocks noGrp="1"/>
+          </p:cNvGraphicFramePr>
+          <p:nvPr>
+            <p:extLst/>
+          </p:nvPr>
+        </p:nvGraphicFramePr>
+        <p:xfrm>
+          <a:off x="479821" y="3614564"/>
+          <a:ext cx="4150782" cy="370840"/>
+        </p:xfrm>
+        <a:graphic>
+          <a:graphicData uri="http://schemas.openxmlformats.org/drawingml/2006/table">
+            <a:tbl>
+              <a:tblPr firstRow="1" bandRow="1">
+                <a:tableStyleId>{5940675A-B579-460E-94D1-54222C63F5DA}</a:tableStyleId>
+              </a:tblPr>
+              <a:tblGrid>
+                <a:gridCol w="691797">
+                  <a:extLst>
+                    <a:ext uri="{9D8B030D-6E8A-4147-A177-3AD203B41FA5}">
+                      <a16:colId xmlns:a16="http://schemas.microsoft.com/office/drawing/2014/main" val="1527688708"/>
+                    </a:ext>
+                  </a:extLst>
+                </a:gridCol>
+                <a:gridCol w="691797">
+                  <a:extLst>
+                    <a:ext uri="{9D8B030D-6E8A-4147-A177-3AD203B41FA5}">
+                      <a16:colId xmlns:a16="http://schemas.microsoft.com/office/drawing/2014/main" val="653538617"/>
+                    </a:ext>
+                  </a:extLst>
+                </a:gridCol>
+                <a:gridCol w="691797">
+                  <a:extLst>
+                    <a:ext uri="{9D8B030D-6E8A-4147-A177-3AD203B41FA5}">
+                      <a16:colId xmlns:a16="http://schemas.microsoft.com/office/drawing/2014/main" val="2554237578"/>
+                    </a:ext>
+                  </a:extLst>
+                </a:gridCol>
+                <a:gridCol w="691797">
+                  <a:extLst>
+                    <a:ext uri="{9D8B030D-6E8A-4147-A177-3AD203B41FA5}">
+                      <a16:colId xmlns:a16="http://schemas.microsoft.com/office/drawing/2014/main" val="2946659525"/>
+                    </a:ext>
+                  </a:extLst>
+                </a:gridCol>
+                <a:gridCol w="691797">
+                  <a:extLst>
+                    <a:ext uri="{9D8B030D-6E8A-4147-A177-3AD203B41FA5}">
+                      <a16:colId xmlns:a16="http://schemas.microsoft.com/office/drawing/2014/main" val="2043106262"/>
+                    </a:ext>
+                  </a:extLst>
+                </a:gridCol>
+                <a:gridCol w="691797">
+                  <a:extLst>
+                    <a:ext uri="{9D8B030D-6E8A-4147-A177-3AD203B41FA5}">
+                      <a16:colId xmlns:a16="http://schemas.microsoft.com/office/drawing/2014/main" val="3337530176"/>
+                    </a:ext>
+                  </a:extLst>
+                </a:gridCol>
+              </a:tblGrid>
+              <a:tr h="370840">
+                <a:tc>
+                  <a:txBody>
+                    <a:bodyPr/>
+                    <a:lstStyle/>
+                    <a:p>
+                      <a:r>
+                        <a:rPr lang="en-US" dirty="0" smtClean="0"/>
+                        <a:t>1</a:t>
+                      </a:r>
+                      <a:endParaRPr lang="en-US" dirty="0"/>
+                    </a:p>
+                  </a:txBody>
+                  <a:tcPr>
+                    <a:solidFill>
+                      <a:schemeClr val="accent1">
+                        <a:lumMod val="60000"/>
+                        <a:lumOff val="40000"/>
+                      </a:schemeClr>
+                    </a:solidFill>
+                  </a:tcPr>
+                </a:tc>
+                <a:tc>
+                  <a:txBody>
+                    <a:bodyPr/>
+                    <a:lstStyle/>
+                    <a:p>
+                      <a:r>
+                        <a:rPr lang="en-US" dirty="0" smtClean="0"/>
+                        <a:t>3</a:t>
+                      </a:r>
+                      <a:endParaRPr lang="en-US" dirty="0"/>
+                    </a:p>
+                  </a:txBody>
+                  <a:tcPr>
+                    <a:solidFill>
+                      <a:schemeClr val="accent2">
+                        <a:lumMod val="60000"/>
+                        <a:lumOff val="40000"/>
+                      </a:schemeClr>
+                    </a:solidFill>
+                  </a:tcPr>
+                </a:tc>
+                <a:tc>
+                  <a:txBody>
+                    <a:bodyPr/>
+                    <a:lstStyle/>
+                    <a:p>
+                      <a:r>
+                        <a:rPr lang="en-US" dirty="0" smtClean="0"/>
+                        <a:t>4</a:t>
+                      </a:r>
+                      <a:endParaRPr lang="en-US" dirty="0"/>
+                    </a:p>
+                  </a:txBody>
+                  <a:tcPr>
+                    <a:solidFill>
+                      <a:schemeClr val="accent1">
+                        <a:lumMod val="60000"/>
+                        <a:lumOff val="40000"/>
+                      </a:schemeClr>
+                    </a:solidFill>
+                  </a:tcPr>
+                </a:tc>
+                <a:tc>
+                  <a:txBody>
+                    <a:bodyPr/>
+                    <a:lstStyle/>
+                    <a:p>
+                      <a:r>
+                        <a:rPr lang="en-US" dirty="0" smtClean="0"/>
+                        <a:t>5</a:t>
+                      </a:r>
+                      <a:endParaRPr lang="en-US" dirty="0"/>
+                    </a:p>
+                  </a:txBody>
+                  <a:tcPr>
+                    <a:solidFill>
+                      <a:schemeClr val="accent1">
+                        <a:lumMod val="60000"/>
+                        <a:lumOff val="40000"/>
+                      </a:schemeClr>
+                    </a:solidFill>
+                  </a:tcPr>
+                </a:tc>
+                <a:tc>
+                  <a:txBody>
+                    <a:bodyPr/>
+                    <a:lstStyle/>
+                    <a:p>
+                      <a:r>
+                        <a:rPr lang="en-US" dirty="0" smtClean="0"/>
+                        <a:t>2</a:t>
+                      </a:r>
+                      <a:endParaRPr lang="en-US" dirty="0"/>
+                    </a:p>
+                  </a:txBody>
+                  <a:tcPr>
+                    <a:noFill/>
+                  </a:tcPr>
+                </a:tc>
+                <a:tc>
+                  <a:txBody>
+                    <a:bodyPr/>
+                    <a:lstStyle/>
+                    <a:p>
+                      <a:r>
+                        <a:rPr lang="en-US" dirty="0" smtClean="0"/>
+                        <a:t>6</a:t>
+                      </a:r>
+                      <a:endParaRPr lang="en-US" dirty="0"/>
+                    </a:p>
+                  </a:txBody>
+                  <a:tcPr>
+                    <a:noFill/>
+                  </a:tcPr>
+                </a:tc>
+                <a:extLst>
+                  <a:ext uri="{0D108BD9-81ED-4DB2-BD59-A6C34878D82A}">
+                    <a16:rowId xmlns:a16="http://schemas.microsoft.com/office/drawing/2014/main" val="1945647981"/>
+                  </a:ext>
+                </a:extLst>
+              </a:tr>
+            </a:tbl>
+          </a:graphicData>
+        </a:graphic>
+      </p:graphicFrame>
+      <p:graphicFrame>
+        <p:nvGraphicFramePr>
+          <p:cNvPr id="7" name="Table 6"/>
+          <p:cNvGraphicFramePr>
+            <a:graphicFrameLocks noGrp="1"/>
+          </p:cNvGraphicFramePr>
+          <p:nvPr>
+            <p:extLst/>
+          </p:nvPr>
+        </p:nvGraphicFramePr>
+        <p:xfrm>
+          <a:off x="479821" y="4422525"/>
+          <a:ext cx="4150782" cy="370840"/>
+        </p:xfrm>
+        <a:graphic>
+          <a:graphicData uri="http://schemas.openxmlformats.org/drawingml/2006/table">
+            <a:tbl>
+              <a:tblPr firstRow="1" bandRow="1">
+                <a:tableStyleId>{5940675A-B579-460E-94D1-54222C63F5DA}</a:tableStyleId>
+              </a:tblPr>
+              <a:tblGrid>
+                <a:gridCol w="691797">
+                  <a:extLst>
+                    <a:ext uri="{9D8B030D-6E8A-4147-A177-3AD203B41FA5}">
+                      <a16:colId xmlns:a16="http://schemas.microsoft.com/office/drawing/2014/main" val="1527688708"/>
+                    </a:ext>
+                  </a:extLst>
+                </a:gridCol>
+                <a:gridCol w="691797">
+                  <a:extLst>
+                    <a:ext uri="{9D8B030D-6E8A-4147-A177-3AD203B41FA5}">
+                      <a16:colId xmlns:a16="http://schemas.microsoft.com/office/drawing/2014/main" val="653538617"/>
+                    </a:ext>
+                  </a:extLst>
+                </a:gridCol>
+                <a:gridCol w="691797">
+                  <a:extLst>
+                    <a:ext uri="{9D8B030D-6E8A-4147-A177-3AD203B41FA5}">
+                      <a16:colId xmlns:a16="http://schemas.microsoft.com/office/drawing/2014/main" val="2554237578"/>
+                    </a:ext>
+                  </a:extLst>
+                </a:gridCol>
+                <a:gridCol w="691797">
+                  <a:extLst>
+                    <a:ext uri="{9D8B030D-6E8A-4147-A177-3AD203B41FA5}">
+                      <a16:colId xmlns:a16="http://schemas.microsoft.com/office/drawing/2014/main" val="2946659525"/>
+                    </a:ext>
+                  </a:extLst>
+                </a:gridCol>
+                <a:gridCol w="691797">
+                  <a:extLst>
+                    <a:ext uri="{9D8B030D-6E8A-4147-A177-3AD203B41FA5}">
+                      <a16:colId xmlns:a16="http://schemas.microsoft.com/office/drawing/2014/main" val="2043106262"/>
+                    </a:ext>
+                  </a:extLst>
+                </a:gridCol>
+                <a:gridCol w="691797">
+                  <a:extLst>
+                    <a:ext uri="{9D8B030D-6E8A-4147-A177-3AD203B41FA5}">
+                      <a16:colId xmlns:a16="http://schemas.microsoft.com/office/drawing/2014/main" val="3337530176"/>
+                    </a:ext>
+                  </a:extLst>
+                </a:gridCol>
+              </a:tblGrid>
+              <a:tr h="370840">
+                <a:tc>
+                  <a:txBody>
+                    <a:bodyPr/>
+                    <a:lstStyle/>
+                    <a:p>
+                      <a:r>
+                        <a:rPr lang="en-US" dirty="0" smtClean="0"/>
+                        <a:t>1</a:t>
+                      </a:r>
+                      <a:endParaRPr lang="en-US" dirty="0"/>
+                    </a:p>
+                  </a:txBody>
+                  <a:tcPr>
+                    <a:solidFill>
+                      <a:schemeClr val="accent1">
+                        <a:lumMod val="60000"/>
+                        <a:lumOff val="40000"/>
+                      </a:schemeClr>
+                    </a:solidFill>
+                  </a:tcPr>
+                </a:tc>
+                <a:tc>
+                  <a:txBody>
+                    <a:bodyPr/>
+                    <a:lstStyle/>
+                    <a:p>
+                      <a:r>
+                        <a:rPr lang="en-US" dirty="0" smtClean="0"/>
+                        <a:t>3</a:t>
+                      </a:r>
+                      <a:endParaRPr lang="en-US" dirty="0"/>
+                    </a:p>
+                  </a:txBody>
+                  <a:tcPr>
+                    <a:solidFill>
+                      <a:schemeClr val="accent1">
+                        <a:lumMod val="60000"/>
+                        <a:lumOff val="40000"/>
+                      </a:schemeClr>
+                    </a:solidFill>
+                  </a:tcPr>
+                </a:tc>
+                <a:tc>
+                  <a:txBody>
+                    <a:bodyPr/>
+                    <a:lstStyle/>
+                    <a:p>
+                      <a:r>
+                        <a:rPr lang="en-US" dirty="0" smtClean="0"/>
+                        <a:t>4</a:t>
+                      </a:r>
+                      <a:endParaRPr lang="en-US" dirty="0"/>
+                    </a:p>
+                  </a:txBody>
+                  <a:tcPr>
+                    <a:solidFill>
+                      <a:schemeClr val="accent1">
+                        <a:lumMod val="60000"/>
+                        <a:lumOff val="40000"/>
+                      </a:schemeClr>
+                    </a:solidFill>
+                  </a:tcPr>
+                </a:tc>
+                <a:tc>
+                  <a:txBody>
+                    <a:bodyPr/>
+                    <a:lstStyle/>
+                    <a:p>
+                      <a:r>
+                        <a:rPr lang="en-US" dirty="0" smtClean="0"/>
+                        <a:t>5</a:t>
+                      </a:r>
+                      <a:endParaRPr lang="en-US" dirty="0"/>
+                    </a:p>
+                  </a:txBody>
+                  <a:tcPr>
+                    <a:solidFill>
+                      <a:schemeClr val="accent1">
+                        <a:lumMod val="60000"/>
+                        <a:lumOff val="40000"/>
+                      </a:schemeClr>
+                    </a:solidFill>
+                  </a:tcPr>
+                </a:tc>
+                <a:tc>
+                  <a:txBody>
+                    <a:bodyPr/>
+                    <a:lstStyle/>
+                    <a:p>
+                      <a:r>
+                        <a:rPr lang="en-US" dirty="0" smtClean="0"/>
+                        <a:t>2</a:t>
+                      </a:r>
+                      <a:endParaRPr lang="en-US" dirty="0"/>
+                    </a:p>
+                  </a:txBody>
+                  <a:tcPr>
+                    <a:solidFill>
+                      <a:schemeClr val="accent2">
+                        <a:lumMod val="60000"/>
+                        <a:lumOff val="40000"/>
+                      </a:schemeClr>
+                    </a:solidFill>
+                  </a:tcPr>
+                </a:tc>
+                <a:tc>
+                  <a:txBody>
+                    <a:bodyPr/>
+                    <a:lstStyle/>
+                    <a:p>
+                      <a:r>
+                        <a:rPr lang="en-US" dirty="0" smtClean="0"/>
+                        <a:t>6</a:t>
+                      </a:r>
+                      <a:endParaRPr lang="en-US" dirty="0"/>
+                    </a:p>
+                  </a:txBody>
+                  <a:tcPr>
+                    <a:noFill/>
+                  </a:tcPr>
+                </a:tc>
+                <a:extLst>
+                  <a:ext uri="{0D108BD9-81ED-4DB2-BD59-A6C34878D82A}">
+                    <a16:rowId xmlns:a16="http://schemas.microsoft.com/office/drawing/2014/main" val="1945647981"/>
+                  </a:ext>
+                </a:extLst>
+              </a:tr>
+            </a:tbl>
+          </a:graphicData>
+        </a:graphic>
+      </p:graphicFrame>
+      <p:graphicFrame>
+        <p:nvGraphicFramePr>
+          <p:cNvPr id="8" name="Table 7"/>
+          <p:cNvGraphicFramePr>
+            <a:graphicFrameLocks noGrp="1"/>
+          </p:cNvGraphicFramePr>
+          <p:nvPr>
+            <p:extLst/>
+          </p:nvPr>
+        </p:nvGraphicFramePr>
+        <p:xfrm>
+          <a:off x="479821" y="5230486"/>
+          <a:ext cx="4150782" cy="370840"/>
+        </p:xfrm>
+        <a:graphic>
+          <a:graphicData uri="http://schemas.openxmlformats.org/drawingml/2006/table">
+            <a:tbl>
+              <a:tblPr firstRow="1" bandRow="1">
+                <a:tableStyleId>{5940675A-B579-460E-94D1-54222C63F5DA}</a:tableStyleId>
+              </a:tblPr>
+              <a:tblGrid>
+                <a:gridCol w="691797">
+                  <a:extLst>
+                    <a:ext uri="{9D8B030D-6E8A-4147-A177-3AD203B41FA5}">
+                      <a16:colId xmlns:a16="http://schemas.microsoft.com/office/drawing/2014/main" val="1527688708"/>
+                    </a:ext>
+                  </a:extLst>
+                </a:gridCol>
+                <a:gridCol w="691797">
+                  <a:extLst>
+                    <a:ext uri="{9D8B030D-6E8A-4147-A177-3AD203B41FA5}">
+                      <a16:colId xmlns:a16="http://schemas.microsoft.com/office/drawing/2014/main" val="653538617"/>
+                    </a:ext>
+                  </a:extLst>
+                </a:gridCol>
+                <a:gridCol w="691797">
+                  <a:extLst>
+                    <a:ext uri="{9D8B030D-6E8A-4147-A177-3AD203B41FA5}">
+                      <a16:colId xmlns:a16="http://schemas.microsoft.com/office/drawing/2014/main" val="2554237578"/>
+                    </a:ext>
+                  </a:extLst>
+                </a:gridCol>
+                <a:gridCol w="691797">
+                  <a:extLst>
+                    <a:ext uri="{9D8B030D-6E8A-4147-A177-3AD203B41FA5}">
+                      <a16:colId xmlns:a16="http://schemas.microsoft.com/office/drawing/2014/main" val="2946659525"/>
+                    </a:ext>
+                  </a:extLst>
+                </a:gridCol>
+                <a:gridCol w="691797">
+                  <a:extLst>
+                    <a:ext uri="{9D8B030D-6E8A-4147-A177-3AD203B41FA5}">
+                      <a16:colId xmlns:a16="http://schemas.microsoft.com/office/drawing/2014/main" val="2043106262"/>
+                    </a:ext>
+                  </a:extLst>
+                </a:gridCol>
+                <a:gridCol w="691797">
+                  <a:extLst>
+                    <a:ext uri="{9D8B030D-6E8A-4147-A177-3AD203B41FA5}">
+                      <a16:colId xmlns:a16="http://schemas.microsoft.com/office/drawing/2014/main" val="3337530176"/>
+                    </a:ext>
+                  </a:extLst>
+                </a:gridCol>
+              </a:tblGrid>
+              <a:tr h="370840">
+                <a:tc>
+                  <a:txBody>
+                    <a:bodyPr/>
+                    <a:lstStyle/>
+                    <a:p>
+                      <a:r>
+                        <a:rPr lang="en-US" dirty="0" smtClean="0"/>
+                        <a:t>1</a:t>
+                      </a:r>
+                      <a:endParaRPr lang="en-US" dirty="0"/>
+                    </a:p>
+                  </a:txBody>
+                  <a:tcPr>
+                    <a:solidFill>
+                      <a:schemeClr val="accent1">
+                        <a:lumMod val="60000"/>
+                        <a:lumOff val="40000"/>
+                      </a:schemeClr>
+                    </a:solidFill>
+                  </a:tcPr>
+                </a:tc>
+                <a:tc>
+                  <a:txBody>
+                    <a:bodyPr/>
+                    <a:lstStyle/>
+                    <a:p>
+                      <a:r>
+                        <a:rPr lang="en-US" dirty="0" smtClean="0"/>
+                        <a:t>3</a:t>
+                      </a:r>
+                      <a:endParaRPr lang="en-US" dirty="0"/>
+                    </a:p>
+                  </a:txBody>
+                  <a:tcPr>
+                    <a:solidFill>
+                      <a:schemeClr val="accent1">
+                        <a:lumMod val="60000"/>
+                        <a:lumOff val="40000"/>
+                      </a:schemeClr>
+                    </a:solidFill>
+                  </a:tcPr>
+                </a:tc>
+                <a:tc>
+                  <a:txBody>
+                    <a:bodyPr/>
+                    <a:lstStyle/>
+                    <a:p>
+                      <a:r>
+                        <a:rPr lang="en-US" dirty="0" smtClean="0"/>
+                        <a:t>4</a:t>
+                      </a:r>
+                      <a:endParaRPr lang="en-US" dirty="0"/>
+                    </a:p>
+                  </a:txBody>
+                  <a:tcPr>
+                    <a:solidFill>
+                      <a:schemeClr val="accent1">
+                        <a:lumMod val="60000"/>
+                        <a:lumOff val="40000"/>
+                      </a:schemeClr>
+                    </a:solidFill>
+                  </a:tcPr>
+                </a:tc>
+                <a:tc>
+                  <a:txBody>
+                    <a:bodyPr/>
+                    <a:lstStyle/>
+                    <a:p>
+                      <a:r>
+                        <a:rPr lang="en-US" dirty="0" smtClean="0"/>
+                        <a:t>2</a:t>
+                      </a:r>
+                      <a:endParaRPr lang="en-US" dirty="0"/>
+                    </a:p>
+                  </a:txBody>
+                  <a:tcPr>
+                    <a:solidFill>
+                      <a:schemeClr val="accent2">
+                        <a:lumMod val="60000"/>
+                        <a:lumOff val="40000"/>
+                      </a:schemeClr>
+                    </a:solidFill>
+                  </a:tcPr>
+                </a:tc>
+                <a:tc>
+                  <a:txBody>
+                    <a:bodyPr/>
+                    <a:lstStyle/>
+                    <a:p>
+                      <a:r>
+                        <a:rPr lang="en-US" dirty="0" smtClean="0"/>
+                        <a:t>5</a:t>
+                      </a:r>
+                      <a:endParaRPr lang="en-US" dirty="0"/>
+                    </a:p>
+                  </a:txBody>
+                  <a:tcPr>
+                    <a:solidFill>
+                      <a:schemeClr val="accent1">
+                        <a:lumMod val="60000"/>
+                        <a:lumOff val="40000"/>
+                      </a:schemeClr>
+                    </a:solidFill>
+                  </a:tcPr>
+                </a:tc>
+                <a:tc>
+                  <a:txBody>
+                    <a:bodyPr/>
+                    <a:lstStyle/>
+                    <a:p>
+                      <a:r>
+                        <a:rPr lang="en-US" dirty="0" smtClean="0"/>
+                        <a:t>6</a:t>
+                      </a:r>
+                      <a:endParaRPr lang="en-US" dirty="0"/>
+                    </a:p>
+                  </a:txBody>
+                  <a:tcPr>
+                    <a:noFill/>
+                  </a:tcPr>
+                </a:tc>
+                <a:extLst>
+                  <a:ext uri="{0D108BD9-81ED-4DB2-BD59-A6C34878D82A}">
+                    <a16:rowId xmlns:a16="http://schemas.microsoft.com/office/drawing/2014/main" val="1945647981"/>
+                  </a:ext>
+                </a:extLst>
+              </a:tr>
+            </a:tbl>
+          </a:graphicData>
+        </a:graphic>
+      </p:graphicFrame>
+      <p:graphicFrame>
+        <p:nvGraphicFramePr>
+          <p:cNvPr id="9" name="Table 8"/>
+          <p:cNvGraphicFramePr>
+            <a:graphicFrameLocks noGrp="1"/>
+          </p:cNvGraphicFramePr>
+          <p:nvPr>
+            <p:extLst/>
+          </p:nvPr>
+        </p:nvGraphicFramePr>
+        <p:xfrm>
+          <a:off x="479821" y="6038447"/>
+          <a:ext cx="4150782" cy="370840"/>
+        </p:xfrm>
+        <a:graphic>
+          <a:graphicData uri="http://schemas.openxmlformats.org/drawingml/2006/table">
+            <a:tbl>
+              <a:tblPr firstRow="1" bandRow="1">
+                <a:tableStyleId>{5940675A-B579-460E-94D1-54222C63F5DA}</a:tableStyleId>
+              </a:tblPr>
+              <a:tblGrid>
+                <a:gridCol w="691797">
+                  <a:extLst>
+                    <a:ext uri="{9D8B030D-6E8A-4147-A177-3AD203B41FA5}">
+                      <a16:colId xmlns:a16="http://schemas.microsoft.com/office/drawing/2014/main" val="1527688708"/>
+                    </a:ext>
+                  </a:extLst>
+                </a:gridCol>
+                <a:gridCol w="691797">
+                  <a:extLst>
+                    <a:ext uri="{9D8B030D-6E8A-4147-A177-3AD203B41FA5}">
+                      <a16:colId xmlns:a16="http://schemas.microsoft.com/office/drawing/2014/main" val="653538617"/>
+                    </a:ext>
+                  </a:extLst>
+                </a:gridCol>
+                <a:gridCol w="691797">
+                  <a:extLst>
+                    <a:ext uri="{9D8B030D-6E8A-4147-A177-3AD203B41FA5}">
+                      <a16:colId xmlns:a16="http://schemas.microsoft.com/office/drawing/2014/main" val="2554237578"/>
+                    </a:ext>
+                  </a:extLst>
+                </a:gridCol>
+                <a:gridCol w="691797">
+                  <a:extLst>
+                    <a:ext uri="{9D8B030D-6E8A-4147-A177-3AD203B41FA5}">
+                      <a16:colId xmlns:a16="http://schemas.microsoft.com/office/drawing/2014/main" val="2946659525"/>
+                    </a:ext>
+                  </a:extLst>
+                </a:gridCol>
+                <a:gridCol w="691797">
+                  <a:extLst>
+                    <a:ext uri="{9D8B030D-6E8A-4147-A177-3AD203B41FA5}">
+                      <a16:colId xmlns:a16="http://schemas.microsoft.com/office/drawing/2014/main" val="2043106262"/>
+                    </a:ext>
+                  </a:extLst>
+                </a:gridCol>
+                <a:gridCol w="691797">
+                  <a:extLst>
+                    <a:ext uri="{9D8B030D-6E8A-4147-A177-3AD203B41FA5}">
+                      <a16:colId xmlns:a16="http://schemas.microsoft.com/office/drawing/2014/main" val="3337530176"/>
+                    </a:ext>
+                  </a:extLst>
+                </a:gridCol>
+              </a:tblGrid>
+              <a:tr h="370840">
+                <a:tc>
+                  <a:txBody>
+                    <a:bodyPr/>
+                    <a:lstStyle/>
+                    <a:p>
+                      <a:r>
+                        <a:rPr lang="en-US" dirty="0" smtClean="0"/>
+                        <a:t>1</a:t>
+                      </a:r>
+                      <a:endParaRPr lang="en-US" dirty="0"/>
+                    </a:p>
+                  </a:txBody>
+                  <a:tcPr>
+                    <a:solidFill>
+                      <a:schemeClr val="accent1">
+                        <a:lumMod val="60000"/>
+                        <a:lumOff val="40000"/>
+                      </a:schemeClr>
+                    </a:solidFill>
+                  </a:tcPr>
+                </a:tc>
+                <a:tc>
+                  <a:txBody>
+                    <a:bodyPr/>
+                    <a:lstStyle/>
+                    <a:p>
+                      <a:r>
+                        <a:rPr lang="en-US" dirty="0" smtClean="0"/>
+                        <a:t>3</a:t>
+                      </a:r>
+                      <a:endParaRPr lang="en-US" dirty="0"/>
+                    </a:p>
+                  </a:txBody>
+                  <a:tcPr>
+                    <a:solidFill>
+                      <a:schemeClr val="accent1">
+                        <a:lumMod val="60000"/>
+                        <a:lumOff val="40000"/>
+                      </a:schemeClr>
+                    </a:solidFill>
+                  </a:tcPr>
+                </a:tc>
+                <a:tc>
+                  <a:txBody>
+                    <a:bodyPr/>
+                    <a:lstStyle/>
+                    <a:p>
+                      <a:r>
+                        <a:rPr lang="en-US" dirty="0" smtClean="0"/>
+                        <a:t>2</a:t>
+                      </a:r>
+                      <a:endParaRPr lang="en-US" dirty="0"/>
+                    </a:p>
+                  </a:txBody>
+                  <a:tcPr>
+                    <a:solidFill>
+                      <a:schemeClr val="accent2">
+                        <a:lumMod val="60000"/>
+                        <a:lumOff val="40000"/>
+                      </a:schemeClr>
+                    </a:solidFill>
+                  </a:tcPr>
+                </a:tc>
+                <a:tc>
+                  <a:txBody>
+                    <a:bodyPr/>
+                    <a:lstStyle/>
+                    <a:p>
+                      <a:r>
+                        <a:rPr lang="en-US" dirty="0" smtClean="0"/>
+                        <a:t>4</a:t>
+                      </a:r>
+                      <a:endParaRPr lang="en-US" dirty="0"/>
+                    </a:p>
+                  </a:txBody>
+                  <a:tcPr>
+                    <a:solidFill>
+                      <a:schemeClr val="accent1">
+                        <a:lumMod val="60000"/>
+                        <a:lumOff val="40000"/>
+                      </a:schemeClr>
+                    </a:solidFill>
+                  </a:tcPr>
+                </a:tc>
+                <a:tc>
+                  <a:txBody>
+                    <a:bodyPr/>
+                    <a:lstStyle/>
+                    <a:p>
+                      <a:r>
+                        <a:rPr lang="en-US" dirty="0" smtClean="0"/>
+                        <a:t>5</a:t>
+                      </a:r>
+                      <a:endParaRPr lang="en-US" dirty="0"/>
+                    </a:p>
+                  </a:txBody>
+                  <a:tcPr>
+                    <a:solidFill>
+                      <a:schemeClr val="accent1">
+                        <a:lumMod val="60000"/>
+                        <a:lumOff val="40000"/>
+                      </a:schemeClr>
+                    </a:solidFill>
+                  </a:tcPr>
+                </a:tc>
+                <a:tc>
+                  <a:txBody>
+                    <a:bodyPr/>
+                    <a:lstStyle/>
+                    <a:p>
+                      <a:r>
+                        <a:rPr lang="en-US" dirty="0" smtClean="0"/>
+                        <a:t>6</a:t>
+                      </a:r>
+                      <a:endParaRPr lang="en-US" dirty="0"/>
+                    </a:p>
+                  </a:txBody>
+                  <a:tcPr>
+                    <a:noFill/>
+                  </a:tcPr>
+                </a:tc>
+                <a:extLst>
+                  <a:ext uri="{0D108BD9-81ED-4DB2-BD59-A6C34878D82A}">
+                    <a16:rowId xmlns:a16="http://schemas.microsoft.com/office/drawing/2014/main" val="1945647981"/>
+                  </a:ext>
+                </a:extLst>
+              </a:tr>
+            </a:tbl>
+          </a:graphicData>
+        </a:graphic>
+      </p:graphicFrame>
+      <p:graphicFrame>
+        <p:nvGraphicFramePr>
+          <p:cNvPr id="10" name="Table 9"/>
+          <p:cNvGraphicFramePr>
+            <a:graphicFrameLocks noGrp="1"/>
+          </p:cNvGraphicFramePr>
+          <p:nvPr>
+            <p:extLst/>
+          </p:nvPr>
+        </p:nvGraphicFramePr>
+        <p:xfrm>
+          <a:off x="479821" y="6852017"/>
+          <a:ext cx="4150782" cy="370840"/>
+        </p:xfrm>
+        <a:graphic>
+          <a:graphicData uri="http://schemas.openxmlformats.org/drawingml/2006/table">
+            <a:tbl>
+              <a:tblPr firstRow="1" bandRow="1">
+                <a:tableStyleId>{5940675A-B579-460E-94D1-54222C63F5DA}</a:tableStyleId>
+              </a:tblPr>
+              <a:tblGrid>
+                <a:gridCol w="691797">
+                  <a:extLst>
+                    <a:ext uri="{9D8B030D-6E8A-4147-A177-3AD203B41FA5}">
+                      <a16:colId xmlns:a16="http://schemas.microsoft.com/office/drawing/2014/main" val="1527688708"/>
+                    </a:ext>
+                  </a:extLst>
+                </a:gridCol>
+                <a:gridCol w="691797">
+                  <a:extLst>
+                    <a:ext uri="{9D8B030D-6E8A-4147-A177-3AD203B41FA5}">
+                      <a16:colId xmlns:a16="http://schemas.microsoft.com/office/drawing/2014/main" val="653538617"/>
+                    </a:ext>
+                  </a:extLst>
+                </a:gridCol>
+                <a:gridCol w="691797">
+                  <a:extLst>
+                    <a:ext uri="{9D8B030D-6E8A-4147-A177-3AD203B41FA5}">
+                      <a16:colId xmlns:a16="http://schemas.microsoft.com/office/drawing/2014/main" val="2554237578"/>
+                    </a:ext>
+                  </a:extLst>
+                </a:gridCol>
+                <a:gridCol w="691797">
+                  <a:extLst>
+                    <a:ext uri="{9D8B030D-6E8A-4147-A177-3AD203B41FA5}">
+                      <a16:colId xmlns:a16="http://schemas.microsoft.com/office/drawing/2014/main" val="2946659525"/>
+                    </a:ext>
+                  </a:extLst>
+                </a:gridCol>
+                <a:gridCol w="691797">
+                  <a:extLst>
+                    <a:ext uri="{9D8B030D-6E8A-4147-A177-3AD203B41FA5}">
+                      <a16:colId xmlns:a16="http://schemas.microsoft.com/office/drawing/2014/main" val="2043106262"/>
+                    </a:ext>
+                  </a:extLst>
+                </a:gridCol>
+                <a:gridCol w="691797">
+                  <a:extLst>
+                    <a:ext uri="{9D8B030D-6E8A-4147-A177-3AD203B41FA5}">
+                      <a16:colId xmlns:a16="http://schemas.microsoft.com/office/drawing/2014/main" val="3337530176"/>
+                    </a:ext>
+                  </a:extLst>
+                </a:gridCol>
+              </a:tblGrid>
+              <a:tr h="370840">
+                <a:tc>
+                  <a:txBody>
+                    <a:bodyPr/>
+                    <a:lstStyle/>
+                    <a:p>
+                      <a:r>
+                        <a:rPr lang="en-US" dirty="0" smtClean="0"/>
+                        <a:t>1</a:t>
+                      </a:r>
+                      <a:endParaRPr lang="en-US" dirty="0"/>
+                    </a:p>
+                  </a:txBody>
+                  <a:tcPr>
+                    <a:solidFill>
+                      <a:schemeClr val="accent1">
+                        <a:lumMod val="60000"/>
+                        <a:lumOff val="40000"/>
+                      </a:schemeClr>
+                    </a:solidFill>
+                  </a:tcPr>
+                </a:tc>
+                <a:tc>
+                  <a:txBody>
+                    <a:bodyPr/>
+                    <a:lstStyle/>
+                    <a:p>
+                      <a:r>
+                        <a:rPr lang="en-US" dirty="0" smtClean="0"/>
+                        <a:t>2</a:t>
+                      </a:r>
+                      <a:endParaRPr lang="en-US" dirty="0"/>
+                    </a:p>
+                  </a:txBody>
+                  <a:tcPr>
+                    <a:solidFill>
+                      <a:schemeClr val="accent2">
+                        <a:lumMod val="60000"/>
+                        <a:lumOff val="40000"/>
+                      </a:schemeClr>
+                    </a:solidFill>
+                  </a:tcPr>
+                </a:tc>
+                <a:tc>
+                  <a:txBody>
+                    <a:bodyPr/>
+                    <a:lstStyle/>
+                    <a:p>
+                      <a:r>
+                        <a:rPr lang="en-US" dirty="0" smtClean="0"/>
+                        <a:t>3</a:t>
+                      </a:r>
+                      <a:endParaRPr lang="en-US" dirty="0"/>
+                    </a:p>
+                  </a:txBody>
+                  <a:tcPr>
+                    <a:solidFill>
+                      <a:schemeClr val="accent1">
+                        <a:lumMod val="60000"/>
+                        <a:lumOff val="40000"/>
+                      </a:schemeClr>
+                    </a:solidFill>
+                  </a:tcPr>
+                </a:tc>
+                <a:tc>
+                  <a:txBody>
+                    <a:bodyPr/>
+                    <a:lstStyle/>
+                    <a:p>
+                      <a:r>
+                        <a:rPr lang="en-US" dirty="0" smtClean="0"/>
+                        <a:t>4</a:t>
+                      </a:r>
+                      <a:endParaRPr lang="en-US" dirty="0"/>
+                    </a:p>
+                  </a:txBody>
+                  <a:tcPr>
+                    <a:solidFill>
+                      <a:schemeClr val="accent1">
+                        <a:lumMod val="60000"/>
+                        <a:lumOff val="40000"/>
+                      </a:schemeClr>
+                    </a:solidFill>
+                  </a:tcPr>
+                </a:tc>
+                <a:tc>
+                  <a:txBody>
+                    <a:bodyPr/>
+                    <a:lstStyle/>
+                    <a:p>
+                      <a:r>
+                        <a:rPr lang="en-US" dirty="0" smtClean="0"/>
+                        <a:t>5</a:t>
+                      </a:r>
+                      <a:endParaRPr lang="en-US" dirty="0"/>
+                    </a:p>
+                  </a:txBody>
+                  <a:tcPr>
+                    <a:solidFill>
+                      <a:schemeClr val="accent1">
+                        <a:lumMod val="60000"/>
+                        <a:lumOff val="40000"/>
+                      </a:schemeClr>
+                    </a:solidFill>
+                  </a:tcPr>
+                </a:tc>
+                <a:tc>
+                  <a:txBody>
+                    <a:bodyPr/>
+                    <a:lstStyle/>
+                    <a:p>
+                      <a:r>
+                        <a:rPr lang="en-US" dirty="0" smtClean="0"/>
+                        <a:t>6</a:t>
+                      </a:r>
+                      <a:endParaRPr lang="en-US" dirty="0"/>
+                    </a:p>
+                  </a:txBody>
+                  <a:tcPr>
+                    <a:noFill/>
+                  </a:tcPr>
+                </a:tc>
+                <a:extLst>
+                  <a:ext uri="{0D108BD9-81ED-4DB2-BD59-A6C34878D82A}">
+                    <a16:rowId xmlns:a16="http://schemas.microsoft.com/office/drawing/2014/main" val="1945647981"/>
+                  </a:ext>
+                </a:extLst>
+              </a:tr>
+            </a:tbl>
+          </a:graphicData>
+        </a:graphic>
+      </p:graphicFrame>
+      <p:graphicFrame>
+        <p:nvGraphicFramePr>
+          <p:cNvPr id="11" name="Table 10"/>
+          <p:cNvGraphicFramePr>
+            <a:graphicFrameLocks noGrp="1"/>
+          </p:cNvGraphicFramePr>
+          <p:nvPr>
+            <p:extLst/>
+          </p:nvPr>
+        </p:nvGraphicFramePr>
+        <p:xfrm>
+          <a:off x="479821" y="7665587"/>
+          <a:ext cx="4150782" cy="370840"/>
+        </p:xfrm>
+        <a:graphic>
+          <a:graphicData uri="http://schemas.openxmlformats.org/drawingml/2006/table">
+            <a:tbl>
+              <a:tblPr firstRow="1" bandRow="1">
+                <a:tableStyleId>{5940675A-B579-460E-94D1-54222C63F5DA}</a:tableStyleId>
+              </a:tblPr>
+              <a:tblGrid>
+                <a:gridCol w="691797">
+                  <a:extLst>
+                    <a:ext uri="{9D8B030D-6E8A-4147-A177-3AD203B41FA5}">
+                      <a16:colId xmlns:a16="http://schemas.microsoft.com/office/drawing/2014/main" val="1527688708"/>
+                    </a:ext>
+                  </a:extLst>
+                </a:gridCol>
+                <a:gridCol w="691797">
+                  <a:extLst>
+                    <a:ext uri="{9D8B030D-6E8A-4147-A177-3AD203B41FA5}">
+                      <a16:colId xmlns:a16="http://schemas.microsoft.com/office/drawing/2014/main" val="653538617"/>
+                    </a:ext>
+                  </a:extLst>
+                </a:gridCol>
+                <a:gridCol w="691797">
+                  <a:extLst>
+                    <a:ext uri="{9D8B030D-6E8A-4147-A177-3AD203B41FA5}">
+                      <a16:colId xmlns:a16="http://schemas.microsoft.com/office/drawing/2014/main" val="2554237578"/>
+                    </a:ext>
+                  </a:extLst>
+                </a:gridCol>
+                <a:gridCol w="691797">
+                  <a:extLst>
+                    <a:ext uri="{9D8B030D-6E8A-4147-A177-3AD203B41FA5}">
+                      <a16:colId xmlns:a16="http://schemas.microsoft.com/office/drawing/2014/main" val="2946659525"/>
+                    </a:ext>
+                  </a:extLst>
+                </a:gridCol>
+                <a:gridCol w="691797">
+                  <a:extLst>
+                    <a:ext uri="{9D8B030D-6E8A-4147-A177-3AD203B41FA5}">
+                      <a16:colId xmlns:a16="http://schemas.microsoft.com/office/drawing/2014/main" val="2043106262"/>
+                    </a:ext>
+                  </a:extLst>
+                </a:gridCol>
+                <a:gridCol w="691797">
+                  <a:extLst>
+                    <a:ext uri="{9D8B030D-6E8A-4147-A177-3AD203B41FA5}">
+                      <a16:colId xmlns:a16="http://schemas.microsoft.com/office/drawing/2014/main" val="3337530176"/>
+                    </a:ext>
+                  </a:extLst>
+                </a:gridCol>
+              </a:tblGrid>
+              <a:tr h="370840">
+                <a:tc>
+                  <a:txBody>
+                    <a:bodyPr/>
+                    <a:lstStyle/>
+                    <a:p>
+                      <a:r>
+                        <a:rPr lang="en-US" dirty="0" smtClean="0"/>
+                        <a:t>1</a:t>
+                      </a:r>
+                      <a:endParaRPr lang="en-US" dirty="0"/>
+                    </a:p>
+                  </a:txBody>
+                  <a:tcPr>
+                    <a:solidFill>
+                      <a:schemeClr val="accent1">
+                        <a:lumMod val="60000"/>
+                        <a:lumOff val="40000"/>
+                      </a:schemeClr>
+                    </a:solidFill>
+                  </a:tcPr>
+                </a:tc>
+                <a:tc>
+                  <a:txBody>
+                    <a:bodyPr/>
+                    <a:lstStyle/>
+                    <a:p>
+                      <a:r>
+                        <a:rPr lang="en-US" dirty="0" smtClean="0"/>
+                        <a:t>2</a:t>
+                      </a:r>
+                      <a:endParaRPr lang="en-US" dirty="0"/>
+                    </a:p>
+                  </a:txBody>
+                  <a:tcPr>
+                    <a:solidFill>
+                      <a:schemeClr val="accent1">
+                        <a:lumMod val="60000"/>
+                        <a:lumOff val="40000"/>
+                      </a:schemeClr>
+                    </a:solidFill>
+                  </a:tcPr>
+                </a:tc>
+                <a:tc>
+                  <a:txBody>
+                    <a:bodyPr/>
+                    <a:lstStyle/>
+                    <a:p>
+                      <a:r>
+                        <a:rPr lang="en-US" dirty="0" smtClean="0"/>
+                        <a:t>3</a:t>
+                      </a:r>
+                      <a:endParaRPr lang="en-US" dirty="0"/>
+                    </a:p>
+                  </a:txBody>
+                  <a:tcPr>
+                    <a:solidFill>
+                      <a:schemeClr val="accent1">
+                        <a:lumMod val="60000"/>
+                        <a:lumOff val="40000"/>
+                      </a:schemeClr>
+                    </a:solidFill>
+                  </a:tcPr>
+                </a:tc>
+                <a:tc>
+                  <a:txBody>
+                    <a:bodyPr/>
+                    <a:lstStyle/>
+                    <a:p>
+                      <a:r>
+                        <a:rPr lang="en-US" dirty="0" smtClean="0"/>
+                        <a:t>4</a:t>
+                      </a:r>
+                      <a:endParaRPr lang="en-US" dirty="0"/>
+                    </a:p>
+                  </a:txBody>
+                  <a:tcPr>
+                    <a:solidFill>
+                      <a:schemeClr val="accent1">
+                        <a:lumMod val="60000"/>
+                        <a:lumOff val="40000"/>
+                      </a:schemeClr>
+                    </a:solidFill>
+                  </a:tcPr>
+                </a:tc>
+                <a:tc>
+                  <a:txBody>
+                    <a:bodyPr/>
+                    <a:lstStyle/>
+                    <a:p>
+                      <a:r>
+                        <a:rPr lang="en-US" dirty="0" smtClean="0"/>
+                        <a:t>5</a:t>
+                      </a:r>
+                      <a:endParaRPr lang="en-US" dirty="0"/>
+                    </a:p>
+                  </a:txBody>
+                  <a:tcPr>
+                    <a:solidFill>
+                      <a:schemeClr val="accent1">
+                        <a:lumMod val="60000"/>
+                        <a:lumOff val="40000"/>
+                      </a:schemeClr>
+                    </a:solidFill>
+                  </a:tcPr>
+                </a:tc>
+                <a:tc>
+                  <a:txBody>
+                    <a:bodyPr/>
+                    <a:lstStyle/>
+                    <a:p>
+                      <a:r>
+                        <a:rPr lang="en-US" dirty="0" smtClean="0"/>
+                        <a:t>6</a:t>
+                      </a:r>
+                      <a:endParaRPr lang="en-US" dirty="0"/>
+                    </a:p>
+                  </a:txBody>
+                  <a:tcPr>
+                    <a:solidFill>
+                      <a:schemeClr val="accent2">
+                        <a:lumMod val="60000"/>
+                        <a:lumOff val="40000"/>
+                      </a:schemeClr>
+                    </a:solidFill>
+                  </a:tcPr>
+                </a:tc>
+                <a:extLst>
+                  <a:ext uri="{0D108BD9-81ED-4DB2-BD59-A6C34878D82A}">
+                    <a16:rowId xmlns:a16="http://schemas.microsoft.com/office/drawing/2014/main" val="1945647981"/>
+                  </a:ext>
+                </a:extLst>
+              </a:tr>
+            </a:tbl>
+          </a:graphicData>
+        </a:graphic>
+      </p:graphicFrame>
+      <p:sp>
+        <p:nvSpPr>
+          <p:cNvPr id="12" name="TextBox 11"/>
+          <p:cNvSpPr txBox="1"/>
+          <p:nvPr/>
+        </p:nvSpPr>
+        <p:spPr>
+          <a:xfrm>
+            <a:off x="4908920" y="7566649"/>
+            <a:ext cx="751809" cy="533479"/>
+          </a:xfrm>
+          <a:prstGeom prst="rect">
+            <a:avLst/>
+          </a:prstGeom>
+          <a:noFill/>
+          <a:ln w="12700" cap="flat">
+            <a:noFill/>
+            <a:miter lim="400000"/>
+          </a:ln>
+          <a:effectLst/>
+          <a:sp3d/>
+        </p:spPr>
+        <p:style>
+          <a:lnRef idx="0">
+            <a:scrgbClr r="0" g="0" b="0"/>
+          </a:lnRef>
+          <a:fillRef idx="0">
+            <a:scrgbClr r="0" g="0" b="0"/>
+          </a:fillRef>
+          <a:effectRef idx="0">
+            <a:scrgbClr r="0" g="0" b="0"/>
+          </a:effectRef>
+          <a:fontRef idx="none"/>
+        </p:style>
+        <p:txBody>
+          <a:bodyPr rot="0" spcFirstLastPara="1" vertOverflow="overflow" horzOverflow="overflow" vert="horz" wrap="none" lIns="50800" tIns="50800" rIns="50800" bIns="50800" numCol="1" spcCol="38100" rtlCol="0" anchor="ctr">
+            <a:spAutoFit/>
+          </a:bodyPr>
+          <a:lstStyle/>
+          <a:p>
+            <a:pPr marL="0" marR="0" indent="0" algn="ctr" defTabSz="584200" rtl="0" fontAlgn="auto" latinLnBrk="0" hangingPunct="0">
+              <a:lnSpc>
+                <a:spcPct val="100000"/>
+              </a:lnSpc>
+              <a:spcBef>
+                <a:spcPts val="0"/>
+              </a:spcBef>
+              <a:spcAft>
+                <a:spcPts val="0"/>
+              </a:spcAft>
+              <a:buClrTx/>
+              <a:buSzTx/>
+              <a:buFontTx/>
+              <a:buNone/>
+              <a:tabLst/>
+            </a:pPr>
+            <a:r>
+              <a:rPr kumimoji="0" lang="en-US" sz="2800" b="0" i="0" u="none" strike="noStrike" cap="none" spc="0" normalizeH="0" baseline="0" dirty="0" smtClean="0">
+                <a:ln>
+                  <a:noFill/>
+                </a:ln>
+                <a:solidFill>
+                  <a:srgbClr val="000000"/>
+                </a:solidFill>
+                <a:effectLst/>
+                <a:uFillTx/>
+                <a:latin typeface="+mn-lt"/>
+                <a:ea typeface="+mn-ea"/>
+                <a:cs typeface="+mn-cs"/>
+                <a:sym typeface="Helvetica Light"/>
+              </a:rPr>
+              <a:t>K=6</a:t>
+            </a:r>
+            <a:endParaRPr kumimoji="0" lang="en-US" sz="2800" b="0" i="0" u="none" strike="noStrike" cap="none" spc="0" normalizeH="0" baseline="0" dirty="0">
+              <a:ln>
+                <a:noFill/>
+              </a:ln>
+              <a:solidFill>
+                <a:srgbClr val="000000"/>
+              </a:solidFill>
+              <a:effectLst/>
+              <a:uFillTx/>
+              <a:latin typeface="+mn-lt"/>
+              <a:ea typeface="+mn-ea"/>
+              <a:cs typeface="+mn-cs"/>
+              <a:sym typeface="Helvetica Light"/>
+            </a:endParaRPr>
+          </a:p>
+        </p:txBody>
+      </p:sp>
+      <p:sp>
+        <p:nvSpPr>
+          <p:cNvPr id="13" name="TextBox 12"/>
+          <p:cNvSpPr txBox="1"/>
+          <p:nvPr/>
+        </p:nvSpPr>
+        <p:spPr>
+          <a:xfrm>
+            <a:off x="4880313" y="5937558"/>
+            <a:ext cx="942566" cy="533479"/>
+          </a:xfrm>
+          <a:prstGeom prst="rect">
+            <a:avLst/>
+          </a:prstGeom>
+          <a:noFill/>
+          <a:ln w="12700" cap="flat">
+            <a:noFill/>
+            <a:miter lim="400000"/>
+          </a:ln>
+          <a:effectLst/>
+          <a:sp3d/>
+        </p:spPr>
+        <p:style>
+          <a:lnRef idx="0">
+            <a:scrgbClr r="0" g="0" b="0"/>
+          </a:lnRef>
+          <a:fillRef idx="0">
+            <a:scrgbClr r="0" g="0" b="0"/>
+          </a:fillRef>
+          <a:effectRef idx="0">
+            <a:scrgbClr r="0" g="0" b="0"/>
+          </a:effectRef>
+          <a:fontRef idx="none"/>
+        </p:style>
+        <p:txBody>
+          <a:bodyPr rot="0" spcFirstLastPara="1" vertOverflow="overflow" horzOverflow="overflow" vert="horz" wrap="none" lIns="50800" tIns="50800" rIns="50800" bIns="50800" numCol="1" spcCol="38100" rtlCol="0" anchor="ctr">
+            <a:spAutoFit/>
+          </a:bodyPr>
+          <a:lstStyle/>
+          <a:p>
+            <a:pPr marL="0" marR="0" indent="0" algn="ctr" defTabSz="584200" rtl="0" fontAlgn="auto" latinLnBrk="0" hangingPunct="0">
+              <a:lnSpc>
+                <a:spcPct val="100000"/>
+              </a:lnSpc>
+              <a:spcBef>
+                <a:spcPts val="0"/>
+              </a:spcBef>
+              <a:spcAft>
+                <a:spcPts val="0"/>
+              </a:spcAft>
+              <a:buClrTx/>
+              <a:buSzTx/>
+              <a:buFontTx/>
+              <a:buNone/>
+              <a:tabLst/>
+            </a:pPr>
+            <a:r>
+              <a:rPr kumimoji="0" lang="en-US" sz="2800" b="0" i="0" u="none" strike="noStrike" cap="none" spc="0" normalizeH="0" baseline="0" dirty="0" smtClean="0">
+                <a:ln>
+                  <a:noFill/>
+                </a:ln>
+                <a:solidFill>
+                  <a:srgbClr val="000000"/>
+                </a:solidFill>
+                <a:effectLst/>
+                <a:uFillTx/>
+                <a:latin typeface="+mn-lt"/>
+                <a:ea typeface="+mn-ea"/>
+                <a:cs typeface="+mn-cs"/>
+                <a:sym typeface="Helvetica Light"/>
+              </a:rPr>
+              <a:t>swap</a:t>
+            </a:r>
+            <a:endParaRPr kumimoji="0" lang="en-US" sz="2800" b="0" i="0" u="none" strike="noStrike" cap="none" spc="0" normalizeH="0" baseline="0" dirty="0">
+              <a:ln>
+                <a:noFill/>
+              </a:ln>
+              <a:solidFill>
+                <a:srgbClr val="000000"/>
+              </a:solidFill>
+              <a:effectLst/>
+              <a:uFillTx/>
+              <a:latin typeface="+mn-lt"/>
+              <a:ea typeface="+mn-ea"/>
+              <a:cs typeface="+mn-cs"/>
+              <a:sym typeface="Helvetica Light"/>
+            </a:endParaRPr>
+          </a:p>
+        </p:txBody>
+      </p:sp>
+      <p:sp>
+        <p:nvSpPr>
+          <p:cNvPr id="14" name="TextBox 13"/>
+          <p:cNvSpPr txBox="1"/>
+          <p:nvPr/>
+        </p:nvSpPr>
+        <p:spPr>
+          <a:xfrm>
+            <a:off x="4875548" y="2643964"/>
+            <a:ext cx="942566" cy="533479"/>
+          </a:xfrm>
+          <a:prstGeom prst="rect">
+            <a:avLst/>
+          </a:prstGeom>
+          <a:noFill/>
+          <a:ln w="12700" cap="flat">
+            <a:noFill/>
+            <a:miter lim="400000"/>
+          </a:ln>
+          <a:effectLst/>
+          <a:sp3d/>
+        </p:spPr>
+        <p:style>
+          <a:lnRef idx="0">
+            <a:scrgbClr r="0" g="0" b="0"/>
+          </a:lnRef>
+          <a:fillRef idx="0">
+            <a:scrgbClr r="0" g="0" b="0"/>
+          </a:fillRef>
+          <a:effectRef idx="0">
+            <a:scrgbClr r="0" g="0" b="0"/>
+          </a:effectRef>
+          <a:fontRef idx="none"/>
+        </p:style>
+        <p:txBody>
+          <a:bodyPr rot="0" spcFirstLastPara="1" vertOverflow="overflow" horzOverflow="overflow" vert="horz" wrap="none" lIns="50800" tIns="50800" rIns="50800" bIns="50800" numCol="1" spcCol="38100" rtlCol="0" anchor="ctr">
+            <a:spAutoFit/>
+          </a:bodyPr>
+          <a:lstStyle/>
+          <a:p>
+            <a:pPr marL="0" marR="0" indent="0" algn="ctr" defTabSz="584200" rtl="0" fontAlgn="auto" latinLnBrk="0" hangingPunct="0">
+              <a:lnSpc>
+                <a:spcPct val="100000"/>
+              </a:lnSpc>
+              <a:spcBef>
+                <a:spcPts val="0"/>
+              </a:spcBef>
+              <a:spcAft>
+                <a:spcPts val="0"/>
+              </a:spcAft>
+              <a:buClrTx/>
+              <a:buSzTx/>
+              <a:buFontTx/>
+              <a:buNone/>
+              <a:tabLst/>
+            </a:pPr>
+            <a:r>
+              <a:rPr kumimoji="0" lang="en-US" sz="2800" b="0" i="0" u="none" strike="noStrike" cap="none" spc="0" normalizeH="0" baseline="0" dirty="0" smtClean="0">
+                <a:ln>
+                  <a:noFill/>
+                </a:ln>
+                <a:solidFill>
+                  <a:srgbClr val="000000"/>
+                </a:solidFill>
+                <a:effectLst/>
+                <a:uFillTx/>
+                <a:latin typeface="+mn-lt"/>
+                <a:ea typeface="+mn-ea"/>
+                <a:cs typeface="+mn-cs"/>
+                <a:sym typeface="Helvetica Light"/>
+              </a:rPr>
+              <a:t>swap</a:t>
+            </a:r>
+            <a:endParaRPr kumimoji="0" lang="en-US" sz="2800" b="0" i="0" u="none" strike="noStrike" cap="none" spc="0" normalizeH="0" baseline="0" dirty="0">
+              <a:ln>
+                <a:noFill/>
+              </a:ln>
+              <a:solidFill>
+                <a:srgbClr val="000000"/>
+              </a:solidFill>
+              <a:effectLst/>
+              <a:uFillTx/>
+              <a:latin typeface="+mn-lt"/>
+              <a:ea typeface="+mn-ea"/>
+              <a:cs typeface="+mn-cs"/>
+              <a:sym typeface="Helvetica Light"/>
+            </a:endParaRPr>
+          </a:p>
+        </p:txBody>
+      </p:sp>
+      <p:sp>
+        <p:nvSpPr>
+          <p:cNvPr id="15" name="TextBox 14"/>
+          <p:cNvSpPr txBox="1"/>
+          <p:nvPr/>
+        </p:nvSpPr>
+        <p:spPr>
+          <a:xfrm>
+            <a:off x="4866310" y="3469727"/>
+            <a:ext cx="942566" cy="533479"/>
+          </a:xfrm>
+          <a:prstGeom prst="rect">
+            <a:avLst/>
+          </a:prstGeom>
+          <a:noFill/>
+          <a:ln w="12700" cap="flat">
+            <a:noFill/>
+            <a:miter lim="400000"/>
+          </a:ln>
+          <a:effectLst/>
+          <a:sp3d/>
+        </p:spPr>
+        <p:style>
+          <a:lnRef idx="0">
+            <a:scrgbClr r="0" g="0" b="0"/>
+          </a:lnRef>
+          <a:fillRef idx="0">
+            <a:scrgbClr r="0" g="0" b="0"/>
+          </a:fillRef>
+          <a:effectRef idx="0">
+            <a:scrgbClr r="0" g="0" b="0"/>
+          </a:effectRef>
+          <a:fontRef idx="none"/>
+        </p:style>
+        <p:txBody>
+          <a:bodyPr rot="0" spcFirstLastPara="1" vertOverflow="overflow" horzOverflow="overflow" vert="horz" wrap="none" lIns="50800" tIns="50800" rIns="50800" bIns="50800" numCol="1" spcCol="38100" rtlCol="0" anchor="ctr">
+            <a:spAutoFit/>
+          </a:bodyPr>
+          <a:lstStyle/>
+          <a:p>
+            <a:pPr marL="0" marR="0" indent="0" algn="ctr" defTabSz="584200" rtl="0" fontAlgn="auto" latinLnBrk="0" hangingPunct="0">
+              <a:lnSpc>
+                <a:spcPct val="100000"/>
+              </a:lnSpc>
+              <a:spcBef>
+                <a:spcPts val="0"/>
+              </a:spcBef>
+              <a:spcAft>
+                <a:spcPts val="0"/>
+              </a:spcAft>
+              <a:buClrTx/>
+              <a:buSzTx/>
+              <a:buFontTx/>
+              <a:buNone/>
+              <a:tabLst/>
+            </a:pPr>
+            <a:r>
+              <a:rPr kumimoji="0" lang="en-US" sz="2800" b="0" i="0" u="none" strike="noStrike" cap="none" spc="0" normalizeH="0" baseline="0" dirty="0" smtClean="0">
+                <a:ln>
+                  <a:noFill/>
+                </a:ln>
+                <a:solidFill>
+                  <a:srgbClr val="000000"/>
+                </a:solidFill>
+                <a:effectLst/>
+                <a:uFillTx/>
+                <a:latin typeface="+mn-lt"/>
+                <a:ea typeface="+mn-ea"/>
+                <a:cs typeface="+mn-cs"/>
+                <a:sym typeface="Helvetica Light"/>
+              </a:rPr>
+              <a:t>swap</a:t>
+            </a:r>
+            <a:endParaRPr kumimoji="0" lang="en-US" sz="2800" b="0" i="0" u="none" strike="noStrike" cap="none" spc="0" normalizeH="0" baseline="0" dirty="0">
+              <a:ln>
+                <a:noFill/>
+              </a:ln>
+              <a:solidFill>
+                <a:srgbClr val="000000"/>
+              </a:solidFill>
+              <a:effectLst/>
+              <a:uFillTx/>
+              <a:latin typeface="+mn-lt"/>
+              <a:ea typeface="+mn-ea"/>
+              <a:cs typeface="+mn-cs"/>
+              <a:sym typeface="Helvetica Light"/>
+            </a:endParaRPr>
+          </a:p>
+        </p:txBody>
+      </p:sp>
+      <p:sp>
+        <p:nvSpPr>
+          <p:cNvPr id="16" name="TextBox 15"/>
+          <p:cNvSpPr txBox="1"/>
+          <p:nvPr/>
+        </p:nvSpPr>
+        <p:spPr>
+          <a:xfrm>
+            <a:off x="4880313" y="5100283"/>
+            <a:ext cx="942566" cy="533479"/>
+          </a:xfrm>
+          <a:prstGeom prst="rect">
+            <a:avLst/>
+          </a:prstGeom>
+          <a:noFill/>
+          <a:ln w="12700" cap="flat">
+            <a:noFill/>
+            <a:miter lim="400000"/>
+          </a:ln>
+          <a:effectLst/>
+          <a:sp3d/>
+        </p:spPr>
+        <p:style>
+          <a:lnRef idx="0">
+            <a:scrgbClr r="0" g="0" b="0"/>
+          </a:lnRef>
+          <a:fillRef idx="0">
+            <a:scrgbClr r="0" g="0" b="0"/>
+          </a:fillRef>
+          <a:effectRef idx="0">
+            <a:scrgbClr r="0" g="0" b="0"/>
+          </a:effectRef>
+          <a:fontRef idx="none"/>
+        </p:style>
+        <p:txBody>
+          <a:bodyPr rot="0" spcFirstLastPara="1" vertOverflow="overflow" horzOverflow="overflow" vert="horz" wrap="none" lIns="50800" tIns="50800" rIns="50800" bIns="50800" numCol="1" spcCol="38100" rtlCol="0" anchor="ctr">
+            <a:spAutoFit/>
+          </a:bodyPr>
+          <a:lstStyle/>
+          <a:p>
+            <a:pPr marL="0" marR="0" indent="0" algn="ctr" defTabSz="584200" rtl="0" fontAlgn="auto" latinLnBrk="0" hangingPunct="0">
+              <a:lnSpc>
+                <a:spcPct val="100000"/>
+              </a:lnSpc>
+              <a:spcBef>
+                <a:spcPts val="0"/>
+              </a:spcBef>
+              <a:spcAft>
+                <a:spcPts val="0"/>
+              </a:spcAft>
+              <a:buClrTx/>
+              <a:buSzTx/>
+              <a:buFontTx/>
+              <a:buNone/>
+              <a:tabLst/>
+            </a:pPr>
+            <a:r>
+              <a:rPr kumimoji="0" lang="en-US" sz="2800" b="0" i="0" u="none" strike="noStrike" cap="none" spc="0" normalizeH="0" baseline="0" dirty="0" smtClean="0">
+                <a:ln>
+                  <a:noFill/>
+                </a:ln>
+                <a:solidFill>
+                  <a:srgbClr val="000000"/>
+                </a:solidFill>
+                <a:effectLst/>
+                <a:uFillTx/>
+                <a:latin typeface="+mn-lt"/>
+                <a:ea typeface="+mn-ea"/>
+                <a:cs typeface="+mn-cs"/>
+                <a:sym typeface="Helvetica Light"/>
+              </a:rPr>
+              <a:t>swap</a:t>
+            </a:r>
+            <a:endParaRPr kumimoji="0" lang="en-US" sz="2800" b="0" i="0" u="none" strike="noStrike" cap="none" spc="0" normalizeH="0" baseline="0" dirty="0">
+              <a:ln>
+                <a:noFill/>
+              </a:ln>
+              <a:solidFill>
+                <a:srgbClr val="000000"/>
+              </a:solidFill>
+              <a:effectLst/>
+              <a:uFillTx/>
+              <a:latin typeface="+mn-lt"/>
+              <a:ea typeface="+mn-ea"/>
+              <a:cs typeface="+mn-cs"/>
+              <a:sym typeface="Helvetica Light"/>
+            </a:endParaRPr>
+          </a:p>
+        </p:txBody>
+      </p:sp>
+      <p:sp>
+        <p:nvSpPr>
+          <p:cNvPr id="17" name="TextBox 16"/>
+          <p:cNvSpPr txBox="1"/>
+          <p:nvPr/>
+        </p:nvSpPr>
+        <p:spPr>
+          <a:xfrm>
+            <a:off x="4866310" y="6745600"/>
+            <a:ext cx="942566" cy="533479"/>
+          </a:xfrm>
+          <a:prstGeom prst="rect">
+            <a:avLst/>
+          </a:prstGeom>
+          <a:noFill/>
+          <a:ln w="12700" cap="flat">
+            <a:noFill/>
+            <a:miter lim="400000"/>
+          </a:ln>
+          <a:effectLst/>
+          <a:sp3d/>
+        </p:spPr>
+        <p:style>
+          <a:lnRef idx="0">
+            <a:scrgbClr r="0" g="0" b="0"/>
+          </a:lnRef>
+          <a:fillRef idx="0">
+            <a:scrgbClr r="0" g="0" b="0"/>
+          </a:fillRef>
+          <a:effectRef idx="0">
+            <a:scrgbClr r="0" g="0" b="0"/>
+          </a:effectRef>
+          <a:fontRef idx="none"/>
+        </p:style>
+        <p:txBody>
+          <a:bodyPr rot="0" spcFirstLastPara="1" vertOverflow="overflow" horzOverflow="overflow" vert="horz" wrap="none" lIns="50800" tIns="50800" rIns="50800" bIns="50800" numCol="1" spcCol="38100" rtlCol="0" anchor="ctr">
+            <a:spAutoFit/>
+          </a:bodyPr>
+          <a:lstStyle/>
+          <a:p>
+            <a:pPr marL="0" marR="0" indent="0" algn="ctr" defTabSz="584200" rtl="0" fontAlgn="auto" latinLnBrk="0" hangingPunct="0">
+              <a:lnSpc>
+                <a:spcPct val="100000"/>
+              </a:lnSpc>
+              <a:spcBef>
+                <a:spcPts val="0"/>
+              </a:spcBef>
+              <a:spcAft>
+                <a:spcPts val="0"/>
+              </a:spcAft>
+              <a:buClrTx/>
+              <a:buSzTx/>
+              <a:buFontTx/>
+              <a:buNone/>
+              <a:tabLst/>
+            </a:pPr>
+            <a:r>
+              <a:rPr kumimoji="0" lang="en-US" sz="2800" b="0" i="0" u="none" strike="noStrike" cap="none" spc="0" normalizeH="0" baseline="0" dirty="0" smtClean="0">
+                <a:ln>
+                  <a:noFill/>
+                </a:ln>
+                <a:solidFill>
+                  <a:srgbClr val="000000"/>
+                </a:solidFill>
+                <a:effectLst/>
+                <a:uFillTx/>
+                <a:latin typeface="+mn-lt"/>
+                <a:ea typeface="+mn-ea"/>
+                <a:cs typeface="+mn-cs"/>
+                <a:sym typeface="Helvetica Light"/>
+              </a:rPr>
+              <a:t>swap</a:t>
+            </a:r>
+            <a:endParaRPr kumimoji="0" lang="en-US" sz="2800" b="0" i="0" u="none" strike="noStrike" cap="none" spc="0" normalizeH="0" baseline="0" dirty="0">
+              <a:ln>
+                <a:noFill/>
+              </a:ln>
+              <a:solidFill>
+                <a:srgbClr val="000000"/>
+              </a:solidFill>
+              <a:effectLst/>
+              <a:uFillTx/>
+              <a:latin typeface="+mn-lt"/>
+              <a:ea typeface="+mn-ea"/>
+              <a:cs typeface="+mn-cs"/>
+              <a:sym typeface="Helvetica Light"/>
+            </a:endParaRPr>
+          </a:p>
+        </p:txBody>
+      </p:sp>
+      <p:sp>
+        <p:nvSpPr>
+          <p:cNvPr id="18" name="TextBox 17"/>
+          <p:cNvSpPr txBox="1"/>
+          <p:nvPr/>
+        </p:nvSpPr>
+        <p:spPr>
+          <a:xfrm>
+            <a:off x="4875548" y="1906026"/>
+            <a:ext cx="751809" cy="533479"/>
+          </a:xfrm>
+          <a:prstGeom prst="rect">
+            <a:avLst/>
+          </a:prstGeom>
+          <a:noFill/>
+          <a:ln w="12700" cap="flat">
+            <a:noFill/>
+            <a:miter lim="400000"/>
+          </a:ln>
+          <a:effectLst/>
+          <a:sp3d/>
+        </p:spPr>
+        <p:style>
+          <a:lnRef idx="0">
+            <a:scrgbClr r="0" g="0" b="0"/>
+          </a:lnRef>
+          <a:fillRef idx="0">
+            <a:scrgbClr r="0" g="0" b="0"/>
+          </a:fillRef>
+          <a:effectRef idx="0">
+            <a:scrgbClr r="0" g="0" b="0"/>
+          </a:effectRef>
+          <a:fontRef idx="none"/>
+        </p:style>
+        <p:txBody>
+          <a:bodyPr rot="0" spcFirstLastPara="1" vertOverflow="overflow" horzOverflow="overflow" vert="horz" wrap="none" lIns="50800" tIns="50800" rIns="50800" bIns="50800" numCol="1" spcCol="38100" rtlCol="0" anchor="ctr">
+            <a:spAutoFit/>
+          </a:bodyPr>
+          <a:lstStyle/>
+          <a:p>
+            <a:pPr marL="0" marR="0" indent="0" algn="ctr" defTabSz="584200" rtl="0" fontAlgn="auto" latinLnBrk="0" hangingPunct="0">
+              <a:lnSpc>
+                <a:spcPct val="100000"/>
+              </a:lnSpc>
+              <a:spcBef>
+                <a:spcPts val="0"/>
+              </a:spcBef>
+              <a:spcAft>
+                <a:spcPts val="0"/>
+              </a:spcAft>
+              <a:buClrTx/>
+              <a:buSzTx/>
+              <a:buFontTx/>
+              <a:buNone/>
+              <a:tabLst/>
+            </a:pPr>
+            <a:r>
+              <a:rPr kumimoji="0" lang="en-US" sz="2800" b="0" i="0" u="none" strike="noStrike" cap="none" spc="0" normalizeH="0" baseline="0" dirty="0" smtClean="0">
+                <a:ln>
+                  <a:noFill/>
+                </a:ln>
+                <a:solidFill>
+                  <a:srgbClr val="000000"/>
+                </a:solidFill>
+                <a:effectLst/>
+                <a:uFillTx/>
+                <a:latin typeface="+mn-lt"/>
+                <a:ea typeface="+mn-ea"/>
+                <a:cs typeface="+mn-cs"/>
+                <a:sym typeface="Helvetica Light"/>
+              </a:rPr>
+              <a:t>K=4</a:t>
+            </a:r>
+            <a:endParaRPr kumimoji="0" lang="en-US" sz="2800" b="0" i="0" u="none" strike="noStrike" cap="none" spc="0" normalizeH="0" baseline="0" dirty="0">
+              <a:ln>
+                <a:noFill/>
+              </a:ln>
+              <a:solidFill>
+                <a:srgbClr val="000000"/>
+              </a:solidFill>
+              <a:effectLst/>
+              <a:uFillTx/>
+              <a:latin typeface="+mn-lt"/>
+              <a:ea typeface="+mn-ea"/>
+              <a:cs typeface="+mn-cs"/>
+              <a:sym typeface="Helvetica Light"/>
+            </a:endParaRPr>
+          </a:p>
+        </p:txBody>
+      </p:sp>
+      <p:sp>
+        <p:nvSpPr>
+          <p:cNvPr id="19" name="TextBox 18"/>
+          <p:cNvSpPr txBox="1"/>
+          <p:nvPr/>
+        </p:nvSpPr>
+        <p:spPr>
+          <a:xfrm>
+            <a:off x="4905266" y="4295491"/>
+            <a:ext cx="751809" cy="533479"/>
+          </a:xfrm>
+          <a:prstGeom prst="rect">
+            <a:avLst/>
+          </a:prstGeom>
+          <a:noFill/>
+          <a:ln w="12700" cap="flat">
+            <a:noFill/>
+            <a:miter lim="400000"/>
+          </a:ln>
+          <a:effectLst/>
+          <a:sp3d/>
+        </p:spPr>
+        <p:style>
+          <a:lnRef idx="0">
+            <a:scrgbClr r="0" g="0" b="0"/>
+          </a:lnRef>
+          <a:fillRef idx="0">
+            <a:scrgbClr r="0" g="0" b="0"/>
+          </a:fillRef>
+          <a:effectRef idx="0">
+            <a:scrgbClr r="0" g="0" b="0"/>
+          </a:effectRef>
+          <a:fontRef idx="none"/>
+        </p:style>
+        <p:txBody>
+          <a:bodyPr rot="0" spcFirstLastPara="1" vertOverflow="overflow" horzOverflow="overflow" vert="horz" wrap="none" lIns="50800" tIns="50800" rIns="50800" bIns="50800" numCol="1" spcCol="38100" rtlCol="0" anchor="ctr">
+            <a:spAutoFit/>
+          </a:bodyPr>
+          <a:lstStyle/>
+          <a:p>
+            <a:pPr marL="0" marR="0" indent="0" algn="ctr" defTabSz="584200" rtl="0" fontAlgn="auto" latinLnBrk="0" hangingPunct="0">
+              <a:lnSpc>
+                <a:spcPct val="100000"/>
+              </a:lnSpc>
+              <a:spcBef>
+                <a:spcPts val="0"/>
+              </a:spcBef>
+              <a:spcAft>
+                <a:spcPts val="0"/>
+              </a:spcAft>
+              <a:buClrTx/>
+              <a:buSzTx/>
+              <a:buFontTx/>
+              <a:buNone/>
+              <a:tabLst/>
+            </a:pPr>
+            <a:r>
+              <a:rPr kumimoji="0" lang="en-US" sz="2800" b="0" i="0" u="none" strike="noStrike" cap="none" spc="0" normalizeH="0" baseline="0" dirty="0" smtClean="0">
+                <a:ln>
+                  <a:noFill/>
+                </a:ln>
+                <a:solidFill>
+                  <a:srgbClr val="000000"/>
+                </a:solidFill>
+                <a:effectLst/>
+                <a:uFillTx/>
+                <a:latin typeface="+mn-lt"/>
+                <a:ea typeface="+mn-ea"/>
+                <a:cs typeface="+mn-cs"/>
+                <a:sym typeface="Helvetica Light"/>
+              </a:rPr>
+              <a:t>K=5</a:t>
+            </a:r>
+            <a:endParaRPr kumimoji="0" lang="en-US" sz="2800" b="0" i="0" u="none" strike="noStrike" cap="none" spc="0" normalizeH="0" baseline="0" dirty="0">
+              <a:ln>
+                <a:noFill/>
+              </a:ln>
+              <a:solidFill>
+                <a:srgbClr val="000000"/>
+              </a:solidFill>
+              <a:effectLst/>
+              <a:uFillTx/>
+              <a:latin typeface="+mn-lt"/>
+              <a:ea typeface="+mn-ea"/>
+              <a:cs typeface="+mn-cs"/>
+              <a:sym typeface="Helvetica Light"/>
+            </a:endParaRPr>
+          </a:p>
+        </p:txBody>
+      </p:sp>
+      <mc:AlternateContent xmlns:mc="http://schemas.openxmlformats.org/markup-compatibility/2006" xmlns:a14="http://schemas.microsoft.com/office/drawing/2010/main">
+        <mc:Choice Requires="a14">
+          <p:sp>
+            <p:nvSpPr>
+              <p:cNvPr id="20" name="TextBox 19"/>
+              <p:cNvSpPr txBox="1"/>
+              <p:nvPr/>
+            </p:nvSpPr>
+            <p:spPr>
+              <a:xfrm>
+                <a:off x="6485641" y="1850617"/>
+                <a:ext cx="6174558" cy="6209136"/>
+              </a:xfrm>
+              <a:prstGeom prst="rect">
+                <a:avLst/>
+              </a:prstGeom>
+              <a:noFill/>
+              <a:ln w="12700" cap="flat">
+                <a:noFill/>
+                <a:miter lim="400000"/>
+              </a:ln>
+              <a:effectLst/>
+              <a:sp3d/>
+            </p:spPr>
+            <p:style>
+              <a:lnRef idx="0">
+                <a:scrgbClr r="0" g="0" b="0"/>
+              </a:lnRef>
+              <a:fillRef idx="0">
+                <a:scrgbClr r="0" g="0" b="0"/>
+              </a:fillRef>
+              <a:effectRef idx="0">
+                <a:scrgbClr r="0" g="0" b="0"/>
+              </a:effectRef>
+              <a:fontRef idx="none"/>
+            </p:style>
+            <p:txBody>
+              <a:bodyPr rot="0" spcFirstLastPara="1" vertOverflow="overflow" horzOverflow="overflow" vert="horz" wrap="square" lIns="50800" tIns="50800" rIns="50800" bIns="50800" numCol="1" spcCol="38100" rtlCol="0" anchor="ctr">
+                <a:spAutoFit/>
+              </a:bodyPr>
+              <a:lstStyle/>
+              <a:p>
+                <a:pPr marL="571500" marR="0" indent="-571500" algn="l" defTabSz="584200" rtl="0" fontAlgn="auto" latinLnBrk="0" hangingPunct="0">
+                  <a:lnSpc>
+                    <a:spcPct val="100000"/>
+                  </a:lnSpc>
+                  <a:spcBef>
+                    <a:spcPts val="0"/>
+                  </a:spcBef>
+                  <a:spcAft>
+                    <a:spcPts val="0"/>
+                  </a:spcAft>
+                  <a:buClrTx/>
+                  <a:buSzTx/>
+                  <a:buFont typeface="Arial" panose="020B0604020202020204" pitchFamily="34" charset="0"/>
+                  <a:buChar char="•"/>
+                  <a:tabLst/>
+                </a:pPr>
+                <a:r>
+                  <a:rPr kumimoji="0" lang="en-US" sz="3600" b="0" i="0" u="none" strike="noStrike" cap="none" spc="0" normalizeH="0" baseline="0" dirty="0" smtClean="0">
+                    <a:ln>
+                      <a:noFill/>
+                    </a:ln>
+                    <a:solidFill>
+                      <a:srgbClr val="000000"/>
+                    </a:solidFill>
+                    <a:effectLst/>
+                    <a:uFillTx/>
+                    <a:sym typeface="Helvetica Light"/>
+                  </a:rPr>
+                  <a:t>Best case:</a:t>
+                </a:r>
+                <a:r>
+                  <a:rPr kumimoji="0" lang="en-US" sz="3600" b="0" i="0" u="none" strike="noStrike" cap="none" spc="0" normalizeH="0" dirty="0" smtClean="0">
+                    <a:ln>
+                      <a:noFill/>
+                    </a:ln>
+                    <a:solidFill>
+                      <a:srgbClr val="000000"/>
+                    </a:solidFill>
+                    <a:effectLst/>
+                    <a:uFillTx/>
+                    <a:sym typeface="Helvetica Light"/>
+                  </a:rPr>
+                  <a:t> already sorted, e.g., 1-2-3-4-5-6, need to do N-1 comparisons, so </a:t>
+                </a:r>
+                <a:r>
+                  <a:rPr kumimoji="0" lang="el-GR" sz="3600" b="0" i="0" u="none" strike="noStrike" cap="none" spc="0" normalizeH="0" dirty="0" smtClean="0">
+                    <a:ln>
+                      <a:noFill/>
+                    </a:ln>
+                    <a:solidFill>
+                      <a:srgbClr val="000000"/>
+                    </a:solidFill>
+                    <a:effectLst/>
+                    <a:uFillTx/>
+                    <a:cs typeface="Times New Roman" panose="02020603050405020304" pitchFamily="18" charset="0"/>
+                    <a:sym typeface="Helvetica Light"/>
+                  </a:rPr>
+                  <a:t>Ω</a:t>
+                </a:r>
+                <a:r>
+                  <a:rPr kumimoji="0" lang="en-US" sz="3600" b="0" i="0" u="none" strike="noStrike" cap="none" spc="0" normalizeH="0" dirty="0" smtClean="0">
+                    <a:ln>
+                      <a:noFill/>
+                    </a:ln>
+                    <a:solidFill>
+                      <a:srgbClr val="000000"/>
+                    </a:solidFill>
+                    <a:effectLst/>
+                    <a:uFillTx/>
+                    <a:cs typeface="Times New Roman" panose="02020603050405020304" pitchFamily="18" charset="0"/>
+                    <a:sym typeface="Helvetica Light"/>
+                  </a:rPr>
+                  <a:t>(N)</a:t>
+                </a:r>
+              </a:p>
+              <a:p>
+                <a:pPr marL="571500" marR="0" indent="-571500" algn="l" defTabSz="584200" rtl="0" fontAlgn="auto" latinLnBrk="0" hangingPunct="0">
+                  <a:lnSpc>
+                    <a:spcPct val="100000"/>
+                  </a:lnSpc>
+                  <a:spcBef>
+                    <a:spcPts val="0"/>
+                  </a:spcBef>
+                  <a:spcAft>
+                    <a:spcPts val="0"/>
+                  </a:spcAft>
+                  <a:buClrTx/>
+                  <a:buSzTx/>
+                  <a:buFont typeface="Arial" panose="020B0604020202020204" pitchFamily="34" charset="0"/>
+                  <a:buChar char="•"/>
+                  <a:tabLst/>
+                </a:pPr>
+                <a:endParaRPr kumimoji="0" lang="en-US" sz="3600" b="0" i="0" u="none" strike="noStrike" cap="none" spc="0" normalizeH="0" dirty="0" smtClean="0">
+                  <a:ln>
+                    <a:noFill/>
+                  </a:ln>
+                  <a:solidFill>
+                    <a:srgbClr val="000000"/>
+                  </a:solidFill>
+                  <a:effectLst/>
+                  <a:uFillTx/>
+                  <a:cs typeface="Times New Roman" panose="02020603050405020304" pitchFamily="18" charset="0"/>
+                  <a:sym typeface="Helvetica Light"/>
+                </a:endParaRPr>
+              </a:p>
+              <a:p>
+                <a:pPr marL="571500" marR="0" indent="-571500" algn="l" defTabSz="584200" rtl="0" fontAlgn="auto" latinLnBrk="0" hangingPunct="0">
+                  <a:lnSpc>
+                    <a:spcPct val="100000"/>
+                  </a:lnSpc>
+                  <a:spcBef>
+                    <a:spcPts val="0"/>
+                  </a:spcBef>
+                  <a:spcAft>
+                    <a:spcPts val="0"/>
+                  </a:spcAft>
+                  <a:buClrTx/>
+                  <a:buSzTx/>
+                  <a:buFont typeface="Arial" panose="020B0604020202020204" pitchFamily="34" charset="0"/>
+                  <a:buChar char="•"/>
+                  <a:tabLst/>
+                </a:pPr>
+                <a:r>
+                  <a:rPr lang="en-US" baseline="0" dirty="0" smtClean="0">
+                    <a:cs typeface="Times New Roman" panose="02020603050405020304" pitchFamily="18" charset="0"/>
+                  </a:rPr>
+                  <a:t>Worst case:</a:t>
+                </a:r>
+                <a:r>
+                  <a:rPr lang="en-US" dirty="0" smtClean="0">
+                    <a:cs typeface="Times New Roman" panose="02020603050405020304" pitchFamily="18" charset="0"/>
+                  </a:rPr>
+                  <a:t> opposite order, </a:t>
+                </a:r>
+                <a:r>
+                  <a:rPr lang="en-US" dirty="0" err="1" smtClean="0">
+                    <a:cs typeface="Times New Roman" panose="02020603050405020304" pitchFamily="18" charset="0"/>
+                  </a:rPr>
+                  <a:t>e.g</a:t>
+                </a:r>
+                <a:r>
+                  <a:rPr lang="en-US" dirty="0" smtClean="0">
+                    <a:cs typeface="Times New Roman" panose="02020603050405020304" pitchFamily="18" charset="0"/>
+                  </a:rPr>
+                  <a:t>, 6-5-4-3-2-1, each element needs to be compared and swapped with all previous K ones, so O(</a:t>
+                </a:r>
+                <a14:m>
+                  <m:oMath xmlns:m="http://schemas.openxmlformats.org/officeDocument/2006/math">
+                    <m:sSup>
+                      <m:sSupPr>
+                        <m:ctrlPr>
+                          <a:rPr lang="en-US" i="1" smtClean="0">
+                            <a:latin typeface="Cambria Math" panose="02040503050406030204" pitchFamily="18" charset="0"/>
+                            <a:cs typeface="Times New Roman" panose="02020603050405020304" pitchFamily="18" charset="0"/>
+                          </a:rPr>
+                        </m:ctrlPr>
+                      </m:sSupPr>
+                      <m:e>
+                        <m:r>
+                          <a:rPr lang="en-US" b="0" i="1" smtClean="0">
+                            <a:latin typeface="Cambria Math" panose="02040503050406030204" pitchFamily="18" charset="0"/>
+                            <a:cs typeface="Times New Roman" panose="02020603050405020304" pitchFamily="18" charset="0"/>
+                          </a:rPr>
+                          <m:t>𝑁</m:t>
+                        </m:r>
+                      </m:e>
+                      <m:sup>
+                        <m:r>
+                          <a:rPr lang="en-US" i="1" smtClean="0">
+                            <a:latin typeface="Cambria Math" panose="02040503050406030204" pitchFamily="18" charset="0"/>
+                            <a:cs typeface="Times New Roman" panose="02020603050405020304" pitchFamily="18" charset="0"/>
+                          </a:rPr>
+                          <m:t>2</m:t>
+                        </m:r>
+                      </m:sup>
+                    </m:sSup>
+                  </m:oMath>
+                </a14:m>
+                <a:r>
+                  <a:rPr lang="en-US" dirty="0" smtClean="0">
+                    <a:cs typeface="Times New Roman" panose="02020603050405020304" pitchFamily="18" charset="0"/>
+                  </a:rPr>
+                  <a:t>)</a:t>
+                </a:r>
+                <a:endParaRPr kumimoji="0" lang="en-US" sz="3600" b="0" i="0" u="none" strike="noStrike" cap="none" spc="0" normalizeH="0" baseline="0" dirty="0">
+                  <a:ln>
+                    <a:noFill/>
+                  </a:ln>
+                  <a:solidFill>
+                    <a:srgbClr val="000000"/>
+                  </a:solidFill>
+                  <a:effectLst/>
+                  <a:uFillTx/>
+                  <a:sym typeface="Helvetica Light"/>
+                </a:endParaRPr>
+              </a:p>
+            </p:txBody>
+          </p:sp>
+        </mc:Choice>
+        <mc:Fallback xmlns="">
+          <p:sp>
+            <p:nvSpPr>
+              <p:cNvPr id="20" name="TextBox 19"/>
+              <p:cNvSpPr txBox="1">
+                <a:spLocks noRot="1" noChangeAspect="1" noMove="1" noResize="1" noEditPoints="1" noAdjustHandles="1" noChangeArrowheads="1" noChangeShapeType="1" noTextEdit="1"/>
+              </p:cNvSpPr>
+              <p:nvPr/>
+            </p:nvSpPr>
+            <p:spPr>
+              <a:xfrm>
+                <a:off x="6485641" y="1850617"/>
+                <a:ext cx="6174558" cy="6209136"/>
+              </a:xfrm>
+              <a:prstGeom prst="rect">
+                <a:avLst/>
+              </a:prstGeom>
+              <a:blipFill>
+                <a:blip r:embed="rId2"/>
+                <a:stretch>
+                  <a:fillRect l="-3356" t="-982" r="-2172" b="-3143"/>
+                </a:stretch>
+              </a:blipFill>
+              <a:ln w="12700" cap="flat">
+                <a:noFill/>
+                <a:miter lim="400000"/>
+              </a:ln>
+              <a:effectLst/>
+            </p:spPr>
+            <p:txBody>
+              <a:bodyPr/>
+              <a:lstStyle/>
+              <a:p>
+                <a:r>
+                  <a:rPr lang="en-US">
+                    <a:noFill/>
+                  </a:rPr>
+                  <a:t> </a:t>
+                </a:r>
+              </a:p>
+            </p:txBody>
+          </p:sp>
+        </mc:Fallback>
+      </mc:AlternateContent>
+    </p:spTree>
+    <p:extLst>
+      <p:ext uri="{BB962C8B-B14F-4D97-AF65-F5344CB8AC3E}">
+        <p14:creationId xmlns:p14="http://schemas.microsoft.com/office/powerpoint/2010/main" val="4109540108"/>
+      </p:ext>
+    </p:extLst>
+  </p:cSld>
+  <p:clrMapOvr>
+    <a:masterClrMapping/>
+  </p:clrMapOvr>
+  <p:transition spd="med"/>
+  <p:timing>
+    <p:tnLst>
+      <p:par>
+        <p:cTn id="1" dur="indefinite" restart="never" nodeType="tmRoot"/>
+      </p:par>
+    </p:tnLst>
+  </p:timing>
+</p:sld>
+</file>
+
+<file path=ppt/slides/slide49.xml><?xml version="1.0" encoding="utf-8"?>
 <p:sld xmlns:a="http://schemas.openxmlformats.org/drawingml/2006/main" xmlns:r="http://schemas.openxmlformats.org/officeDocument/2006/relationships" xmlns:p="http://schemas.openxmlformats.org/presentationml/2006/main">
   <p:cSld>
     <p:spTree>

</xml_diff>

<commit_message>
clarification on book runtime notation
</commit_message>
<xml_diff>
--- a/docs/slides/03/03_analysis_sort.pptx
+++ b/docs/slides/03/03_analysis_sort.pptx
@@ -2329,7 +2329,7 @@
           </a:ln>
           <a:extLst>
             <a:ext uri="{C572A759-6A51-4108-AA02-DFA0A04FC94B}">
-              <ma14:wrappingTextBoxFlag xmlns="" xmlns:ma14="http://schemas.microsoft.com/office/mac/drawingml/2011/main" val="1"/>
+              <ma14:wrappingTextBoxFlag xmlns:ma14="http://schemas.microsoft.com/office/mac/drawingml/2011/main" xmlns="" val="1"/>
             </a:ext>
           </a:extLst>
         </p:spPr>
@@ -2368,7 +2368,7 @@
           </a:ln>
           <a:extLst>
             <a:ext uri="{C572A759-6A51-4108-AA02-DFA0A04FC94B}">
-              <ma14:wrappingTextBoxFlag xmlns="" xmlns:ma14="http://schemas.microsoft.com/office/mac/drawingml/2011/main" val="1"/>
+              <ma14:wrappingTextBoxFlag xmlns:ma14="http://schemas.microsoft.com/office/mac/drawingml/2011/main" xmlns="" val="1"/>
             </a:ext>
           </a:extLst>
         </p:spPr>
@@ -8074,7 +8074,7 @@
               </a:ln>
               <a:extLst>
                 <a:ext uri="{C572A759-6A51-4108-AA02-DFA0A04FC94B}">
-                  <ma14:wrappingTextBoxFlag xmlns="" xmlns:ma14="http://schemas.microsoft.com/office/mac/drawingml/2011/main" val="1"/>
+                  <ma14:wrappingTextBoxFlag xmlns:ma14="http://schemas.microsoft.com/office/mac/drawingml/2011/main" xmlns="" val="1"/>
                 </a:ext>
               </a:extLst>
             </p:spPr>
@@ -18596,7 +18596,7 @@
           </a:ln>
           <a:extLst>
             <a:ext uri="{C572A759-6A51-4108-AA02-DFA0A04FC94B}">
-              <ma14:wrappingTextBoxFlag xmlns="" xmlns:ma14="http://schemas.microsoft.com/office/mac/drawingml/2011/main" val="1"/>
+              <ma14:wrappingTextBoxFlag xmlns:ma14="http://schemas.microsoft.com/office/mac/drawingml/2011/main" xmlns="" val="1"/>
             </a:ext>
           </a:extLst>
         </p:spPr>
@@ -29026,8 +29026,8 @@
           </a:p>
         </p:txBody>
       </p:sp>
-      <mc:AlternateContent xmlns:mc="http://schemas.openxmlformats.org/markup-compatibility/2006">
-        <mc:Choice xmlns:a14="http://schemas.microsoft.com/office/drawing/2010/main" Requires="a14">
+      <mc:AlternateContent xmlns:mc="http://schemas.openxmlformats.org/markup-compatibility/2006" xmlns:a14="http://schemas.microsoft.com/office/drawing/2010/main">
+        <mc:Choice Requires="a14">
           <p:sp>
             <p:nvSpPr>
               <p:cNvPr id="3" name="Text Placeholder 2">
@@ -29148,7 +29148,7 @@
             </p:txBody>
           </p:sp>
         </mc:Choice>
-        <mc:Fallback>
+        <mc:Fallback xmlns="">
           <p:sp>
             <p:nvSpPr>
               <p:cNvPr id="3" name="Text Placeholder 2">
@@ -29245,58 +29245,148 @@
           </a:p>
         </p:txBody>
       </p:sp>
-      <p:sp>
-        <p:nvSpPr>
-          <p:cNvPr id="3" name="Text Placeholder 2"/>
-          <p:cNvSpPr>
-            <a:spLocks noGrp="1"/>
-          </p:cNvSpPr>
-          <p:nvPr>
-            <p:ph type="body" idx="1"/>
-          </p:nvPr>
-        </p:nvSpPr>
-        <p:spPr/>
-        <p:txBody>
-          <a:bodyPr/>
-          <a:lstStyle/>
-          <a:p>
-            <a:r>
-              <a:rPr lang="en-US" dirty="0"/>
-              <a:t>Study Book Chapter 1.4 and 2.1</a:t>
-            </a:r>
-          </a:p>
-          <a:p>
-            <a:r>
-              <a:rPr lang="en-US" dirty="0"/>
-              <a:t>Study code in the </a:t>
-            </a:r>
-            <a:r>
-              <a:rPr lang="en-US" i="1" dirty="0"/>
-              <a:t>org.pg4200.les03</a:t>
-            </a:r>
-            <a:r>
-              <a:rPr lang="en-US" dirty="0"/>
-              <a:t> package</a:t>
-            </a:r>
-          </a:p>
-          <a:p>
-            <a:r>
-              <a:rPr lang="en-US" dirty="0"/>
-              <a:t>Do exercises in </a:t>
-            </a:r>
-            <a:r>
-              <a:rPr lang="en-US" i="1" dirty="0"/>
-              <a:t>exercises/ex03</a:t>
-            </a:r>
-          </a:p>
-          <a:p>
-            <a:r>
-              <a:rPr lang="en-US" dirty="0"/>
-              <a:t>Extra: do exercises in the book</a:t>
-            </a:r>
-          </a:p>
-        </p:txBody>
-      </p:sp>
+      <mc:AlternateContent xmlns:mc="http://schemas.openxmlformats.org/markup-compatibility/2006">
+        <mc:Choice xmlns:a14="http://schemas.microsoft.com/office/drawing/2010/main" Requires="a14">
+          <p:sp>
+            <p:nvSpPr>
+              <p:cNvPr id="3" name="Text Placeholder 2"/>
+              <p:cNvSpPr>
+                <a:spLocks noGrp="1"/>
+              </p:cNvSpPr>
+              <p:nvPr>
+                <p:ph type="body" idx="1"/>
+              </p:nvPr>
+            </p:nvSpPr>
+            <p:spPr/>
+            <p:txBody>
+              <a:bodyPr/>
+              <a:lstStyle/>
+              <a:p>
+                <a:r>
+                  <a:rPr lang="en-US" dirty="0"/>
+                  <a:t>Study Book Chapter 1.4 and 2.1</a:t>
+                </a:r>
+              </a:p>
+              <a:p>
+                <a:pPr lvl="1"/>
+                <a:r>
+                  <a:rPr lang="en-US" dirty="0"/>
+                  <a:t>Note: in the book, the authors use the ~ notation instead of the standard O, </a:t>
+                </a:r>
+                <a14:m>
+                  <m:oMath xmlns:m="http://schemas.openxmlformats.org/officeDocument/2006/math">
+                    <m:r>
+                      <m:rPr>
+                        <m:nor/>
+                      </m:rPr>
+                      <a:rPr lang="el-GR" dirty="0"/>
+                      <m:t>Ω</m:t>
+                    </m:r>
+                  </m:oMath>
+                </a14:m>
+                <a:r>
+                  <a:rPr lang="en-US" dirty="0"/>
+                  <a:t> and </a:t>
+                </a:r>
+                <a14:m>
+                  <m:oMath xmlns:m="http://schemas.openxmlformats.org/officeDocument/2006/math">
+                    <m:r>
+                      <m:rPr>
+                        <m:sty m:val="p"/>
+                      </m:rPr>
+                      <a:rPr lang="en-US" i="1">
+                        <a:latin typeface="Cambria Math" panose="02040503050406030204" pitchFamily="18" charset="0"/>
+                      </a:rPr>
+                      <m:t>Θ</m:t>
+                    </m:r>
+                    <m:r>
+                      <a:rPr lang="en-US" b="0" i="1" smtClean="0">
+                        <a:latin typeface="Cambria Math" panose="02040503050406030204" pitchFamily="18" charset="0"/>
+                      </a:rPr>
+                      <m:t>.</m:t>
+                    </m:r>
+                  </m:oMath>
+                </a14:m>
+                <a:r>
+                  <a:rPr lang="en-US" dirty="0"/>
+                  <a:t> They explain their reason in the Q&amp;A for such </a:t>
+                </a:r>
+                <a:r>
+                  <a:rPr lang="en-US"/>
+                  <a:t>weird choice, </a:t>
+                </a:r>
+                <a:r>
+                  <a:rPr lang="en-US" dirty="0"/>
+                  <a:t>but I do disagree</a:t>
+                </a:r>
+              </a:p>
+              <a:p>
+                <a:r>
+                  <a:rPr lang="en-US" dirty="0"/>
+                  <a:t>Study code in the </a:t>
+                </a:r>
+                <a:r>
+                  <a:rPr lang="en-US" i="1" dirty="0"/>
+                  <a:t>org.pg4200.les03</a:t>
+                </a:r>
+                <a:r>
+                  <a:rPr lang="en-US" dirty="0"/>
+                  <a:t> package</a:t>
+                </a:r>
+              </a:p>
+              <a:p>
+                <a:r>
+                  <a:rPr lang="en-US" dirty="0"/>
+                  <a:t>Do exercises in </a:t>
+                </a:r>
+                <a:r>
+                  <a:rPr lang="en-US" i="1" dirty="0"/>
+                  <a:t>exercises/ex03</a:t>
+                </a:r>
+              </a:p>
+              <a:p>
+                <a:r>
+                  <a:rPr lang="en-US" dirty="0"/>
+                  <a:t>Extra: do exercises in the book</a:t>
+                </a:r>
+              </a:p>
+            </p:txBody>
+          </p:sp>
+        </mc:Choice>
+        <mc:Fallback>
+          <p:sp>
+            <p:nvSpPr>
+              <p:cNvPr id="3" name="Text Placeholder 2"/>
+              <p:cNvSpPr>
+                <a:spLocks noGrp="1" noRot="1" noChangeAspect="1" noMove="1" noResize="1" noEditPoints="1" noAdjustHandles="1" noChangeArrowheads="1" noChangeShapeType="1" noTextEdit="1"/>
+              </p:cNvSpPr>
+              <p:nvPr>
+                <p:ph type="body" idx="1"/>
+              </p:nvPr>
+            </p:nvSpPr>
+            <p:spPr>
+              <a:blipFill>
+                <a:blip r:embed="rId2"/>
+                <a:stretch>
+                  <a:fillRect l="-1029"/>
+                </a:stretch>
+              </a:blipFill>
+            </p:spPr>
+            <p:txBody>
+              <a:bodyPr/>
+              <a:lstStyle/>
+              <a:p>
+                <a:r>
+                  <a:rPr lang="en-US">
+                    <a:noFill/>
+                  </a:rPr>
+                  <a:t> </a:t>
+                </a:r>
+              </a:p>
+            </p:txBody>
+          </p:sp>
+        </mc:Fallback>
+      </mc:AlternateContent>
     </p:spTree>
     <p:extLst>
       <p:ext uri="{BB962C8B-B14F-4D97-AF65-F5344CB8AC3E}">

</xml_diff>

<commit_message>
updated slides due to students' feedback
</commit_message>
<xml_diff>
--- a/docs/slides/03/03_analysis_sort.pptx
+++ b/docs/slides/03/03_analysis_sort.pptx
@@ -2329,7 +2329,7 @@
           </a:ln>
           <a:extLst>
             <a:ext uri="{C572A759-6A51-4108-AA02-DFA0A04FC94B}">
-              <ma14:wrappingTextBoxFlag xmlns:ma14="http://schemas.microsoft.com/office/mac/drawingml/2011/main" xmlns="" val="1"/>
+              <ma14:wrappingTextBoxFlag xmlns="" xmlns:ma14="http://schemas.microsoft.com/office/mac/drawingml/2011/main" val="1"/>
             </a:ext>
           </a:extLst>
         </p:spPr>
@@ -2368,7 +2368,7 @@
           </a:ln>
           <a:extLst>
             <a:ext uri="{C572A759-6A51-4108-AA02-DFA0A04FC94B}">
-              <ma14:wrappingTextBoxFlag xmlns:ma14="http://schemas.microsoft.com/office/mac/drawingml/2011/main" xmlns="" val="1"/>
+              <ma14:wrappingTextBoxFlag xmlns="" xmlns:ma14="http://schemas.microsoft.com/office/mac/drawingml/2011/main" val="1"/>
             </a:ext>
           </a:extLst>
         </p:spPr>
@@ -8074,7 +8074,7 @@
               </a:ln>
               <a:extLst>
                 <a:ext uri="{C572A759-6A51-4108-AA02-DFA0A04FC94B}">
-                  <ma14:wrappingTextBoxFlag xmlns:ma14="http://schemas.microsoft.com/office/mac/drawingml/2011/main" xmlns="" val="1"/>
+                  <ma14:wrappingTextBoxFlag xmlns="" xmlns:ma14="http://schemas.microsoft.com/office/mac/drawingml/2011/main" val="1"/>
                 </a:ext>
               </a:extLst>
             </p:spPr>
@@ -12596,8 +12596,8 @@
           </p:sp>
         </mc:Fallback>
       </mc:AlternateContent>
-      <mc:AlternateContent xmlns:mc="http://schemas.openxmlformats.org/markup-compatibility/2006" xmlns:a14="http://schemas.microsoft.com/office/drawing/2010/main">
-        <mc:Choice Requires="a14">
+      <mc:AlternateContent xmlns:mc="http://schemas.openxmlformats.org/markup-compatibility/2006">
+        <mc:Choice xmlns:a14="http://schemas.microsoft.com/office/drawing/2010/main" Requires="a14">
           <p:sp>
             <p:nvSpPr>
               <p:cNvPr id="4" name="TextBox 3"/>
@@ -12736,7 +12736,68 @@
                     <a:cs typeface="+mn-cs"/>
                     <a:sym typeface="Helvetica Light"/>
                   </a:rPr>
-                  <a:t> is better tha</a:t>
+                  <a:t> and </a:t>
+                </a:r>
+                <a:r>
+                  <a:rPr kumimoji="0" lang="en-US" sz="3600" b="1" i="1" u="none" strike="noStrike" cap="none" spc="0" normalizeH="0" baseline="0" dirty="0">
+                    <a:ln>
+                      <a:noFill/>
+                    </a:ln>
+                    <a:solidFill>
+                      <a:srgbClr val="000000"/>
+                    </a:solidFill>
+                    <a:effectLst/>
+                    <a:uFillTx/>
+                    <a:latin typeface="+mn-lt"/>
+                    <a:ea typeface="+mn-ea"/>
+                    <a:cs typeface="+mn-cs"/>
+                    <a:sym typeface="Helvetica Light"/>
+                  </a:rPr>
+                  <a:t>z(</a:t>
+                </a:r>
+                <a14:m>
+                  <m:oMath xmlns:m="http://schemas.openxmlformats.org/officeDocument/2006/math">
+                    <m:r>
+                      <a:rPr lang="en-US" i="1">
+                        <a:latin typeface="Cambria Math" panose="02040503050406030204" pitchFamily="18" charset="0"/>
+                      </a:rPr>
+                      <m:t>𝑛</m:t>
+                    </m:r>
+                  </m:oMath>
+                </a14:m>
+                <a:r>
+                  <a:rPr kumimoji="0" lang="en-US" sz="3600" b="1" i="1" u="none" strike="noStrike" cap="none" spc="0" normalizeH="0" baseline="0" dirty="0">
+                    <a:ln>
+                      <a:noFill/>
+                    </a:ln>
+                    <a:solidFill>
+                      <a:srgbClr val="000000"/>
+                    </a:solidFill>
+                    <a:effectLst/>
+                    <a:uFillTx/>
+                    <a:latin typeface="+mn-lt"/>
+                    <a:ea typeface="+mn-ea"/>
+                    <a:cs typeface="+mn-cs"/>
+                    <a:sym typeface="Helvetica Light"/>
+                  </a:rPr>
+                  <a:t>)</a:t>
+                </a:r>
+                <a:r>
+                  <a:rPr kumimoji="0" lang="en-US" sz="3600" b="0" i="0" u="none" strike="noStrike" cap="none" spc="0" normalizeH="0" baseline="0" dirty="0">
+                    <a:ln>
+                      <a:noFill/>
+                    </a:ln>
+                    <a:solidFill>
+                      <a:srgbClr val="000000"/>
+                    </a:solidFill>
+                    <a:effectLst/>
+                    <a:uFillTx/>
+                    <a:latin typeface="+mn-lt"/>
+                    <a:ea typeface="+mn-ea"/>
+                    <a:cs typeface="+mn-cs"/>
+                    <a:sym typeface="Helvetica Light"/>
+                  </a:rPr>
+                  <a:t> are better tha</a:t>
                 </a:r>
                 <a:r>
                   <a:rPr lang="en-US" dirty="0"/>
@@ -12790,7 +12851,7 @@
             </p:txBody>
           </p:sp>
         </mc:Choice>
-        <mc:Fallback xmlns="">
+        <mc:Fallback>
           <p:sp>
             <p:nvSpPr>
               <p:cNvPr id="4" name="TextBox 3"/>
@@ -12810,7 +12871,7 @@
               <a:blipFill>
                 <a:blip r:embed="rId3"/>
                 <a:stretch>
-                  <a:fillRect l="-3682" t="-4844" r="-2388" b="-12457"/>
+                  <a:fillRect l="-3512" t="-4286" r="-1860" b="-12143"/>
                 </a:stretch>
               </a:blipFill>
               <a:ln w="12700" cap="flat">
@@ -14917,6 +14978,89 @@
           </p:graphicFrame>
         </mc:Fallback>
       </mc:AlternateContent>
+      <p:sp>
+        <p:nvSpPr>
+          <p:cNvPr id="2" name="TextBox 1">
+            <a:extLst>
+              <a:ext uri="{FF2B5EF4-FFF2-40B4-BE49-F238E27FC236}">
+                <a16:creationId xmlns:a16="http://schemas.microsoft.com/office/drawing/2014/main" id="{7D37DCEC-0370-6743-9E07-417786405749}"/>
+              </a:ext>
+            </a:extLst>
+          </p:cNvPr>
+          <p:cNvSpPr txBox="1"/>
+          <p:nvPr/>
+        </p:nvSpPr>
+        <p:spPr>
+          <a:xfrm>
+            <a:off x="368619" y="554574"/>
+            <a:ext cx="12541895" cy="656590"/>
+          </a:xfrm>
+          <a:prstGeom prst="rect">
+            <a:avLst/>
+          </a:prstGeom>
+          <a:noFill/>
+          <a:ln w="12700" cap="flat">
+            <a:noFill/>
+            <a:miter lim="400000"/>
+          </a:ln>
+          <a:effectLst/>
+          <a:sp3d/>
+        </p:spPr>
+        <p:style>
+          <a:lnRef idx="0">
+            <a:scrgbClr r="0" g="0" b="0"/>
+          </a:lnRef>
+          <a:fillRef idx="0">
+            <a:scrgbClr r="0" g="0" b="0"/>
+          </a:fillRef>
+          <a:effectRef idx="0">
+            <a:scrgbClr r="0" g="0" b="0"/>
+          </a:effectRef>
+          <a:fontRef idx="none"/>
+        </p:style>
+        <p:txBody>
+          <a:bodyPr rot="0" spcFirstLastPara="1" vertOverflow="overflow" horzOverflow="overflow" vert="horz" wrap="none" lIns="50800" tIns="50800" rIns="50800" bIns="50800" numCol="1" spcCol="38100" rtlCol="0" anchor="ctr">
+            <a:spAutoFit/>
+          </a:bodyPr>
+          <a:lstStyle/>
+          <a:p>
+            <a:pPr marL="0" marR="0" indent="0" algn="l" defTabSz="584200" rtl="0" fontAlgn="auto" latinLnBrk="0" hangingPunct="0">
+              <a:lnSpc>
+                <a:spcPct val="100000"/>
+              </a:lnSpc>
+              <a:spcBef>
+                <a:spcPts val="0"/>
+              </a:spcBef>
+              <a:spcAft>
+                <a:spcPts val="0"/>
+              </a:spcAft>
+              <a:buClrTx/>
+              <a:buSzTx/>
+              <a:buFontTx/>
+              <a:buNone/>
+              <a:tabLst/>
+            </a:pPr>
+            <a:r>
+              <a:rPr lang="en-US" dirty="0"/>
+              <a:t>Purple represents possible actual runtimes for those bounds</a:t>
+            </a:r>
+            <a:endParaRPr kumimoji="0" lang="en-US" sz="3600" b="0" i="0" u="none" strike="noStrike" cap="none" spc="0" normalizeH="0" baseline="0" dirty="0">
+              <a:ln>
+                <a:noFill/>
+              </a:ln>
+              <a:solidFill>
+                <a:srgbClr val="000000"/>
+              </a:solidFill>
+              <a:effectLst/>
+              <a:uFillTx/>
+              <a:latin typeface="+mn-lt"/>
+              <a:ea typeface="+mn-ea"/>
+              <a:cs typeface="+mn-cs"/>
+              <a:sym typeface="Helvetica Light"/>
+            </a:endParaRPr>
+          </a:p>
+        </p:txBody>
+      </p:sp>
     </p:spTree>
     <p:extLst>
       <p:ext uri="{BB962C8B-B14F-4D97-AF65-F5344CB8AC3E}">
@@ -18596,7 +18740,7 @@
           </a:ln>
           <a:extLst>
             <a:ext uri="{C572A759-6A51-4108-AA02-DFA0A04FC94B}">
-              <ma14:wrappingTextBoxFlag xmlns:ma14="http://schemas.microsoft.com/office/mac/drawingml/2011/main" xmlns="" val="1"/>
+              <ma14:wrappingTextBoxFlag xmlns="" xmlns:ma14="http://schemas.microsoft.com/office/mac/drawingml/2011/main" val="1"/>
             </a:ext>
           </a:extLst>
         </p:spPr>
@@ -29245,8 +29389,8 @@
           </a:p>
         </p:txBody>
       </p:sp>
-      <mc:AlternateContent xmlns:mc="http://schemas.openxmlformats.org/markup-compatibility/2006">
-        <mc:Choice xmlns:a14="http://schemas.microsoft.com/office/drawing/2010/main" Requires="a14">
+      <mc:AlternateContent xmlns:mc="http://schemas.openxmlformats.org/markup-compatibility/2006" xmlns:a14="http://schemas.microsoft.com/office/drawing/2010/main">
+        <mc:Choice Requires="a14">
           <p:sp>
             <p:nvSpPr>
               <p:cNvPr id="3" name="Text Placeholder 2"/>
@@ -29353,7 +29497,7 @@
             </p:txBody>
           </p:sp>
         </mc:Choice>
-        <mc:Fallback>
+        <mc:Fallback xmlns="">
           <p:sp>
             <p:nvSpPr>
               <p:cNvPr id="3" name="Text Placeholder 2"/>

</xml_diff>

<commit_message>
Minor update to lecture slides.
</commit_message>
<xml_diff>
--- a/docs/slides/03/03_analysis_sort.pptx
+++ b/docs/slides/03/03_analysis_sort.pptx
@@ -5,7 +5,7 @@
     <p:sldMasterId id="2147483648" r:id="rId1"/>
   </p:sldMasterIdLst>
   <p:notesMasterIdLst>
-    <p:notesMasterId r:id="rId54"/>
+    <p:notesMasterId r:id="rId55"/>
   </p:notesMasterIdLst>
   <p:sldIdLst>
     <p:sldId id="283" r:id="rId2"/>
@@ -48,18 +48,19 @@
     <p:sldId id="282" r:id="rId39"/>
     <p:sldId id="287" r:id="rId40"/>
     <p:sldId id="288" r:id="rId41"/>
-    <p:sldId id="299" r:id="rId42"/>
-    <p:sldId id="300" r:id="rId43"/>
-    <p:sldId id="301" r:id="rId44"/>
-    <p:sldId id="307" r:id="rId45"/>
-    <p:sldId id="302" r:id="rId46"/>
-    <p:sldId id="303" r:id="rId47"/>
-    <p:sldId id="304" r:id="rId48"/>
-    <p:sldId id="305" r:id="rId49"/>
-    <p:sldId id="308" r:id="rId50"/>
-    <p:sldId id="309" r:id="rId51"/>
-    <p:sldId id="312" r:id="rId52"/>
-    <p:sldId id="284" r:id="rId53"/>
+    <p:sldId id="313" r:id="rId42"/>
+    <p:sldId id="299" r:id="rId43"/>
+    <p:sldId id="300" r:id="rId44"/>
+    <p:sldId id="301" r:id="rId45"/>
+    <p:sldId id="307" r:id="rId46"/>
+    <p:sldId id="302" r:id="rId47"/>
+    <p:sldId id="303" r:id="rId48"/>
+    <p:sldId id="304" r:id="rId49"/>
+    <p:sldId id="305" r:id="rId50"/>
+    <p:sldId id="308" r:id="rId51"/>
+    <p:sldId id="309" r:id="rId52"/>
+    <p:sldId id="312" r:id="rId53"/>
+    <p:sldId id="284" r:id="rId54"/>
   </p:sldIdLst>
   <p:sldSz cx="13004800" cy="9753600"/>
   <p:notesSz cx="6858000" cy="9144000"/>
@@ -3346,8 +3347,13 @@
             <a:pPr algn="r"/>
             <a:r>
               <a:rPr lang="en-US" dirty="0"/>
-              <a:t>Prof. Andrea Arcuri</a:t>
-            </a:r>
+              <a:t>Bogdan </a:t>
+            </a:r>
+            <a:r>
+              <a:rPr lang="en-US" dirty="0" err="1"/>
+              <a:t>Marculescu</a:t>
+            </a:r>
+            <a:endParaRPr lang="en-US" dirty="0"/>
           </a:p>
         </p:txBody>
       </p:sp>
@@ -12596,8 +12602,8 @@
           </p:sp>
         </mc:Fallback>
       </mc:AlternateContent>
-      <mc:AlternateContent xmlns:mc="http://schemas.openxmlformats.org/markup-compatibility/2006">
-        <mc:Choice xmlns:a14="http://schemas.microsoft.com/office/drawing/2010/main" Requires="a14">
+      <mc:AlternateContent xmlns:mc="http://schemas.openxmlformats.org/markup-compatibility/2006" xmlns:a14="http://schemas.microsoft.com/office/drawing/2010/main">
+        <mc:Choice Requires="a14">
           <p:sp>
             <p:nvSpPr>
               <p:cNvPr id="4" name="TextBox 3"/>
@@ -12851,7 +12857,7 @@
             </p:txBody>
           </p:sp>
         </mc:Choice>
-        <mc:Fallback>
+        <mc:Fallback xmlns="">
           <p:sp>
             <p:nvSpPr>
               <p:cNvPr id="4" name="TextBox 3"/>
@@ -20133,6 +20139,95 @@
           <a:chExt cx="0" cy="0"/>
         </a:xfrm>
       </p:grpSpPr>
+      <p:sp>
+        <p:nvSpPr>
+          <p:cNvPr id="2" name="Title 1"/>
+          <p:cNvSpPr>
+            <a:spLocks noGrp="1"/>
+          </p:cNvSpPr>
+          <p:nvPr>
+            <p:ph type="title"/>
+          </p:nvPr>
+        </p:nvSpPr>
+        <p:spPr/>
+        <p:txBody>
+          <a:bodyPr/>
+          <a:lstStyle/>
+          <a:p>
+            <a:r>
+              <a:rPr lang="en-US" dirty="0"/>
+              <a:t>Consider a Playlist</a:t>
+            </a:r>
+          </a:p>
+        </p:txBody>
+      </p:sp>
+      <p:pic>
+        <p:nvPicPr>
+          <p:cNvPr id="5" name="Picture 4">
+            <a:extLst>
+              <a:ext uri="{FF2B5EF4-FFF2-40B4-BE49-F238E27FC236}">
+                <a16:creationId xmlns:a16="http://schemas.microsoft.com/office/drawing/2014/main" id="{F78E55AB-1310-9B48-B1AD-2016329C27D7}"/>
+              </a:ext>
+            </a:extLst>
+          </p:cNvPr>
+          <p:cNvPicPr>
+            <a:picLocks noChangeAspect="1"/>
+          </p:cNvPicPr>
+          <p:nvPr/>
+        </p:nvPicPr>
+        <p:blipFill>
+          <a:blip r:embed="rId2">
+            <a:extLst>
+              <a:ext uri="{28A0092B-C50C-407E-A947-70E740481C1C}">
+                <a14:useLocalDpi xmlns:a14="http://schemas.microsoft.com/office/drawing/2010/main" val="0"/>
+              </a:ext>
+            </a:extLst>
+          </a:blip>
+          <a:stretch>
+            <a:fillRect/>
+          </a:stretch>
+        </p:blipFill>
+        <p:spPr>
+          <a:xfrm>
+            <a:off x="0" y="2037660"/>
+            <a:ext cx="13004800" cy="7715940"/>
+          </a:xfrm>
+          <a:prstGeom prst="rect">
+            <a:avLst/>
+          </a:prstGeom>
+        </p:spPr>
+      </p:pic>
+    </p:spTree>
+    <p:extLst>
+      <p:ext uri="{BB962C8B-B14F-4D97-AF65-F5344CB8AC3E}">
+        <p14:creationId xmlns:p14="http://schemas.microsoft.com/office/powerpoint/2010/main" val="3280548606"/>
+      </p:ext>
+    </p:extLst>
+  </p:cSld>
+  <p:clrMapOvr>
+    <a:masterClrMapping/>
+  </p:clrMapOvr>
+  <p:transition spd="med"/>
+</p:sld>
+</file>
+
+<file path=ppt/slides/slide42.xml><?xml version="1.0" encoding="utf-8"?>
+<p:sld xmlns:a="http://schemas.openxmlformats.org/drawingml/2006/main" xmlns:r="http://schemas.openxmlformats.org/officeDocument/2006/relationships" xmlns:p="http://schemas.openxmlformats.org/presentationml/2006/main">
+  <p:cSld>
+    <p:spTree>
+      <p:nvGrpSpPr>
+        <p:cNvPr id="1" name=""/>
+        <p:cNvGrpSpPr/>
+        <p:nvPr/>
+      </p:nvGrpSpPr>
+      <p:grpSpPr>
+        <a:xfrm>
+          <a:off x="0" y="0"/>
+          <a:ext cx="0" cy="0"/>
+          <a:chOff x="0" y="0"/>
+          <a:chExt cx="0" cy="0"/>
+        </a:xfrm>
+      </p:grpSpPr>
       <p:pic>
         <p:nvPicPr>
           <p:cNvPr id="5" name="Picture 4"/>
@@ -20393,7 +20488,7 @@
 </p:sld>
 </file>
 
-<file path=ppt/slides/slide42.xml><?xml version="1.0" encoding="utf-8"?>
+<file path=ppt/slides/slide43.xml><?xml version="1.0" encoding="utf-8"?>
 <p:sld xmlns:a="http://schemas.openxmlformats.org/drawingml/2006/main" xmlns:r="http://schemas.openxmlformats.org/officeDocument/2006/relationships" xmlns:p="http://schemas.openxmlformats.org/presentationml/2006/main">
   <p:cSld>
     <p:spTree>
@@ -20853,180 +20948,6 @@
     <p:extLst>
       <p:ext uri="{BB962C8B-B14F-4D97-AF65-F5344CB8AC3E}">
         <p14:creationId xmlns:p14="http://schemas.microsoft.com/office/powerpoint/2010/main" val="1012284533"/>
-      </p:ext>
-    </p:extLst>
-  </p:cSld>
-  <p:clrMapOvr>
-    <a:masterClrMapping/>
-  </p:clrMapOvr>
-  <p:transition spd="med"/>
-</p:sld>
-</file>
-
-<file path=ppt/slides/slide43.xml><?xml version="1.0" encoding="utf-8"?>
-<p:sld xmlns:a="http://schemas.openxmlformats.org/drawingml/2006/main" xmlns:r="http://schemas.openxmlformats.org/officeDocument/2006/relationships" xmlns:p="http://schemas.openxmlformats.org/presentationml/2006/main">
-  <p:cSld>
-    <p:spTree>
-      <p:nvGrpSpPr>
-        <p:cNvPr id="1" name=""/>
-        <p:cNvGrpSpPr/>
-        <p:nvPr/>
-      </p:nvGrpSpPr>
-      <p:grpSpPr>
-        <a:xfrm>
-          <a:off x="0" y="0"/>
-          <a:ext cx="0" cy="0"/>
-          <a:chOff x="0" y="0"/>
-          <a:chExt cx="0" cy="0"/>
-        </a:xfrm>
-      </p:grpSpPr>
-      <p:sp>
-        <p:nvSpPr>
-          <p:cNvPr id="2" name="Title 1"/>
-          <p:cNvSpPr>
-            <a:spLocks noGrp="1"/>
-          </p:cNvSpPr>
-          <p:nvPr>
-            <p:ph type="title"/>
-          </p:nvPr>
-        </p:nvSpPr>
-        <p:spPr/>
-        <p:txBody>
-          <a:bodyPr/>
-          <a:lstStyle/>
-          <a:p>
-            <a:r>
-              <a:rPr lang="en-US" dirty="0"/>
-              <a:t>Sorting Algorithms</a:t>
-            </a:r>
-          </a:p>
-        </p:txBody>
-      </p:sp>
-      <p:sp>
-        <p:nvSpPr>
-          <p:cNvPr id="3" name="Text Placeholder 2"/>
-          <p:cNvSpPr>
-            <a:spLocks noGrp="1"/>
-          </p:cNvSpPr>
-          <p:nvPr>
-            <p:ph type="body" idx="1"/>
-          </p:nvPr>
-        </p:nvSpPr>
-        <p:spPr>
-          <a:xfrm>
-            <a:off x="282803" y="2603500"/>
-            <a:ext cx="12433955" cy="6823304"/>
-          </a:xfrm>
-        </p:spPr>
-        <p:txBody>
-          <a:bodyPr>
-            <a:normAutofit fontScale="85000" lnSpcReduction="20000"/>
-          </a:bodyPr>
-          <a:lstStyle/>
-          <a:p>
-            <a:r>
-              <a:rPr lang="en-US" dirty="0"/>
-              <a:t>Many different sorting algorithms, with different properties</a:t>
-            </a:r>
-          </a:p>
-          <a:p>
-            <a:r>
-              <a:rPr lang="en-US" dirty="0"/>
-              <a:t>Given two items </a:t>
-            </a:r>
-            <a:r>
-              <a:rPr lang="en-US" i="1" dirty="0"/>
-              <a:t>A</a:t>
-            </a:r>
-            <a:r>
-              <a:rPr lang="en-US" dirty="0"/>
-              <a:t> and </a:t>
-            </a:r>
-            <a:r>
-              <a:rPr lang="en-US" i="1" dirty="0"/>
-              <a:t>B</a:t>
-            </a:r>
-            <a:r>
-              <a:rPr lang="en-US" dirty="0"/>
-              <a:t>, just need a </a:t>
-            </a:r>
-            <a:r>
-              <a:rPr lang="en-US" i="1" dirty="0"/>
-              <a:t>comparator </a:t>
-            </a:r>
-            <a:r>
-              <a:rPr lang="en-US" dirty="0"/>
-              <a:t>that can state which one is greater or equal</a:t>
-            </a:r>
-          </a:p>
-          <a:p>
-            <a:pPr lvl="1"/>
-            <a:r>
-              <a:rPr lang="en-US" dirty="0"/>
-              <a:t>easy to say that 5 greater than 2, but what does it mean that song </a:t>
-            </a:r>
-            <a:r>
-              <a:rPr lang="en-US" i="1" dirty="0"/>
-              <a:t>A </a:t>
-            </a:r>
-            <a:r>
-              <a:rPr lang="en-US" dirty="0"/>
-              <a:t>is greater than song </a:t>
-            </a:r>
-            <a:r>
-              <a:rPr lang="en-US" i="1" dirty="0"/>
-              <a:t>B</a:t>
-            </a:r>
-            <a:r>
-              <a:rPr lang="en-US" dirty="0"/>
-              <a:t>? e.g., could look at alphabetic ordering of titles or artist names </a:t>
-            </a:r>
-          </a:p>
-          <a:p>
-            <a:r>
-              <a:rPr lang="en-US" dirty="0"/>
-              <a:t>Most language APIs provides good defaults</a:t>
-            </a:r>
-          </a:p>
-          <a:p>
-            <a:pPr lvl="1"/>
-            <a:r>
-              <a:rPr lang="en-US" dirty="0"/>
-              <a:t>Unless very large data, default will be fine 99% of the cases</a:t>
-            </a:r>
-          </a:p>
-          <a:p>
-            <a:r>
-              <a:rPr lang="en-US" dirty="0"/>
-              <a:t>Sorting is very popular in programming</a:t>
-            </a:r>
-          </a:p>
-          <a:p>
-            <a:pPr lvl="1"/>
-            <a:r>
-              <a:rPr lang="en-US" dirty="0"/>
-              <a:t>Important to understand how it works under the hood</a:t>
-            </a:r>
-          </a:p>
-          <a:p>
-            <a:r>
-              <a:rPr lang="en-US" dirty="0"/>
-              <a:t>Tractable mathematically</a:t>
-            </a:r>
-          </a:p>
-          <a:p>
-            <a:pPr lvl="1"/>
-            <a:r>
-              <a:rPr lang="en-US" dirty="0"/>
-              <a:t>So good example to show how to analyze algorithms</a:t>
-            </a:r>
-          </a:p>
-        </p:txBody>
-      </p:sp>
-    </p:spTree>
-    <p:extLst>
-      <p:ext uri="{BB962C8B-B14F-4D97-AF65-F5344CB8AC3E}">
-        <p14:creationId xmlns:p14="http://schemas.microsoft.com/office/powerpoint/2010/main" val="263818894"/>
       </p:ext>
     </p:extLst>
   </p:cSld>
@@ -21086,54 +21007,113 @@
             <p:ph type="body" idx="1"/>
           </p:nvPr>
         </p:nvSpPr>
-        <p:spPr/>
+        <p:spPr>
+          <a:xfrm>
+            <a:off x="282803" y="2603500"/>
+            <a:ext cx="12433955" cy="6823304"/>
+          </a:xfrm>
+        </p:spPr>
         <p:txBody>
           <a:bodyPr>
-            <a:normAutofit fontScale="92500" lnSpcReduction="20000"/>
+            <a:normAutofit fontScale="85000" lnSpcReduction="20000"/>
           </a:bodyPr>
           <a:lstStyle/>
           <a:p>
             <a:r>
-              <a:rPr lang="en-US" b="1" dirty="0"/>
-              <a:t>Bubble Sort</a:t>
+              <a:rPr lang="en-US" dirty="0"/>
+              <a:t>Many different sorting algorithms, with different properties</a:t>
             </a:r>
           </a:p>
           <a:p>
             <a:r>
-              <a:rPr lang="en-US" b="1" dirty="0"/>
-              <a:t>Insertion Sort</a:t>
+              <a:rPr lang="en-US" dirty="0"/>
+              <a:t>Given two items </a:t>
+            </a:r>
+            <a:r>
+              <a:rPr lang="en-US" i="1" dirty="0"/>
+              <a:t>A</a:t>
+            </a:r>
+            <a:r>
+              <a:rPr lang="en-US" dirty="0"/>
+              <a:t> and </a:t>
+            </a:r>
+            <a:r>
+              <a:rPr lang="en-US" i="1" dirty="0"/>
+              <a:t>B</a:t>
+            </a:r>
+            <a:r>
+              <a:rPr lang="en-US" dirty="0"/>
+              <a:t>, just need a </a:t>
+            </a:r>
+            <a:r>
+              <a:rPr lang="en-US" i="1" dirty="0"/>
+              <a:t>comparator </a:t>
+            </a:r>
+            <a:r>
+              <a:rPr lang="en-US" dirty="0"/>
+              <a:t>that can state which one is greater or equal</a:t>
             </a:r>
           </a:p>
           <a:p>
-            <a:r>
-              <a:rPr lang="en-US" b="1" dirty="0"/>
-              <a:t>Merge Sort</a:t>
-            </a:r>
+            <a:pPr lvl="1"/>
             <a:r>
               <a:rPr lang="en-US" dirty="0"/>
-              <a:t> (next class)</a:t>
+              <a:t>easy to say that 5 greater than 2, but what does it mean that song </a:t>
+            </a:r>
+            <a:r>
+              <a:rPr lang="en-US" i="1" dirty="0"/>
+              <a:t>A </a:t>
+            </a:r>
+            <a:r>
+              <a:rPr lang="en-US" dirty="0"/>
+              <a:t>is greater than song </a:t>
+            </a:r>
+            <a:r>
+              <a:rPr lang="en-US" i="1" dirty="0"/>
+              <a:t>B</a:t>
+            </a:r>
+            <a:r>
+              <a:rPr lang="en-US" dirty="0"/>
+              <a:t>? e.g., could look at alphabetic ordering of titles or artist names </a:t>
             </a:r>
           </a:p>
           <a:p>
             <a:r>
-              <a:rPr lang="en-US" b="1" dirty="0"/>
-              <a:t>Quick Sort </a:t>
-            </a:r>
-            <a:r>
               <a:rPr lang="en-US" dirty="0"/>
-              <a:t>(next class)</a:t>
+              <a:t>Most language APIs provides good defaults</a:t>
             </a:r>
           </a:p>
           <a:p>
+            <a:pPr lvl="1"/>
             <a:r>
               <a:rPr lang="en-US" dirty="0"/>
-              <a:t>There are more, but those are the most famous that you need to know </a:t>
+              <a:t>Unless very large data, default will be fine 99% of the cases</a:t>
             </a:r>
           </a:p>
           <a:p>
             <a:r>
               <a:rPr lang="en-US" dirty="0"/>
-              <a:t>Good way to see a problem been solved in many different ways</a:t>
+              <a:t>Sorting is very popular in programming</a:t>
+            </a:r>
+          </a:p>
+          <a:p>
+            <a:pPr lvl="1"/>
+            <a:r>
+              <a:rPr lang="en-US" dirty="0"/>
+              <a:t>Important to understand how it works under the hood</a:t>
+            </a:r>
+          </a:p>
+          <a:p>
+            <a:r>
+              <a:rPr lang="en-US" dirty="0"/>
+              <a:t>Tractable mathematically</a:t>
+            </a:r>
+          </a:p>
+          <a:p>
+            <a:pPr lvl="1"/>
+            <a:r>
+              <a:rPr lang="en-US" dirty="0"/>
+              <a:t>So good example to show how to analyze algorithms</a:t>
             </a:r>
           </a:p>
         </p:txBody>
@@ -21141,7 +21121,7 @@
     </p:spTree>
     <p:extLst>
       <p:ext uri="{BB962C8B-B14F-4D97-AF65-F5344CB8AC3E}">
-        <p14:creationId xmlns:p14="http://schemas.microsoft.com/office/powerpoint/2010/main" val="859377593"/>
+        <p14:creationId xmlns:p14="http://schemas.microsoft.com/office/powerpoint/2010/main" val="263818894"/>
       </p:ext>
     </p:extLst>
   </p:cSld>
@@ -21186,6 +21166,121 @@
           <a:p>
             <a:r>
               <a:rPr lang="en-US" dirty="0"/>
+              <a:t>Sorting Algorithms</a:t>
+            </a:r>
+          </a:p>
+        </p:txBody>
+      </p:sp>
+      <p:sp>
+        <p:nvSpPr>
+          <p:cNvPr id="3" name="Text Placeholder 2"/>
+          <p:cNvSpPr>
+            <a:spLocks noGrp="1"/>
+          </p:cNvSpPr>
+          <p:nvPr>
+            <p:ph type="body" idx="1"/>
+          </p:nvPr>
+        </p:nvSpPr>
+        <p:spPr/>
+        <p:txBody>
+          <a:bodyPr>
+            <a:normAutofit fontScale="92500" lnSpcReduction="20000"/>
+          </a:bodyPr>
+          <a:lstStyle/>
+          <a:p>
+            <a:r>
+              <a:rPr lang="en-US" b="1" dirty="0"/>
+              <a:t>Bubble Sort</a:t>
+            </a:r>
+          </a:p>
+          <a:p>
+            <a:r>
+              <a:rPr lang="en-US" b="1" dirty="0"/>
+              <a:t>Insertion Sort</a:t>
+            </a:r>
+          </a:p>
+          <a:p>
+            <a:r>
+              <a:rPr lang="en-US" b="1" dirty="0"/>
+              <a:t>Merge Sort</a:t>
+            </a:r>
+            <a:r>
+              <a:rPr lang="en-US" dirty="0"/>
+              <a:t> (next class)</a:t>
+            </a:r>
+          </a:p>
+          <a:p>
+            <a:r>
+              <a:rPr lang="en-US" b="1" dirty="0"/>
+              <a:t>Quick Sort </a:t>
+            </a:r>
+            <a:r>
+              <a:rPr lang="en-US" dirty="0"/>
+              <a:t>(next class)</a:t>
+            </a:r>
+          </a:p>
+          <a:p>
+            <a:r>
+              <a:rPr lang="en-US" dirty="0"/>
+              <a:t>There are more, but those are the most famous that you need to know </a:t>
+            </a:r>
+          </a:p>
+          <a:p>
+            <a:r>
+              <a:rPr lang="en-US" dirty="0"/>
+              <a:t>Good way to see a problem been solved in many different ways</a:t>
+            </a:r>
+          </a:p>
+        </p:txBody>
+      </p:sp>
+    </p:spTree>
+    <p:extLst>
+      <p:ext uri="{BB962C8B-B14F-4D97-AF65-F5344CB8AC3E}">
+        <p14:creationId xmlns:p14="http://schemas.microsoft.com/office/powerpoint/2010/main" val="859377593"/>
+      </p:ext>
+    </p:extLst>
+  </p:cSld>
+  <p:clrMapOvr>
+    <a:masterClrMapping/>
+  </p:clrMapOvr>
+  <p:transition spd="med"/>
+</p:sld>
+</file>
+
+<file path=ppt/slides/slide46.xml><?xml version="1.0" encoding="utf-8"?>
+<p:sld xmlns:a="http://schemas.openxmlformats.org/drawingml/2006/main" xmlns:r="http://schemas.openxmlformats.org/officeDocument/2006/relationships" xmlns:p="http://schemas.openxmlformats.org/presentationml/2006/main">
+  <p:cSld>
+    <p:spTree>
+      <p:nvGrpSpPr>
+        <p:cNvPr id="1" name=""/>
+        <p:cNvGrpSpPr/>
+        <p:nvPr/>
+      </p:nvGrpSpPr>
+      <p:grpSpPr>
+        <a:xfrm>
+          <a:off x="0" y="0"/>
+          <a:ext cx="0" cy="0"/>
+          <a:chOff x="0" y="0"/>
+          <a:chExt cx="0" cy="0"/>
+        </a:xfrm>
+      </p:grpSpPr>
+      <p:sp>
+        <p:nvSpPr>
+          <p:cNvPr id="2" name="Title 1"/>
+          <p:cNvSpPr>
+            <a:spLocks noGrp="1"/>
+          </p:cNvSpPr>
+          <p:nvPr>
+            <p:ph type="title"/>
+          </p:nvPr>
+        </p:nvSpPr>
+        <p:spPr/>
+        <p:txBody>
+          <a:bodyPr/>
+          <a:lstStyle/>
+          <a:p>
+            <a:r>
+              <a:rPr lang="en-US" dirty="0"/>
               <a:t>Bubble Sort</a:t>
             </a:r>
           </a:p>
@@ -21249,7 +21344,7 @@
 </p:sld>
 </file>
 
-<file path=ppt/slides/slide46.xml><?xml version="1.0" encoding="utf-8"?>
+<file path=ppt/slides/slide47.xml><?xml version="1.0" encoding="utf-8"?>
 <p:sld xmlns:a="http://schemas.openxmlformats.org/drawingml/2006/main" xmlns:r="http://schemas.openxmlformats.org/officeDocument/2006/relationships" xmlns:p="http://schemas.openxmlformats.org/presentationml/2006/main">
   <p:cSld>
     <p:spTree>
@@ -22432,7 +22527,7 @@
 </p:sld>
 </file>
 
-<file path=ppt/slides/slide47.xml><?xml version="1.0" encoding="utf-8"?>
+<file path=ppt/slides/slide48.xml><?xml version="1.0" encoding="utf-8"?>
 <p:sld xmlns:a="http://schemas.openxmlformats.org/drawingml/2006/main" xmlns:r="http://schemas.openxmlformats.org/officeDocument/2006/relationships" xmlns:p="http://schemas.openxmlformats.org/presentationml/2006/main">
   <p:cSld>
     <p:spTree>
@@ -23242,7 +23337,7 @@
 </p:sld>
 </file>
 
-<file path=ppt/slides/slide48.xml><?xml version="1.0" encoding="utf-8"?>
+<file path=ppt/slides/slide49.xml><?xml version="1.0" encoding="utf-8"?>
 <p:sld xmlns:a="http://schemas.openxmlformats.org/drawingml/2006/main" xmlns:r="http://schemas.openxmlformats.org/officeDocument/2006/relationships" xmlns:p="http://schemas.openxmlformats.org/presentationml/2006/main">
   <p:cSld>
     <p:spTree>
@@ -23469,7 +23564,1589 @@
 </p:sld>
 </file>
 
-<file path=ppt/slides/slide49.xml><?xml version="1.0" encoding="utf-8"?>
+<file path=ppt/slides/slide5.xml><?xml version="1.0" encoding="utf-8"?>
+<p:sld xmlns:a="http://schemas.openxmlformats.org/drawingml/2006/main" xmlns:r="http://schemas.openxmlformats.org/officeDocument/2006/relationships" xmlns:p="http://schemas.openxmlformats.org/presentationml/2006/main">
+  <p:cSld>
+    <p:spTree>
+      <p:nvGrpSpPr>
+        <p:cNvPr id="1" name=""/>
+        <p:cNvGrpSpPr/>
+        <p:nvPr/>
+      </p:nvGrpSpPr>
+      <p:grpSpPr>
+        <a:xfrm>
+          <a:off x="0" y="0"/>
+          <a:ext cx="0" cy="0"/>
+          <a:chOff x="0" y="0"/>
+          <a:chExt cx="0" cy="0"/>
+        </a:xfrm>
+      </p:grpSpPr>
+      <mc:AlternateContent xmlns:mc="http://schemas.openxmlformats.org/markup-compatibility/2006" xmlns:a14="http://schemas.microsoft.com/office/drawing/2010/main">
+        <mc:Choice Requires="a14">
+          <p:sp>
+            <p:nvSpPr>
+              <p:cNvPr id="3" name="Text Placeholder 2"/>
+              <p:cNvSpPr>
+                <a:spLocks noGrp="1"/>
+              </p:cNvSpPr>
+              <p:nvPr>
+                <p:ph type="body" idx="1"/>
+              </p:nvPr>
+            </p:nvSpPr>
+            <p:spPr>
+              <a:xfrm>
+                <a:off x="361950" y="4583637"/>
+                <a:ext cx="12306300" cy="3936999"/>
+              </a:xfrm>
+            </p:spPr>
+            <p:txBody>
+              <a:bodyPr>
+                <a:normAutofit/>
+              </a:bodyPr>
+              <a:lstStyle/>
+              <a:p>
+                <a:r>
+                  <a:rPr lang="en-US" dirty="0"/>
+                  <a:t>Two nested loops </a:t>
+                </a:r>
+              </a:p>
+              <a:p>
+                <a:r>
+                  <a:rPr lang="en-US" dirty="0"/>
+                  <a:t>Inner loop executed once per each element in array</a:t>
+                </a:r>
+              </a:p>
+              <a:p>
+                <a:r>
+                  <a:rPr lang="en-US" dirty="0"/>
+                  <a:t>So, </a:t>
+                </a:r>
+                <a14:m>
+                  <m:oMath xmlns:m="http://schemas.openxmlformats.org/officeDocument/2006/math">
+                    <m:r>
+                      <a:rPr lang="en-US" b="0" i="1" smtClean="0">
+                        <a:latin typeface="Cambria Math" panose="02040503050406030204" pitchFamily="18" charset="0"/>
+                      </a:rPr>
+                      <m:t>𝑁</m:t>
+                    </m:r>
+                    <m:r>
+                      <a:rPr lang="en-US" b="0" i="1" smtClean="0">
+                        <a:latin typeface="Cambria Math" panose="02040503050406030204" pitchFamily="18" charset="0"/>
+                      </a:rPr>
+                      <m:t>∗</m:t>
+                    </m:r>
+                    <m:r>
+                      <a:rPr lang="en-US" b="0" i="1" smtClean="0">
+                        <a:latin typeface="Cambria Math" panose="02040503050406030204" pitchFamily="18" charset="0"/>
+                      </a:rPr>
+                      <m:t>𝑁</m:t>
+                    </m:r>
+                    <m:r>
+                      <a:rPr lang="en-US" b="0" i="1" smtClean="0">
+                        <a:latin typeface="Cambria Math" panose="02040503050406030204" pitchFamily="18" charset="0"/>
+                      </a:rPr>
+                      <m:t>=</m:t>
+                    </m:r>
+                    <m:sSup>
+                      <m:sSupPr>
+                        <m:ctrlPr>
+                          <a:rPr lang="en-US" b="0" i="1" smtClean="0">
+                            <a:latin typeface="Cambria Math" panose="02040503050406030204" pitchFamily="18" charset="0"/>
+                          </a:rPr>
+                        </m:ctrlPr>
+                      </m:sSupPr>
+                      <m:e>
+                        <m:r>
+                          <a:rPr lang="en-US" b="0" i="1" smtClean="0">
+                            <a:latin typeface="Cambria Math" panose="02040503050406030204" pitchFamily="18" charset="0"/>
+                          </a:rPr>
+                          <m:t>𝑁</m:t>
+                        </m:r>
+                      </m:e>
+                      <m:sup>
+                        <m:r>
+                          <a:rPr lang="en-US" b="0" i="1" smtClean="0">
+                            <a:latin typeface="Cambria Math" panose="02040503050406030204" pitchFamily="18" charset="0"/>
+                          </a:rPr>
+                          <m:t>2</m:t>
+                        </m:r>
+                      </m:sup>
+                    </m:sSup>
+                  </m:oMath>
+                </a14:m>
+                <a:endParaRPr lang="en-US" b="0" dirty="0"/>
+              </a:p>
+              <a:p>
+                <a:r>
+                  <a:rPr lang="en-US" dirty="0"/>
+                  <a:t>Twice as big is now </a:t>
+                </a:r>
+                <a14:m>
+                  <m:oMath xmlns:m="http://schemas.openxmlformats.org/officeDocument/2006/math">
+                    <m:r>
+                      <a:rPr lang="en-US" b="0" i="1" smtClean="0">
+                        <a:latin typeface="Cambria Math" panose="02040503050406030204" pitchFamily="18" charset="0"/>
+                      </a:rPr>
+                      <m:t>2∗2=4</m:t>
+                    </m:r>
+                  </m:oMath>
+                </a14:m>
+                <a:r>
+                  <a:rPr lang="en-US" dirty="0"/>
+                  <a:t> times as slow!!! (roughly)</a:t>
+                </a:r>
+              </a:p>
+            </p:txBody>
+          </p:sp>
+        </mc:Choice>
+        <mc:Fallback xmlns="">
+          <p:sp>
+            <p:nvSpPr>
+              <p:cNvPr id="3" name="Text Placeholder 2"/>
+              <p:cNvSpPr>
+                <a:spLocks noGrp="1" noRot="1" noChangeAspect="1" noMove="1" noResize="1" noEditPoints="1" noAdjustHandles="1" noChangeArrowheads="1" noChangeShapeType="1" noTextEdit="1"/>
+              </p:cNvSpPr>
+              <p:nvPr>
+                <p:ph type="body" idx="1"/>
+              </p:nvPr>
+            </p:nvSpPr>
+            <p:spPr>
+              <a:xfrm>
+                <a:off x="361950" y="4583637"/>
+                <a:ext cx="12306300" cy="3936999"/>
+              </a:xfrm>
+              <a:blipFill>
+                <a:blip r:embed="rId2"/>
+                <a:stretch>
+                  <a:fillRect l="-1139" t="-1703" b="-5108"/>
+                </a:stretch>
+              </a:blipFill>
+            </p:spPr>
+            <p:txBody>
+              <a:bodyPr/>
+              <a:lstStyle/>
+              <a:p>
+                <a:r>
+                  <a:rPr lang="en-US">
+                    <a:noFill/>
+                  </a:rPr>
+                  <a:t> </a:t>
+                </a:r>
+              </a:p>
+            </p:txBody>
+          </p:sp>
+        </mc:Fallback>
+      </mc:AlternateContent>
+      <p:sp>
+        <p:nvSpPr>
+          <p:cNvPr id="4" name="Rectangle 1"/>
+          <p:cNvSpPr>
+            <a:spLocks noChangeArrowheads="1"/>
+          </p:cNvSpPr>
+          <p:nvPr/>
+        </p:nvSpPr>
+        <p:spPr bwMode="auto">
+          <a:xfrm>
+            <a:off x="552451" y="759885"/>
+            <a:ext cx="7143750" cy="3785652"/>
+          </a:xfrm>
+          <a:prstGeom prst="rect">
+            <a:avLst/>
+          </a:prstGeom>
+          <a:solidFill>
+            <a:srgbClr val="FFFFFF"/>
+          </a:solidFill>
+          <a:ln>
+            <a:noFill/>
+          </a:ln>
+          <a:effectLst/>
+          <a:extLst>
+            <a:ext uri="{91240B29-F687-4F45-9708-019B960494DF}">
+              <a14:hiddenLine xmlns:a14="http://schemas.microsoft.com/office/drawing/2010/main" w="9525">
+                <a:solidFill>
+                  <a:schemeClr val="tx1"/>
+                </a:solidFill>
+                <a:miter lim="800000"/>
+                <a:headEnd/>
+                <a:tailEnd/>
+              </a14:hiddenLine>
+            </a:ext>
+            <a:ext uri="{AF507438-7753-43E0-B8FC-AC1667EBCBE1}">
+              <a14:hiddenEffects xmlns:a14="http://schemas.microsoft.com/office/drawing/2010/main">
+                <a:effectLst>
+                  <a:outerShdw dist="35921" dir="2700000" algn="ctr" rotWithShape="0">
+                    <a:schemeClr val="bg2"/>
+                  </a:outerShdw>
+                </a:effectLst>
+              </a14:hiddenEffects>
+            </a:ext>
+          </a:extLst>
+        </p:spPr>
+        <p:txBody>
+          <a:bodyPr vert="horz" wrap="square" lIns="91440" tIns="45720" rIns="91440" bIns="45720" numCol="1" anchor="ctr" anchorCtr="0" compatLnSpc="1">
+            <a:prstTxWarp prst="textNoShape">
+              <a:avLst/>
+            </a:prstTxWarp>
+            <a:spAutoFit/>
+          </a:bodyPr>
+          <a:lstStyle/>
+          <a:p>
+            <a:pPr marL="0" marR="0" lvl="0" indent="0" algn="l" defTabSz="914400" rtl="0" eaLnBrk="0" fontAlgn="base" latinLnBrk="0" hangingPunct="0">
+              <a:lnSpc>
+                <a:spcPct val="100000"/>
+              </a:lnSpc>
+              <a:spcBef>
+                <a:spcPct val="0"/>
+              </a:spcBef>
+              <a:spcAft>
+                <a:spcPct val="0"/>
+              </a:spcAft>
+              <a:buClrTx/>
+              <a:buSzTx/>
+              <a:buFontTx/>
+              <a:buNone/>
+              <a:tabLst/>
+            </a:pPr>
+            <a:r>
+              <a:rPr kumimoji="0" lang="en-US" altLang="en-US" sz="2000" b="1" i="0" u="none" strike="noStrike" cap="none" normalizeH="0" baseline="0" dirty="0">
+                <a:ln>
+                  <a:noFill/>
+                </a:ln>
+                <a:solidFill>
+                  <a:srgbClr val="000080"/>
+                </a:solidFill>
+                <a:effectLst/>
+                <a:latin typeface="Courier New" panose="02070309020205020404" pitchFamily="49" charset="0"/>
+                <a:cs typeface="Courier New" panose="02070309020205020404" pitchFamily="49" charset="0"/>
+              </a:rPr>
+              <a:t>public static </a:t>
+            </a:r>
+            <a:r>
+              <a:rPr kumimoji="0" lang="en-US" altLang="en-US" sz="2000" b="1" i="0" u="none" strike="noStrike" cap="none" normalizeH="0" baseline="0" dirty="0" err="1">
+                <a:ln>
+                  <a:noFill/>
+                </a:ln>
+                <a:solidFill>
+                  <a:srgbClr val="000080"/>
+                </a:solidFill>
+                <a:effectLst/>
+                <a:latin typeface="Courier New" panose="02070309020205020404" pitchFamily="49" charset="0"/>
+                <a:cs typeface="Courier New" panose="02070309020205020404" pitchFamily="49" charset="0"/>
+              </a:rPr>
+              <a:t>int</a:t>
+            </a:r>
+            <a:r>
+              <a:rPr kumimoji="0" lang="en-US" altLang="en-US" sz="2000" b="1" i="0" u="none" strike="noStrike" cap="none" normalizeH="0" baseline="0" dirty="0">
+                <a:ln>
+                  <a:noFill/>
+                </a:ln>
+                <a:solidFill>
+                  <a:srgbClr val="000080"/>
+                </a:solidFill>
+                <a:effectLst/>
+                <a:latin typeface="Courier New" panose="02070309020205020404" pitchFamily="49" charset="0"/>
+                <a:cs typeface="Courier New" panose="02070309020205020404" pitchFamily="49" charset="0"/>
+              </a:rPr>
+              <a:t> </a:t>
+            </a:r>
+            <a:r>
+              <a:rPr kumimoji="0" lang="en-US" altLang="en-US" sz="2000" b="0" i="0" u="none" strike="noStrike" cap="none" normalizeH="0" baseline="0" dirty="0">
+                <a:ln>
+                  <a:noFill/>
+                </a:ln>
+                <a:solidFill>
+                  <a:srgbClr val="000000"/>
+                </a:solidFill>
+                <a:effectLst/>
+                <a:latin typeface="Courier New" panose="02070309020205020404" pitchFamily="49" charset="0"/>
+                <a:cs typeface="Courier New" panose="02070309020205020404" pitchFamily="49" charset="0"/>
+              </a:rPr>
+              <a:t>pairs(</a:t>
+            </a:r>
+            <a:r>
+              <a:rPr kumimoji="0" lang="en-US" altLang="en-US" sz="2000" b="1" i="0" u="none" strike="noStrike" cap="none" normalizeH="0" baseline="0" dirty="0" err="1">
+                <a:ln>
+                  <a:noFill/>
+                </a:ln>
+                <a:solidFill>
+                  <a:srgbClr val="000080"/>
+                </a:solidFill>
+                <a:effectLst/>
+                <a:latin typeface="Courier New" panose="02070309020205020404" pitchFamily="49" charset="0"/>
+                <a:cs typeface="Courier New" panose="02070309020205020404" pitchFamily="49" charset="0"/>
+              </a:rPr>
+              <a:t>int</a:t>
+            </a:r>
+            <a:r>
+              <a:rPr kumimoji="0" lang="en-US" altLang="en-US" sz="2000" b="0" i="0" u="none" strike="noStrike" cap="none" normalizeH="0" baseline="0" dirty="0">
+                <a:ln>
+                  <a:noFill/>
+                </a:ln>
+                <a:solidFill>
+                  <a:srgbClr val="000000"/>
+                </a:solidFill>
+                <a:effectLst/>
+                <a:latin typeface="Courier New" panose="02070309020205020404" pitchFamily="49" charset="0"/>
+                <a:cs typeface="Courier New" panose="02070309020205020404" pitchFamily="49" charset="0"/>
+              </a:rPr>
+              <a:t>[] array){</a:t>
+            </a:r>
+            <a:br>
+              <a:rPr kumimoji="0" lang="en-US" altLang="en-US" sz="2000" b="0" i="0" u="none" strike="noStrike" cap="none" normalizeH="0" baseline="0" dirty="0">
+                <a:ln>
+                  <a:noFill/>
+                </a:ln>
+                <a:solidFill>
+                  <a:srgbClr val="000000"/>
+                </a:solidFill>
+                <a:effectLst/>
+                <a:latin typeface="Courier New" panose="02070309020205020404" pitchFamily="49" charset="0"/>
+                <a:cs typeface="Courier New" panose="02070309020205020404" pitchFamily="49" charset="0"/>
+              </a:rPr>
+            </a:br>
+            <a:r>
+              <a:rPr kumimoji="0" lang="en-US" altLang="en-US" sz="2000" b="0" i="0" u="none" strike="noStrike" cap="none" normalizeH="0" baseline="0" dirty="0">
+                <a:ln>
+                  <a:noFill/>
+                </a:ln>
+                <a:solidFill>
+                  <a:srgbClr val="000000"/>
+                </a:solidFill>
+                <a:effectLst/>
+                <a:latin typeface="Courier New" panose="02070309020205020404" pitchFamily="49" charset="0"/>
+                <a:cs typeface="Courier New" panose="02070309020205020404" pitchFamily="49" charset="0"/>
+              </a:rPr>
+              <a:t>    </a:t>
+            </a:r>
+            <a:r>
+              <a:rPr kumimoji="0" lang="en-US" altLang="en-US" sz="2000" b="1" i="0" u="none" strike="noStrike" cap="none" normalizeH="0" baseline="0" dirty="0" err="1">
+                <a:ln>
+                  <a:noFill/>
+                </a:ln>
+                <a:solidFill>
+                  <a:srgbClr val="000080"/>
+                </a:solidFill>
+                <a:effectLst/>
+                <a:latin typeface="Courier New" panose="02070309020205020404" pitchFamily="49" charset="0"/>
+                <a:cs typeface="Courier New" panose="02070309020205020404" pitchFamily="49" charset="0"/>
+              </a:rPr>
+              <a:t>int</a:t>
+            </a:r>
+            <a:r>
+              <a:rPr kumimoji="0" lang="en-US" altLang="en-US" sz="2000" b="1" i="0" u="none" strike="noStrike" cap="none" normalizeH="0" baseline="0" dirty="0">
+                <a:ln>
+                  <a:noFill/>
+                </a:ln>
+                <a:solidFill>
+                  <a:srgbClr val="000080"/>
+                </a:solidFill>
+                <a:effectLst/>
+                <a:latin typeface="Courier New" panose="02070309020205020404" pitchFamily="49" charset="0"/>
+                <a:cs typeface="Courier New" panose="02070309020205020404" pitchFamily="49" charset="0"/>
+              </a:rPr>
+              <a:t> </a:t>
+            </a:r>
+            <a:r>
+              <a:rPr kumimoji="0" lang="en-US" altLang="en-US" sz="2000" b="0" i="0" u="none" strike="noStrike" cap="none" normalizeH="0" baseline="0" dirty="0">
+                <a:ln>
+                  <a:noFill/>
+                </a:ln>
+                <a:solidFill>
+                  <a:srgbClr val="000000"/>
+                </a:solidFill>
+                <a:effectLst/>
+                <a:latin typeface="Courier New" panose="02070309020205020404" pitchFamily="49" charset="0"/>
+                <a:cs typeface="Courier New" panose="02070309020205020404" pitchFamily="49" charset="0"/>
+              </a:rPr>
+              <a:t>pairs = </a:t>
+            </a:r>
+            <a:r>
+              <a:rPr kumimoji="0" lang="en-US" altLang="en-US" sz="2000" b="0" i="0" u="none" strike="noStrike" cap="none" normalizeH="0" baseline="0" dirty="0">
+                <a:ln>
+                  <a:noFill/>
+                </a:ln>
+                <a:solidFill>
+                  <a:srgbClr val="0000FF"/>
+                </a:solidFill>
+                <a:effectLst/>
+                <a:latin typeface="Courier New" panose="02070309020205020404" pitchFamily="49" charset="0"/>
+                <a:cs typeface="Courier New" panose="02070309020205020404" pitchFamily="49" charset="0"/>
+              </a:rPr>
+              <a:t>0</a:t>
+            </a:r>
+            <a:r>
+              <a:rPr kumimoji="0" lang="en-US" altLang="en-US" sz="2000" b="0" i="0" u="none" strike="noStrike" cap="none" normalizeH="0" baseline="0" dirty="0">
+                <a:ln>
+                  <a:noFill/>
+                </a:ln>
+                <a:solidFill>
+                  <a:srgbClr val="000000"/>
+                </a:solidFill>
+                <a:effectLst/>
+                <a:latin typeface="Courier New" panose="02070309020205020404" pitchFamily="49" charset="0"/>
+                <a:cs typeface="Courier New" panose="02070309020205020404" pitchFamily="49" charset="0"/>
+              </a:rPr>
+              <a:t>;</a:t>
+            </a:r>
+          </a:p>
+          <a:p>
+            <a:pPr marL="0" marR="0" lvl="0" indent="0" algn="l" defTabSz="914400" rtl="0" eaLnBrk="0" fontAlgn="base" latinLnBrk="0" hangingPunct="0">
+              <a:lnSpc>
+                <a:spcPct val="100000"/>
+              </a:lnSpc>
+              <a:spcBef>
+                <a:spcPct val="0"/>
+              </a:spcBef>
+              <a:spcAft>
+                <a:spcPct val="0"/>
+              </a:spcAft>
+              <a:buClrTx/>
+              <a:buSzTx/>
+              <a:buFontTx/>
+              <a:buNone/>
+              <a:tabLst/>
+            </a:pPr>
+            <a:br>
+              <a:rPr kumimoji="0" lang="en-US" altLang="en-US" sz="2000" b="0" i="0" u="none" strike="noStrike" cap="none" normalizeH="0" baseline="0" dirty="0">
+                <a:ln>
+                  <a:noFill/>
+                </a:ln>
+                <a:solidFill>
+                  <a:srgbClr val="000000"/>
+                </a:solidFill>
+                <a:effectLst/>
+                <a:latin typeface="Courier New" panose="02070309020205020404" pitchFamily="49" charset="0"/>
+                <a:cs typeface="Courier New" panose="02070309020205020404" pitchFamily="49" charset="0"/>
+              </a:rPr>
+            </a:br>
+            <a:r>
+              <a:rPr kumimoji="0" lang="en-US" altLang="en-US" sz="2000" b="0" i="0" u="none" strike="noStrike" cap="none" normalizeH="0" baseline="0" dirty="0">
+                <a:ln>
+                  <a:noFill/>
+                </a:ln>
+                <a:solidFill>
+                  <a:srgbClr val="000000"/>
+                </a:solidFill>
+                <a:effectLst/>
+                <a:latin typeface="Courier New" panose="02070309020205020404" pitchFamily="49" charset="0"/>
+                <a:cs typeface="Courier New" panose="02070309020205020404" pitchFamily="49" charset="0"/>
+              </a:rPr>
+              <a:t>    </a:t>
+            </a:r>
+            <a:r>
+              <a:rPr kumimoji="0" lang="en-US" altLang="en-US" sz="2000" b="1" i="0" u="none" strike="noStrike" cap="none" normalizeH="0" baseline="0" dirty="0">
+                <a:ln>
+                  <a:noFill/>
+                </a:ln>
+                <a:solidFill>
+                  <a:srgbClr val="000080"/>
+                </a:solidFill>
+                <a:effectLst/>
+                <a:latin typeface="Courier New" panose="02070309020205020404" pitchFamily="49" charset="0"/>
+                <a:cs typeface="Courier New" panose="02070309020205020404" pitchFamily="49" charset="0"/>
+              </a:rPr>
+              <a:t>for</a:t>
+            </a:r>
+            <a:r>
+              <a:rPr kumimoji="0" lang="en-US" altLang="en-US" sz="2000" b="0" i="0" u="none" strike="noStrike" cap="none" normalizeH="0" baseline="0" dirty="0">
+                <a:ln>
+                  <a:noFill/>
+                </a:ln>
+                <a:solidFill>
+                  <a:srgbClr val="000000"/>
+                </a:solidFill>
+                <a:effectLst/>
+                <a:latin typeface="Courier New" panose="02070309020205020404" pitchFamily="49" charset="0"/>
+                <a:cs typeface="Courier New" panose="02070309020205020404" pitchFamily="49" charset="0"/>
+              </a:rPr>
+              <a:t>(</a:t>
+            </a:r>
+            <a:r>
+              <a:rPr kumimoji="0" lang="en-US" altLang="en-US" sz="2000" b="1" i="0" u="none" strike="noStrike" cap="none" normalizeH="0" baseline="0" dirty="0" err="1">
+                <a:ln>
+                  <a:noFill/>
+                </a:ln>
+                <a:solidFill>
+                  <a:srgbClr val="000080"/>
+                </a:solidFill>
+                <a:effectLst/>
+                <a:latin typeface="Courier New" panose="02070309020205020404" pitchFamily="49" charset="0"/>
+                <a:cs typeface="Courier New" panose="02070309020205020404" pitchFamily="49" charset="0"/>
+              </a:rPr>
+              <a:t>int</a:t>
+            </a:r>
+            <a:r>
+              <a:rPr kumimoji="0" lang="en-US" altLang="en-US" sz="2000" b="1" i="0" u="none" strike="noStrike" cap="none" normalizeH="0" baseline="0" dirty="0">
+                <a:ln>
+                  <a:noFill/>
+                </a:ln>
+                <a:solidFill>
+                  <a:srgbClr val="000080"/>
+                </a:solidFill>
+                <a:effectLst/>
+                <a:latin typeface="Courier New" panose="02070309020205020404" pitchFamily="49" charset="0"/>
+                <a:cs typeface="Courier New" panose="02070309020205020404" pitchFamily="49" charset="0"/>
+              </a:rPr>
+              <a:t> </a:t>
+            </a:r>
+            <a:r>
+              <a:rPr kumimoji="0" lang="en-US" altLang="en-US" sz="2000" b="0" i="0" u="none" strike="noStrike" cap="none" normalizeH="0" baseline="0" dirty="0" err="1">
+                <a:ln>
+                  <a:noFill/>
+                </a:ln>
+                <a:solidFill>
+                  <a:srgbClr val="000000"/>
+                </a:solidFill>
+                <a:effectLst/>
+                <a:latin typeface="Courier New" panose="02070309020205020404" pitchFamily="49" charset="0"/>
+                <a:cs typeface="Courier New" panose="02070309020205020404" pitchFamily="49" charset="0"/>
+              </a:rPr>
+              <a:t>i</a:t>
+            </a:r>
+            <a:r>
+              <a:rPr kumimoji="0" lang="en-US" altLang="en-US" sz="2000" b="0" i="0" u="none" strike="noStrike" cap="none" normalizeH="0" baseline="0" dirty="0">
+                <a:ln>
+                  <a:noFill/>
+                </a:ln>
+                <a:solidFill>
+                  <a:srgbClr val="000000"/>
+                </a:solidFill>
+                <a:effectLst/>
+                <a:latin typeface="Courier New" panose="02070309020205020404" pitchFamily="49" charset="0"/>
+                <a:cs typeface="Courier New" panose="02070309020205020404" pitchFamily="49" charset="0"/>
+              </a:rPr>
+              <a:t>=</a:t>
+            </a:r>
+            <a:r>
+              <a:rPr kumimoji="0" lang="en-US" altLang="en-US" sz="2000" b="0" i="0" u="none" strike="noStrike" cap="none" normalizeH="0" baseline="0" dirty="0">
+                <a:ln>
+                  <a:noFill/>
+                </a:ln>
+                <a:solidFill>
+                  <a:srgbClr val="0000FF"/>
+                </a:solidFill>
+                <a:effectLst/>
+                <a:latin typeface="Courier New" panose="02070309020205020404" pitchFamily="49" charset="0"/>
+                <a:cs typeface="Courier New" panose="02070309020205020404" pitchFamily="49" charset="0"/>
+              </a:rPr>
+              <a:t>0</a:t>
+            </a:r>
+            <a:r>
+              <a:rPr kumimoji="0" lang="en-US" altLang="en-US" sz="2000" b="0" i="0" u="none" strike="noStrike" cap="none" normalizeH="0" baseline="0" dirty="0">
+                <a:ln>
+                  <a:noFill/>
+                </a:ln>
+                <a:solidFill>
+                  <a:srgbClr val="000000"/>
+                </a:solidFill>
+                <a:effectLst/>
+                <a:latin typeface="Courier New" panose="02070309020205020404" pitchFamily="49" charset="0"/>
+                <a:cs typeface="Courier New" panose="02070309020205020404" pitchFamily="49" charset="0"/>
+              </a:rPr>
+              <a:t>; </a:t>
+            </a:r>
+            <a:r>
+              <a:rPr kumimoji="0" lang="en-US" altLang="en-US" sz="2000" b="0" i="0" u="none" strike="noStrike" cap="none" normalizeH="0" baseline="0" dirty="0" err="1">
+                <a:ln>
+                  <a:noFill/>
+                </a:ln>
+                <a:solidFill>
+                  <a:srgbClr val="000000"/>
+                </a:solidFill>
+                <a:effectLst/>
+                <a:latin typeface="Courier New" panose="02070309020205020404" pitchFamily="49" charset="0"/>
+                <a:cs typeface="Courier New" panose="02070309020205020404" pitchFamily="49" charset="0"/>
+              </a:rPr>
+              <a:t>i</a:t>
+            </a:r>
+            <a:r>
+              <a:rPr kumimoji="0" lang="en-US" altLang="en-US" sz="2000" b="0" i="0" u="none" strike="noStrike" cap="none" normalizeH="0" baseline="0" dirty="0">
+                <a:ln>
+                  <a:noFill/>
+                </a:ln>
+                <a:solidFill>
+                  <a:srgbClr val="000000"/>
+                </a:solidFill>
+                <a:effectLst/>
+                <a:latin typeface="Courier New" panose="02070309020205020404" pitchFamily="49" charset="0"/>
+                <a:cs typeface="Courier New" panose="02070309020205020404" pitchFamily="49" charset="0"/>
+              </a:rPr>
+              <a:t>&lt;</a:t>
+            </a:r>
+            <a:r>
+              <a:rPr kumimoji="0" lang="en-US" altLang="en-US" sz="2000" b="0" i="0" u="none" strike="noStrike" cap="none" normalizeH="0" baseline="0" dirty="0" err="1">
+                <a:ln>
+                  <a:noFill/>
+                </a:ln>
+                <a:solidFill>
+                  <a:srgbClr val="000000"/>
+                </a:solidFill>
+                <a:effectLst/>
+                <a:latin typeface="Courier New" panose="02070309020205020404" pitchFamily="49" charset="0"/>
+                <a:cs typeface="Courier New" panose="02070309020205020404" pitchFamily="49" charset="0"/>
+              </a:rPr>
+              <a:t>array.</a:t>
+            </a:r>
+            <a:r>
+              <a:rPr kumimoji="0" lang="en-US" altLang="en-US" sz="2000" b="1" i="0" u="none" strike="noStrike" cap="none" normalizeH="0" baseline="0" dirty="0" err="1">
+                <a:ln>
+                  <a:noFill/>
+                </a:ln>
+                <a:solidFill>
+                  <a:srgbClr val="660E7A"/>
+                </a:solidFill>
+                <a:effectLst/>
+                <a:latin typeface="Courier New" panose="02070309020205020404" pitchFamily="49" charset="0"/>
+                <a:cs typeface="Courier New" panose="02070309020205020404" pitchFamily="49" charset="0"/>
+              </a:rPr>
+              <a:t>length</a:t>
+            </a:r>
+            <a:r>
+              <a:rPr kumimoji="0" lang="en-US" altLang="en-US" sz="2000" b="0" i="0" u="none" strike="noStrike" cap="none" normalizeH="0" baseline="0" dirty="0">
+                <a:ln>
+                  <a:noFill/>
+                </a:ln>
+                <a:solidFill>
+                  <a:srgbClr val="000000"/>
+                </a:solidFill>
+                <a:effectLst/>
+                <a:latin typeface="Courier New" panose="02070309020205020404" pitchFamily="49" charset="0"/>
+                <a:cs typeface="Courier New" panose="02070309020205020404" pitchFamily="49" charset="0"/>
+              </a:rPr>
+              <a:t>; </a:t>
+            </a:r>
+            <a:r>
+              <a:rPr kumimoji="0" lang="en-US" altLang="en-US" sz="2000" b="0" i="0" u="none" strike="noStrike" cap="none" normalizeH="0" baseline="0" dirty="0" err="1">
+                <a:ln>
+                  <a:noFill/>
+                </a:ln>
+                <a:solidFill>
+                  <a:srgbClr val="000000"/>
+                </a:solidFill>
+                <a:effectLst/>
+                <a:latin typeface="Courier New" panose="02070309020205020404" pitchFamily="49" charset="0"/>
+                <a:cs typeface="Courier New" panose="02070309020205020404" pitchFamily="49" charset="0"/>
+              </a:rPr>
+              <a:t>i</a:t>
+            </a:r>
+            <a:r>
+              <a:rPr kumimoji="0" lang="en-US" altLang="en-US" sz="2000" b="0" i="0" u="none" strike="noStrike" cap="none" normalizeH="0" baseline="0" dirty="0">
+                <a:ln>
+                  <a:noFill/>
+                </a:ln>
+                <a:solidFill>
+                  <a:srgbClr val="000000"/>
+                </a:solidFill>
+                <a:effectLst/>
+                <a:latin typeface="Courier New" panose="02070309020205020404" pitchFamily="49" charset="0"/>
+                <a:cs typeface="Courier New" panose="02070309020205020404" pitchFamily="49" charset="0"/>
+              </a:rPr>
+              <a:t>++){</a:t>
+            </a:r>
+            <a:br>
+              <a:rPr kumimoji="0" lang="en-US" altLang="en-US" sz="2000" b="0" i="0" u="none" strike="noStrike" cap="none" normalizeH="0" baseline="0" dirty="0">
+                <a:ln>
+                  <a:noFill/>
+                </a:ln>
+                <a:solidFill>
+                  <a:srgbClr val="000000"/>
+                </a:solidFill>
+                <a:effectLst/>
+                <a:latin typeface="Courier New" panose="02070309020205020404" pitchFamily="49" charset="0"/>
+                <a:cs typeface="Courier New" panose="02070309020205020404" pitchFamily="49" charset="0"/>
+              </a:rPr>
+            </a:br>
+            <a:r>
+              <a:rPr kumimoji="0" lang="en-US" altLang="en-US" sz="2000" b="0" i="0" u="none" strike="noStrike" cap="none" normalizeH="0" baseline="0" dirty="0">
+                <a:ln>
+                  <a:noFill/>
+                </a:ln>
+                <a:solidFill>
+                  <a:srgbClr val="000000"/>
+                </a:solidFill>
+                <a:effectLst/>
+                <a:latin typeface="Courier New" panose="02070309020205020404" pitchFamily="49" charset="0"/>
+                <a:cs typeface="Courier New" panose="02070309020205020404" pitchFamily="49" charset="0"/>
+              </a:rPr>
+              <a:t>        </a:t>
+            </a:r>
+            <a:r>
+              <a:rPr kumimoji="0" lang="en-US" altLang="en-US" sz="2000" b="1" i="0" u="none" strike="noStrike" cap="none" normalizeH="0" baseline="0" dirty="0">
+                <a:ln>
+                  <a:noFill/>
+                </a:ln>
+                <a:solidFill>
+                  <a:srgbClr val="000080"/>
+                </a:solidFill>
+                <a:effectLst/>
+                <a:latin typeface="Courier New" panose="02070309020205020404" pitchFamily="49" charset="0"/>
+                <a:cs typeface="Courier New" panose="02070309020205020404" pitchFamily="49" charset="0"/>
+              </a:rPr>
+              <a:t>for</a:t>
+            </a:r>
+            <a:r>
+              <a:rPr kumimoji="0" lang="en-US" altLang="en-US" sz="2000" b="0" i="0" u="none" strike="noStrike" cap="none" normalizeH="0" baseline="0" dirty="0">
+                <a:ln>
+                  <a:noFill/>
+                </a:ln>
+                <a:solidFill>
+                  <a:srgbClr val="000000"/>
+                </a:solidFill>
+                <a:effectLst/>
+                <a:latin typeface="Courier New" panose="02070309020205020404" pitchFamily="49" charset="0"/>
+                <a:cs typeface="Courier New" panose="02070309020205020404" pitchFamily="49" charset="0"/>
+              </a:rPr>
+              <a:t>(</a:t>
+            </a:r>
+            <a:r>
+              <a:rPr kumimoji="0" lang="en-US" altLang="en-US" sz="2000" b="1" i="0" u="none" strike="noStrike" cap="none" normalizeH="0" baseline="0" dirty="0" err="1">
+                <a:ln>
+                  <a:noFill/>
+                </a:ln>
+                <a:solidFill>
+                  <a:srgbClr val="000080"/>
+                </a:solidFill>
+                <a:effectLst/>
+                <a:latin typeface="Courier New" panose="02070309020205020404" pitchFamily="49" charset="0"/>
+                <a:cs typeface="Courier New" panose="02070309020205020404" pitchFamily="49" charset="0"/>
+              </a:rPr>
+              <a:t>int</a:t>
+            </a:r>
+            <a:r>
+              <a:rPr kumimoji="0" lang="en-US" altLang="en-US" sz="2000" b="1" i="0" u="none" strike="noStrike" cap="none" normalizeH="0" baseline="0" dirty="0">
+                <a:ln>
+                  <a:noFill/>
+                </a:ln>
+                <a:solidFill>
+                  <a:srgbClr val="000080"/>
+                </a:solidFill>
+                <a:effectLst/>
+                <a:latin typeface="Courier New" panose="02070309020205020404" pitchFamily="49" charset="0"/>
+                <a:cs typeface="Courier New" panose="02070309020205020404" pitchFamily="49" charset="0"/>
+              </a:rPr>
+              <a:t> </a:t>
+            </a:r>
+            <a:r>
+              <a:rPr kumimoji="0" lang="en-US" altLang="en-US" sz="2000" b="0" i="0" u="none" strike="noStrike" cap="none" normalizeH="0" baseline="0" dirty="0">
+                <a:ln>
+                  <a:noFill/>
+                </a:ln>
+                <a:solidFill>
+                  <a:srgbClr val="000000"/>
+                </a:solidFill>
+                <a:effectLst/>
+                <a:latin typeface="Courier New" panose="02070309020205020404" pitchFamily="49" charset="0"/>
+                <a:cs typeface="Courier New" panose="02070309020205020404" pitchFamily="49" charset="0"/>
+              </a:rPr>
+              <a:t>j=</a:t>
+            </a:r>
+            <a:r>
+              <a:rPr kumimoji="0" lang="en-US" altLang="en-US" sz="2000" b="0" i="0" u="none" strike="noStrike" cap="none" normalizeH="0" baseline="0" dirty="0">
+                <a:ln>
+                  <a:noFill/>
+                </a:ln>
+                <a:solidFill>
+                  <a:srgbClr val="0000FF"/>
+                </a:solidFill>
+                <a:effectLst/>
+                <a:latin typeface="Courier New" panose="02070309020205020404" pitchFamily="49" charset="0"/>
+                <a:cs typeface="Courier New" panose="02070309020205020404" pitchFamily="49" charset="0"/>
+              </a:rPr>
+              <a:t>0</a:t>
+            </a:r>
+            <a:r>
+              <a:rPr kumimoji="0" lang="en-US" altLang="en-US" sz="2000" b="0" i="0" u="none" strike="noStrike" cap="none" normalizeH="0" baseline="0" dirty="0">
+                <a:ln>
+                  <a:noFill/>
+                </a:ln>
+                <a:solidFill>
+                  <a:srgbClr val="000000"/>
+                </a:solidFill>
+                <a:effectLst/>
+                <a:latin typeface="Courier New" panose="02070309020205020404" pitchFamily="49" charset="0"/>
+                <a:cs typeface="Courier New" panose="02070309020205020404" pitchFamily="49" charset="0"/>
+              </a:rPr>
+              <a:t>; j&lt;</a:t>
+            </a:r>
+            <a:r>
+              <a:rPr kumimoji="0" lang="en-US" altLang="en-US" sz="2000" b="0" i="0" u="none" strike="noStrike" cap="none" normalizeH="0" baseline="0" dirty="0" err="1">
+                <a:ln>
+                  <a:noFill/>
+                </a:ln>
+                <a:solidFill>
+                  <a:srgbClr val="000000"/>
+                </a:solidFill>
+                <a:effectLst/>
+                <a:latin typeface="Courier New" panose="02070309020205020404" pitchFamily="49" charset="0"/>
+                <a:cs typeface="Courier New" panose="02070309020205020404" pitchFamily="49" charset="0"/>
+              </a:rPr>
+              <a:t>array.</a:t>
+            </a:r>
+            <a:r>
+              <a:rPr kumimoji="0" lang="en-US" altLang="en-US" sz="2000" b="1" i="0" u="none" strike="noStrike" cap="none" normalizeH="0" baseline="0" dirty="0" err="1">
+                <a:ln>
+                  <a:noFill/>
+                </a:ln>
+                <a:solidFill>
+                  <a:srgbClr val="660E7A"/>
+                </a:solidFill>
+                <a:effectLst/>
+                <a:latin typeface="Courier New" panose="02070309020205020404" pitchFamily="49" charset="0"/>
+                <a:cs typeface="Courier New" panose="02070309020205020404" pitchFamily="49" charset="0"/>
+              </a:rPr>
+              <a:t>length</a:t>
+            </a:r>
+            <a:r>
+              <a:rPr kumimoji="0" lang="en-US" altLang="en-US" sz="2000" b="0" i="0" u="none" strike="noStrike" cap="none" normalizeH="0" baseline="0" dirty="0">
+                <a:ln>
+                  <a:noFill/>
+                </a:ln>
+                <a:solidFill>
+                  <a:srgbClr val="000000"/>
+                </a:solidFill>
+                <a:effectLst/>
+                <a:latin typeface="Courier New" panose="02070309020205020404" pitchFamily="49" charset="0"/>
+                <a:cs typeface="Courier New" panose="02070309020205020404" pitchFamily="49" charset="0"/>
+              </a:rPr>
+              <a:t>; </a:t>
+            </a:r>
+            <a:r>
+              <a:rPr kumimoji="0" lang="en-US" altLang="en-US" sz="2000" b="0" i="0" u="none" strike="noStrike" cap="none" normalizeH="0" baseline="0" dirty="0" err="1">
+                <a:ln>
+                  <a:noFill/>
+                </a:ln>
+                <a:solidFill>
+                  <a:srgbClr val="000000"/>
+                </a:solidFill>
+                <a:effectLst/>
+                <a:latin typeface="Courier New" panose="02070309020205020404" pitchFamily="49" charset="0"/>
+                <a:cs typeface="Courier New" panose="02070309020205020404" pitchFamily="49" charset="0"/>
+              </a:rPr>
+              <a:t>j++</a:t>
+            </a:r>
+            <a:r>
+              <a:rPr kumimoji="0" lang="en-US" altLang="en-US" sz="2000" b="0" i="0" u="none" strike="noStrike" cap="none" normalizeH="0" baseline="0" dirty="0">
+                <a:ln>
+                  <a:noFill/>
+                </a:ln>
+                <a:solidFill>
+                  <a:srgbClr val="000000"/>
+                </a:solidFill>
+                <a:effectLst/>
+                <a:latin typeface="Courier New" panose="02070309020205020404" pitchFamily="49" charset="0"/>
+                <a:cs typeface="Courier New" panose="02070309020205020404" pitchFamily="49" charset="0"/>
+              </a:rPr>
+              <a:t>){</a:t>
+            </a:r>
+            <a:br>
+              <a:rPr kumimoji="0" lang="en-US" altLang="en-US" sz="2000" b="0" i="0" u="none" strike="noStrike" cap="none" normalizeH="0" baseline="0" dirty="0">
+                <a:ln>
+                  <a:noFill/>
+                </a:ln>
+                <a:solidFill>
+                  <a:srgbClr val="000000"/>
+                </a:solidFill>
+                <a:effectLst/>
+                <a:latin typeface="Courier New" panose="02070309020205020404" pitchFamily="49" charset="0"/>
+                <a:cs typeface="Courier New" panose="02070309020205020404" pitchFamily="49" charset="0"/>
+              </a:rPr>
+            </a:br>
+            <a:r>
+              <a:rPr kumimoji="0" lang="en-US" altLang="en-US" sz="2000" b="0" i="0" u="none" strike="noStrike" cap="none" normalizeH="0" baseline="0" dirty="0">
+                <a:ln>
+                  <a:noFill/>
+                </a:ln>
+                <a:solidFill>
+                  <a:srgbClr val="000000"/>
+                </a:solidFill>
+                <a:effectLst/>
+                <a:latin typeface="Courier New" panose="02070309020205020404" pitchFamily="49" charset="0"/>
+                <a:cs typeface="Courier New" panose="02070309020205020404" pitchFamily="49" charset="0"/>
+              </a:rPr>
+              <a:t>            </a:t>
+            </a:r>
+            <a:r>
+              <a:rPr kumimoji="0" lang="en-US" altLang="en-US" sz="2000" b="1" i="0" u="none" strike="noStrike" cap="none" normalizeH="0" baseline="0" dirty="0">
+                <a:ln>
+                  <a:noFill/>
+                </a:ln>
+                <a:solidFill>
+                  <a:srgbClr val="000080"/>
+                </a:solidFill>
+                <a:effectLst/>
+                <a:latin typeface="Courier New" panose="02070309020205020404" pitchFamily="49" charset="0"/>
+                <a:cs typeface="Courier New" panose="02070309020205020404" pitchFamily="49" charset="0"/>
+              </a:rPr>
+              <a:t>if</a:t>
+            </a:r>
+            <a:r>
+              <a:rPr kumimoji="0" lang="en-US" altLang="en-US" sz="2000" b="0" i="0" u="none" strike="noStrike" cap="none" normalizeH="0" baseline="0" dirty="0">
+                <a:ln>
+                  <a:noFill/>
+                </a:ln>
+                <a:solidFill>
+                  <a:srgbClr val="000000"/>
+                </a:solidFill>
+                <a:effectLst/>
+                <a:latin typeface="Courier New" panose="02070309020205020404" pitchFamily="49" charset="0"/>
+                <a:cs typeface="Courier New" panose="02070309020205020404" pitchFamily="49" charset="0"/>
+              </a:rPr>
+              <a:t>(</a:t>
+            </a:r>
+            <a:r>
+              <a:rPr kumimoji="0" lang="en-US" altLang="en-US" sz="2000" b="0" i="0" u="none" strike="noStrike" cap="none" normalizeH="0" baseline="0" dirty="0" err="1">
+                <a:ln>
+                  <a:noFill/>
+                </a:ln>
+                <a:solidFill>
+                  <a:srgbClr val="000000"/>
+                </a:solidFill>
+                <a:effectLst/>
+                <a:latin typeface="Courier New" panose="02070309020205020404" pitchFamily="49" charset="0"/>
+                <a:cs typeface="Courier New" panose="02070309020205020404" pitchFamily="49" charset="0"/>
+              </a:rPr>
+              <a:t>i</a:t>
+            </a:r>
+            <a:r>
+              <a:rPr kumimoji="0" lang="en-US" altLang="en-US" sz="2000" b="0" i="0" u="none" strike="noStrike" cap="none" normalizeH="0" baseline="0" dirty="0">
+                <a:ln>
+                  <a:noFill/>
+                </a:ln>
+                <a:solidFill>
+                  <a:srgbClr val="000000"/>
+                </a:solidFill>
+                <a:effectLst/>
+                <a:latin typeface="Courier New" panose="02070309020205020404" pitchFamily="49" charset="0"/>
+                <a:cs typeface="Courier New" panose="02070309020205020404" pitchFamily="49" charset="0"/>
+              </a:rPr>
+              <a:t>!=j &amp;&amp; array[</a:t>
+            </a:r>
+            <a:r>
+              <a:rPr kumimoji="0" lang="en-US" altLang="en-US" sz="2000" b="0" i="0" u="none" strike="noStrike" cap="none" normalizeH="0" baseline="0" dirty="0" err="1">
+                <a:ln>
+                  <a:noFill/>
+                </a:ln>
+                <a:solidFill>
+                  <a:srgbClr val="000000"/>
+                </a:solidFill>
+                <a:effectLst/>
+                <a:latin typeface="Courier New" panose="02070309020205020404" pitchFamily="49" charset="0"/>
+                <a:cs typeface="Courier New" panose="02070309020205020404" pitchFamily="49" charset="0"/>
+              </a:rPr>
+              <a:t>i</a:t>
+            </a:r>
+            <a:r>
+              <a:rPr kumimoji="0" lang="en-US" altLang="en-US" sz="2000" b="0" i="0" u="none" strike="noStrike" cap="none" normalizeH="0" baseline="0" dirty="0">
+                <a:ln>
+                  <a:noFill/>
+                </a:ln>
+                <a:solidFill>
+                  <a:srgbClr val="000000"/>
+                </a:solidFill>
+                <a:effectLst/>
+                <a:latin typeface="Courier New" panose="02070309020205020404" pitchFamily="49" charset="0"/>
+                <a:cs typeface="Courier New" panose="02070309020205020404" pitchFamily="49" charset="0"/>
+              </a:rPr>
+              <a:t>] == array[j]){</a:t>
+            </a:r>
+            <a:br>
+              <a:rPr kumimoji="0" lang="en-US" altLang="en-US" sz="2000" b="0" i="0" u="none" strike="noStrike" cap="none" normalizeH="0" baseline="0" dirty="0">
+                <a:ln>
+                  <a:noFill/>
+                </a:ln>
+                <a:solidFill>
+                  <a:srgbClr val="000000"/>
+                </a:solidFill>
+                <a:effectLst/>
+                <a:latin typeface="Courier New" panose="02070309020205020404" pitchFamily="49" charset="0"/>
+                <a:cs typeface="Courier New" panose="02070309020205020404" pitchFamily="49" charset="0"/>
+              </a:rPr>
+            </a:br>
+            <a:r>
+              <a:rPr kumimoji="0" lang="en-US" altLang="en-US" sz="2000" b="0" i="0" u="none" strike="noStrike" cap="none" normalizeH="0" baseline="0" dirty="0">
+                <a:ln>
+                  <a:noFill/>
+                </a:ln>
+                <a:solidFill>
+                  <a:srgbClr val="000000"/>
+                </a:solidFill>
+                <a:effectLst/>
+                <a:latin typeface="Courier New" panose="02070309020205020404" pitchFamily="49" charset="0"/>
+                <a:cs typeface="Courier New" panose="02070309020205020404" pitchFamily="49" charset="0"/>
+              </a:rPr>
+              <a:t>                pairs++;</a:t>
+            </a:r>
+            <a:br>
+              <a:rPr kumimoji="0" lang="en-US" altLang="en-US" sz="2000" b="0" i="0" u="none" strike="noStrike" cap="none" normalizeH="0" baseline="0" dirty="0">
+                <a:ln>
+                  <a:noFill/>
+                </a:ln>
+                <a:solidFill>
+                  <a:srgbClr val="000000"/>
+                </a:solidFill>
+                <a:effectLst/>
+                <a:latin typeface="Courier New" panose="02070309020205020404" pitchFamily="49" charset="0"/>
+                <a:cs typeface="Courier New" panose="02070309020205020404" pitchFamily="49" charset="0"/>
+              </a:rPr>
+            </a:br>
+            <a:r>
+              <a:rPr kumimoji="0" lang="en-US" altLang="en-US" sz="2000" b="0" i="0" u="none" strike="noStrike" cap="none" normalizeH="0" baseline="0" dirty="0">
+                <a:ln>
+                  <a:noFill/>
+                </a:ln>
+                <a:solidFill>
+                  <a:srgbClr val="000000"/>
+                </a:solidFill>
+                <a:effectLst/>
+                <a:latin typeface="Courier New" panose="02070309020205020404" pitchFamily="49" charset="0"/>
+                <a:cs typeface="Courier New" panose="02070309020205020404" pitchFamily="49" charset="0"/>
+              </a:rPr>
+              <a:t>            }</a:t>
+            </a:r>
+            <a:br>
+              <a:rPr kumimoji="0" lang="en-US" altLang="en-US" sz="2000" b="0" i="0" u="none" strike="noStrike" cap="none" normalizeH="0" baseline="0" dirty="0">
+                <a:ln>
+                  <a:noFill/>
+                </a:ln>
+                <a:solidFill>
+                  <a:srgbClr val="000000"/>
+                </a:solidFill>
+                <a:effectLst/>
+                <a:latin typeface="Courier New" panose="02070309020205020404" pitchFamily="49" charset="0"/>
+                <a:cs typeface="Courier New" panose="02070309020205020404" pitchFamily="49" charset="0"/>
+              </a:rPr>
+            </a:br>
+            <a:r>
+              <a:rPr kumimoji="0" lang="en-US" altLang="en-US" sz="2000" b="0" i="0" u="none" strike="noStrike" cap="none" normalizeH="0" baseline="0" dirty="0">
+                <a:ln>
+                  <a:noFill/>
+                </a:ln>
+                <a:solidFill>
+                  <a:srgbClr val="000000"/>
+                </a:solidFill>
+                <a:effectLst/>
+                <a:latin typeface="Courier New" panose="02070309020205020404" pitchFamily="49" charset="0"/>
+                <a:cs typeface="Courier New" panose="02070309020205020404" pitchFamily="49" charset="0"/>
+              </a:rPr>
+              <a:t>        }</a:t>
+            </a:r>
+            <a:br>
+              <a:rPr kumimoji="0" lang="en-US" altLang="en-US" sz="2000" b="0" i="0" u="none" strike="noStrike" cap="none" normalizeH="0" baseline="0" dirty="0">
+                <a:ln>
+                  <a:noFill/>
+                </a:ln>
+                <a:solidFill>
+                  <a:srgbClr val="000000"/>
+                </a:solidFill>
+                <a:effectLst/>
+                <a:latin typeface="Courier New" panose="02070309020205020404" pitchFamily="49" charset="0"/>
+                <a:cs typeface="Courier New" panose="02070309020205020404" pitchFamily="49" charset="0"/>
+              </a:rPr>
+            </a:br>
+            <a:r>
+              <a:rPr kumimoji="0" lang="en-US" altLang="en-US" sz="2000" b="0" i="0" u="none" strike="noStrike" cap="none" normalizeH="0" baseline="0" dirty="0">
+                <a:ln>
+                  <a:noFill/>
+                </a:ln>
+                <a:solidFill>
+                  <a:srgbClr val="000000"/>
+                </a:solidFill>
+                <a:effectLst/>
+                <a:latin typeface="Courier New" panose="02070309020205020404" pitchFamily="49" charset="0"/>
+                <a:cs typeface="Courier New" panose="02070309020205020404" pitchFamily="49" charset="0"/>
+              </a:rPr>
+              <a:t>    }</a:t>
+            </a:r>
+            <a:br>
+              <a:rPr kumimoji="0" lang="en-US" altLang="en-US" sz="2000" b="0" i="0" u="none" strike="noStrike" cap="none" normalizeH="0" baseline="0" dirty="0">
+                <a:ln>
+                  <a:noFill/>
+                </a:ln>
+                <a:solidFill>
+                  <a:srgbClr val="000000"/>
+                </a:solidFill>
+                <a:effectLst/>
+                <a:latin typeface="Courier New" panose="02070309020205020404" pitchFamily="49" charset="0"/>
+                <a:cs typeface="Courier New" panose="02070309020205020404" pitchFamily="49" charset="0"/>
+              </a:rPr>
+            </a:br>
+            <a:r>
+              <a:rPr kumimoji="0" lang="en-US" altLang="en-US" sz="2000" b="0" i="0" u="none" strike="noStrike" cap="none" normalizeH="0" baseline="0" dirty="0">
+                <a:ln>
+                  <a:noFill/>
+                </a:ln>
+                <a:solidFill>
+                  <a:srgbClr val="000000"/>
+                </a:solidFill>
+                <a:effectLst/>
+                <a:latin typeface="Courier New" panose="02070309020205020404" pitchFamily="49" charset="0"/>
+                <a:cs typeface="Courier New" panose="02070309020205020404" pitchFamily="49" charset="0"/>
+              </a:rPr>
+              <a:t>    </a:t>
+            </a:r>
+            <a:r>
+              <a:rPr kumimoji="0" lang="en-US" altLang="en-US" sz="2000" b="1" i="0" u="none" strike="noStrike" cap="none" normalizeH="0" baseline="0" dirty="0">
+                <a:ln>
+                  <a:noFill/>
+                </a:ln>
+                <a:solidFill>
+                  <a:srgbClr val="000080"/>
+                </a:solidFill>
+                <a:effectLst/>
+                <a:latin typeface="Courier New" panose="02070309020205020404" pitchFamily="49" charset="0"/>
+                <a:cs typeface="Courier New" panose="02070309020205020404" pitchFamily="49" charset="0"/>
+              </a:rPr>
+              <a:t>return </a:t>
+            </a:r>
+            <a:r>
+              <a:rPr kumimoji="0" lang="en-US" altLang="en-US" sz="2000" b="0" i="0" u="none" strike="noStrike" cap="none" normalizeH="0" baseline="0" dirty="0">
+                <a:ln>
+                  <a:noFill/>
+                </a:ln>
+                <a:solidFill>
+                  <a:srgbClr val="000000"/>
+                </a:solidFill>
+                <a:effectLst/>
+                <a:latin typeface="Courier New" panose="02070309020205020404" pitchFamily="49" charset="0"/>
+                <a:cs typeface="Courier New" panose="02070309020205020404" pitchFamily="49" charset="0"/>
+              </a:rPr>
+              <a:t>pairs;</a:t>
+            </a:r>
+            <a:br>
+              <a:rPr kumimoji="0" lang="en-US" altLang="en-US" sz="2000" b="0" i="0" u="none" strike="noStrike" cap="none" normalizeH="0" baseline="0" dirty="0">
+                <a:ln>
+                  <a:noFill/>
+                </a:ln>
+                <a:solidFill>
+                  <a:srgbClr val="000000"/>
+                </a:solidFill>
+                <a:effectLst/>
+                <a:latin typeface="Courier New" panose="02070309020205020404" pitchFamily="49" charset="0"/>
+                <a:cs typeface="Courier New" panose="02070309020205020404" pitchFamily="49" charset="0"/>
+              </a:rPr>
+            </a:br>
+            <a:r>
+              <a:rPr kumimoji="0" lang="en-US" altLang="en-US" sz="2000" b="0" i="0" u="none" strike="noStrike" cap="none" normalizeH="0" baseline="0" dirty="0">
+                <a:ln>
+                  <a:noFill/>
+                </a:ln>
+                <a:solidFill>
+                  <a:srgbClr val="000000"/>
+                </a:solidFill>
+                <a:effectLst/>
+                <a:latin typeface="Courier New" panose="02070309020205020404" pitchFamily="49" charset="0"/>
+                <a:cs typeface="Courier New" panose="02070309020205020404" pitchFamily="49" charset="0"/>
+              </a:rPr>
+              <a:t>}</a:t>
+            </a:r>
+            <a:endParaRPr kumimoji="0" lang="en-US" altLang="en-US" sz="2000" b="0" i="0" u="none" strike="noStrike" cap="none" normalizeH="0" baseline="0" dirty="0">
+              <a:ln>
+                <a:noFill/>
+              </a:ln>
+              <a:solidFill>
+                <a:schemeClr val="tx1"/>
+              </a:solidFill>
+              <a:effectLst/>
+              <a:latin typeface="Arial" panose="020B0604020202020204" pitchFamily="34" charset="0"/>
+            </a:endParaRPr>
+          </a:p>
+        </p:txBody>
+      </p:sp>
+      <p:sp>
+        <p:nvSpPr>
+          <p:cNvPr id="5" name="Rectangle 2"/>
+          <p:cNvSpPr>
+            <a:spLocks noChangeArrowheads="1"/>
+          </p:cNvSpPr>
+          <p:nvPr/>
+        </p:nvSpPr>
+        <p:spPr bwMode="auto">
+          <a:xfrm>
+            <a:off x="7524750" y="201602"/>
+            <a:ext cx="5372100" cy="3416320"/>
+          </a:xfrm>
+          <a:prstGeom prst="rect">
+            <a:avLst/>
+          </a:prstGeom>
+          <a:solidFill>
+            <a:srgbClr val="FFFFFF"/>
+          </a:solidFill>
+          <a:ln>
+            <a:noFill/>
+          </a:ln>
+          <a:effectLst/>
+          <a:extLst>
+            <a:ext uri="{91240B29-F687-4F45-9708-019B960494DF}">
+              <a14:hiddenLine xmlns:a14="http://schemas.microsoft.com/office/drawing/2010/main" w="9525">
+                <a:solidFill>
+                  <a:schemeClr val="tx1"/>
+                </a:solidFill>
+                <a:miter lim="800000"/>
+                <a:headEnd/>
+                <a:tailEnd/>
+              </a14:hiddenLine>
+            </a:ext>
+            <a:ext uri="{AF507438-7753-43E0-B8FC-AC1667EBCBE1}">
+              <a14:hiddenEffects xmlns:a14="http://schemas.microsoft.com/office/drawing/2010/main">
+                <a:effectLst>
+                  <a:outerShdw dist="35921" dir="2700000" algn="ctr" rotWithShape="0">
+                    <a:schemeClr val="bg2"/>
+                  </a:outerShdw>
+                </a:effectLst>
+              </a14:hiddenEffects>
+            </a:ext>
+          </a:extLst>
+        </p:spPr>
+        <p:txBody>
+          <a:bodyPr vert="horz" wrap="square" lIns="91440" tIns="45720" rIns="91440" bIns="45720" numCol="1" anchor="ctr" anchorCtr="0" compatLnSpc="1">
+            <a:prstTxWarp prst="textNoShape">
+              <a:avLst/>
+            </a:prstTxWarp>
+            <a:spAutoFit/>
+          </a:bodyPr>
+          <a:lstStyle/>
+          <a:p>
+            <a:pPr marL="0" marR="0" lvl="0" indent="0" algn="l" defTabSz="914400" rtl="0" eaLnBrk="0" fontAlgn="base" latinLnBrk="0" hangingPunct="0">
+              <a:lnSpc>
+                <a:spcPct val="100000"/>
+              </a:lnSpc>
+              <a:spcBef>
+                <a:spcPct val="0"/>
+              </a:spcBef>
+              <a:spcAft>
+                <a:spcPct val="0"/>
+              </a:spcAft>
+              <a:buClrTx/>
+              <a:buSzTx/>
+              <a:buFontTx/>
+              <a:buNone/>
+              <a:tabLst/>
+            </a:pPr>
+            <a:r>
+              <a:rPr kumimoji="0" lang="en-US" altLang="en-US" sz="1800" b="0" i="1" u="none" strike="noStrike" cap="none" normalizeH="0" baseline="0" dirty="0">
+                <a:ln>
+                  <a:noFill/>
+                </a:ln>
+                <a:solidFill>
+                  <a:srgbClr val="808080"/>
+                </a:solidFill>
+                <a:effectLst/>
+                <a:latin typeface="Courier New" panose="02070309020205020404" pitchFamily="49" charset="0"/>
+                <a:cs typeface="Courier New" panose="02070309020205020404" pitchFamily="49" charset="0"/>
+              </a:rPr>
+              <a:t>/*</a:t>
+            </a:r>
+            <a:br>
+              <a:rPr kumimoji="0" lang="en-US" altLang="en-US" sz="1800" b="0" i="1" u="none" strike="noStrike" cap="none" normalizeH="0" baseline="0" dirty="0">
+                <a:ln>
+                  <a:noFill/>
+                </a:ln>
+                <a:solidFill>
+                  <a:srgbClr val="808080"/>
+                </a:solidFill>
+                <a:effectLst/>
+                <a:latin typeface="Courier New" panose="02070309020205020404" pitchFamily="49" charset="0"/>
+                <a:cs typeface="Courier New" panose="02070309020205020404" pitchFamily="49" charset="0"/>
+              </a:rPr>
+            </a:br>
+            <a:r>
+              <a:rPr kumimoji="0" lang="en-US" altLang="en-US" sz="1800" b="0" i="1" u="none" strike="noStrike" cap="none" normalizeH="0" baseline="0" dirty="0">
+                <a:ln>
+                  <a:noFill/>
+                </a:ln>
+                <a:solidFill>
+                  <a:srgbClr val="808080"/>
+                </a:solidFill>
+                <a:effectLst/>
+                <a:latin typeface="Courier New" panose="02070309020205020404" pitchFamily="49" charset="0"/>
+                <a:cs typeface="Courier New" panose="02070309020205020404" pitchFamily="49" charset="0"/>
+              </a:rPr>
+              <a:t>    On my machine, repeated 100 times:</a:t>
+            </a:r>
+            <a:br>
+              <a:rPr kumimoji="0" lang="en-US" altLang="en-US" sz="1800" b="0" i="1" u="none" strike="noStrike" cap="none" normalizeH="0" baseline="0" dirty="0">
+                <a:ln>
+                  <a:noFill/>
+                </a:ln>
+                <a:solidFill>
+                  <a:srgbClr val="808080"/>
+                </a:solidFill>
+                <a:effectLst/>
+                <a:latin typeface="Courier New" panose="02070309020205020404" pitchFamily="49" charset="0"/>
+                <a:cs typeface="Courier New" panose="02070309020205020404" pitchFamily="49" charset="0"/>
+              </a:rPr>
+            </a:br>
+            <a:br>
+              <a:rPr kumimoji="0" lang="en-US" altLang="en-US" sz="1800" b="0" i="1" u="none" strike="noStrike" cap="none" normalizeH="0" baseline="0" dirty="0">
+                <a:ln>
+                  <a:noFill/>
+                </a:ln>
+                <a:solidFill>
+                  <a:srgbClr val="808080"/>
+                </a:solidFill>
+                <a:effectLst/>
+                <a:latin typeface="Courier New" panose="02070309020205020404" pitchFamily="49" charset="0"/>
+                <a:cs typeface="Courier New" panose="02070309020205020404" pitchFamily="49" charset="0"/>
+              </a:rPr>
+            </a:br>
+            <a:r>
+              <a:rPr kumimoji="0" lang="en-US" altLang="en-US" sz="1800" b="0" i="1" u="none" strike="noStrike" cap="none" normalizeH="0" baseline="0" dirty="0">
+                <a:ln>
+                  <a:noFill/>
+                </a:ln>
+                <a:solidFill>
+                  <a:srgbClr val="808080"/>
+                </a:solidFill>
+                <a:effectLst/>
+                <a:latin typeface="Courier New" panose="02070309020205020404" pitchFamily="49" charset="0"/>
+                <a:cs typeface="Courier New" panose="02070309020205020404" pitchFamily="49" charset="0"/>
+              </a:rPr>
+              <a:t>    N=100   seconds=0.005</a:t>
+            </a:r>
+            <a:br>
+              <a:rPr kumimoji="0" lang="en-US" altLang="en-US" sz="1800" b="0" i="1" u="none" strike="noStrike" cap="none" normalizeH="0" baseline="0" dirty="0">
+                <a:ln>
+                  <a:noFill/>
+                </a:ln>
+                <a:solidFill>
+                  <a:srgbClr val="808080"/>
+                </a:solidFill>
+                <a:effectLst/>
+                <a:latin typeface="Courier New" panose="02070309020205020404" pitchFamily="49" charset="0"/>
+                <a:cs typeface="Courier New" panose="02070309020205020404" pitchFamily="49" charset="0"/>
+              </a:rPr>
+            </a:br>
+            <a:r>
+              <a:rPr kumimoji="0" lang="en-US" altLang="en-US" sz="1800" b="0" i="1" u="none" strike="noStrike" cap="none" normalizeH="0" baseline="0" dirty="0">
+                <a:ln>
+                  <a:noFill/>
+                </a:ln>
+                <a:solidFill>
+                  <a:srgbClr val="808080"/>
+                </a:solidFill>
+                <a:effectLst/>
+                <a:latin typeface="Courier New" panose="02070309020205020404" pitchFamily="49" charset="0"/>
+                <a:cs typeface="Courier New" panose="02070309020205020404" pitchFamily="49" charset="0"/>
+              </a:rPr>
+              <a:t>    N=200   seconds=0.005</a:t>
+            </a:r>
+            <a:br>
+              <a:rPr kumimoji="0" lang="en-US" altLang="en-US" sz="1800" b="0" i="1" u="none" strike="noStrike" cap="none" normalizeH="0" baseline="0" dirty="0">
+                <a:ln>
+                  <a:noFill/>
+                </a:ln>
+                <a:solidFill>
+                  <a:srgbClr val="808080"/>
+                </a:solidFill>
+                <a:effectLst/>
+                <a:latin typeface="Courier New" panose="02070309020205020404" pitchFamily="49" charset="0"/>
+                <a:cs typeface="Courier New" panose="02070309020205020404" pitchFamily="49" charset="0"/>
+              </a:rPr>
+            </a:br>
+            <a:r>
+              <a:rPr kumimoji="0" lang="en-US" altLang="en-US" sz="1800" b="0" i="1" u="none" strike="noStrike" cap="none" normalizeH="0" baseline="0" dirty="0">
+                <a:ln>
+                  <a:noFill/>
+                </a:ln>
+                <a:solidFill>
+                  <a:srgbClr val="808080"/>
+                </a:solidFill>
+                <a:effectLst/>
+                <a:latin typeface="Courier New" panose="02070309020205020404" pitchFamily="49" charset="0"/>
+                <a:cs typeface="Courier New" panose="02070309020205020404" pitchFamily="49" charset="0"/>
+              </a:rPr>
+              <a:t>    N=400   seconds=0.012</a:t>
+            </a:r>
+            <a:br>
+              <a:rPr kumimoji="0" lang="en-US" altLang="en-US" sz="1800" b="0" i="1" u="none" strike="noStrike" cap="none" normalizeH="0" baseline="0" dirty="0">
+                <a:ln>
+                  <a:noFill/>
+                </a:ln>
+                <a:solidFill>
+                  <a:srgbClr val="808080"/>
+                </a:solidFill>
+                <a:effectLst/>
+                <a:latin typeface="Courier New" panose="02070309020205020404" pitchFamily="49" charset="0"/>
+                <a:cs typeface="Courier New" panose="02070309020205020404" pitchFamily="49" charset="0"/>
+              </a:rPr>
+            </a:br>
+            <a:r>
+              <a:rPr kumimoji="0" lang="en-US" altLang="en-US" sz="1800" b="0" i="1" u="none" strike="noStrike" cap="none" normalizeH="0" baseline="0" dirty="0">
+                <a:ln>
+                  <a:noFill/>
+                </a:ln>
+                <a:solidFill>
+                  <a:srgbClr val="808080"/>
+                </a:solidFill>
+                <a:effectLst/>
+                <a:latin typeface="Courier New" panose="02070309020205020404" pitchFamily="49" charset="0"/>
+                <a:cs typeface="Courier New" panose="02070309020205020404" pitchFamily="49" charset="0"/>
+              </a:rPr>
+              <a:t>    N=800   seconds=0.072</a:t>
+            </a:r>
+            <a:br>
+              <a:rPr kumimoji="0" lang="en-US" altLang="en-US" sz="1800" b="0" i="1" u="none" strike="noStrike" cap="none" normalizeH="0" baseline="0" dirty="0">
+                <a:ln>
+                  <a:noFill/>
+                </a:ln>
+                <a:solidFill>
+                  <a:srgbClr val="808080"/>
+                </a:solidFill>
+                <a:effectLst/>
+                <a:latin typeface="Courier New" panose="02070309020205020404" pitchFamily="49" charset="0"/>
+                <a:cs typeface="Courier New" panose="02070309020205020404" pitchFamily="49" charset="0"/>
+              </a:rPr>
+            </a:br>
+            <a:r>
+              <a:rPr kumimoji="0" lang="en-US" altLang="en-US" sz="1800" b="0" i="1" u="none" strike="noStrike" cap="none" normalizeH="0" baseline="0" dirty="0">
+                <a:ln>
+                  <a:noFill/>
+                </a:ln>
+                <a:solidFill>
+                  <a:srgbClr val="808080"/>
+                </a:solidFill>
+                <a:effectLst/>
+                <a:latin typeface="Courier New" panose="02070309020205020404" pitchFamily="49" charset="0"/>
+                <a:cs typeface="Courier New" panose="02070309020205020404" pitchFamily="49" charset="0"/>
+              </a:rPr>
+              <a:t>    N=1600  seconds=0.211</a:t>
+            </a:r>
+            <a:br>
+              <a:rPr kumimoji="0" lang="en-US" altLang="en-US" sz="1800" b="0" i="1" u="none" strike="noStrike" cap="none" normalizeH="0" baseline="0" dirty="0">
+                <a:ln>
+                  <a:noFill/>
+                </a:ln>
+                <a:solidFill>
+                  <a:srgbClr val="808080"/>
+                </a:solidFill>
+                <a:effectLst/>
+                <a:latin typeface="Courier New" panose="02070309020205020404" pitchFamily="49" charset="0"/>
+                <a:cs typeface="Courier New" panose="02070309020205020404" pitchFamily="49" charset="0"/>
+              </a:rPr>
+            </a:br>
+            <a:r>
+              <a:rPr kumimoji="0" lang="en-US" altLang="en-US" sz="1800" b="0" i="1" u="none" strike="noStrike" cap="none" normalizeH="0" baseline="0" dirty="0">
+                <a:ln>
+                  <a:noFill/>
+                </a:ln>
+                <a:solidFill>
+                  <a:srgbClr val="808080"/>
+                </a:solidFill>
+                <a:effectLst/>
+                <a:latin typeface="Courier New" panose="02070309020205020404" pitchFamily="49" charset="0"/>
+                <a:cs typeface="Courier New" panose="02070309020205020404" pitchFamily="49" charset="0"/>
+              </a:rPr>
+              <a:t>    N=3200  seconds=0.754</a:t>
+            </a:r>
+            <a:br>
+              <a:rPr kumimoji="0" lang="en-US" altLang="en-US" sz="1800" b="0" i="1" u="none" strike="noStrike" cap="none" normalizeH="0" baseline="0" dirty="0">
+                <a:ln>
+                  <a:noFill/>
+                </a:ln>
+                <a:solidFill>
+                  <a:srgbClr val="808080"/>
+                </a:solidFill>
+                <a:effectLst/>
+                <a:latin typeface="Courier New" panose="02070309020205020404" pitchFamily="49" charset="0"/>
+                <a:cs typeface="Courier New" panose="02070309020205020404" pitchFamily="49" charset="0"/>
+              </a:rPr>
+            </a:br>
+            <a:r>
+              <a:rPr kumimoji="0" lang="en-US" altLang="en-US" sz="1800" b="0" i="1" u="none" strike="noStrike" cap="none" normalizeH="0" baseline="0" dirty="0">
+                <a:ln>
+                  <a:noFill/>
+                </a:ln>
+                <a:solidFill>
+                  <a:srgbClr val="808080"/>
+                </a:solidFill>
+                <a:effectLst/>
+                <a:latin typeface="Courier New" panose="02070309020205020404" pitchFamily="49" charset="0"/>
+                <a:cs typeface="Courier New" panose="02070309020205020404" pitchFamily="49" charset="0"/>
+              </a:rPr>
+              <a:t>    N=6400  seconds=2.829</a:t>
+            </a:r>
+            <a:br>
+              <a:rPr kumimoji="0" lang="en-US" altLang="en-US" sz="1800" b="0" i="1" u="none" strike="noStrike" cap="none" normalizeH="0" baseline="0" dirty="0">
+                <a:ln>
+                  <a:noFill/>
+                </a:ln>
+                <a:solidFill>
+                  <a:srgbClr val="808080"/>
+                </a:solidFill>
+                <a:effectLst/>
+                <a:latin typeface="Courier New" panose="02070309020205020404" pitchFamily="49" charset="0"/>
+                <a:cs typeface="Courier New" panose="02070309020205020404" pitchFamily="49" charset="0"/>
+              </a:rPr>
+            </a:br>
+            <a:r>
+              <a:rPr kumimoji="0" lang="en-US" altLang="en-US" sz="1800" b="0" i="1" u="none" strike="noStrike" cap="none" normalizeH="0" baseline="0" dirty="0">
+                <a:ln>
+                  <a:noFill/>
+                </a:ln>
+                <a:solidFill>
+                  <a:srgbClr val="808080"/>
+                </a:solidFill>
+                <a:effectLst/>
+                <a:latin typeface="Courier New" panose="02070309020205020404" pitchFamily="49" charset="0"/>
+                <a:cs typeface="Courier New" panose="02070309020205020404" pitchFamily="49" charset="0"/>
+              </a:rPr>
+              <a:t>    N=12800 seconds=11.48</a:t>
+            </a:r>
+            <a:br>
+              <a:rPr kumimoji="0" lang="en-US" altLang="en-US" sz="1800" b="0" i="1" u="none" strike="noStrike" cap="none" normalizeH="0" baseline="0" dirty="0">
+                <a:ln>
+                  <a:noFill/>
+                </a:ln>
+                <a:solidFill>
+                  <a:srgbClr val="808080"/>
+                </a:solidFill>
+                <a:effectLst/>
+                <a:latin typeface="Courier New" panose="02070309020205020404" pitchFamily="49" charset="0"/>
+                <a:cs typeface="Courier New" panose="02070309020205020404" pitchFamily="49" charset="0"/>
+              </a:rPr>
+            </a:br>
+            <a:r>
+              <a:rPr kumimoji="0" lang="en-US" altLang="en-US" sz="1800" b="0" i="1" u="none" strike="noStrike" cap="none" normalizeH="0" baseline="0" dirty="0">
+                <a:ln>
+                  <a:noFill/>
+                </a:ln>
+                <a:solidFill>
+                  <a:srgbClr val="808080"/>
+                </a:solidFill>
+                <a:effectLst/>
+                <a:latin typeface="Courier New" panose="02070309020205020404" pitchFamily="49" charset="0"/>
+                <a:cs typeface="Courier New" panose="02070309020205020404" pitchFamily="49" charset="0"/>
+              </a:rPr>
+              <a:t> */</a:t>
+            </a:r>
+            <a:endParaRPr kumimoji="0" lang="en-US" altLang="en-US" sz="1800" b="0" i="0" u="none" strike="noStrike" cap="none" normalizeH="0" baseline="0" dirty="0">
+              <a:ln>
+                <a:noFill/>
+              </a:ln>
+              <a:solidFill>
+                <a:schemeClr val="tx1"/>
+              </a:solidFill>
+              <a:effectLst/>
+              <a:latin typeface="Arial" panose="020B0604020202020204" pitchFamily="34" charset="0"/>
+            </a:endParaRPr>
+          </a:p>
+        </p:txBody>
+      </p:sp>
+    </p:spTree>
+    <p:extLst>
+      <p:ext uri="{BB962C8B-B14F-4D97-AF65-F5344CB8AC3E}">
+        <p14:creationId xmlns:p14="http://schemas.microsoft.com/office/powerpoint/2010/main" val="1405945670"/>
+      </p:ext>
+    </p:extLst>
+  </p:cSld>
+  <p:clrMapOvr>
+    <a:masterClrMapping/>
+  </p:clrMapOvr>
+  <p:transition spd="med"/>
+</p:sld>
+</file>
+
+<file path=ppt/slides/slide50.xml><?xml version="1.0" encoding="utf-8"?>
 <p:sld xmlns:a="http://schemas.openxmlformats.org/drawingml/2006/main" xmlns:r="http://schemas.openxmlformats.org/officeDocument/2006/relationships" xmlns:p="http://schemas.openxmlformats.org/presentationml/2006/main">
   <p:cSld>
     <p:spTree>
@@ -23566,9 +25243,7 @@
           <p:cNvGraphicFramePr>
             <a:graphicFrameLocks noGrp="1"/>
           </p:cNvGraphicFramePr>
-          <p:nvPr>
-            <p:extLst/>
-          </p:nvPr>
+          <p:nvPr/>
         </p:nvGraphicFramePr>
         <p:xfrm>
           <a:off x="7227842" y="2906930"/>
@@ -23731,9 +25406,7 @@
           <p:cNvGraphicFramePr>
             <a:graphicFrameLocks noGrp="1"/>
           </p:cNvGraphicFramePr>
-          <p:nvPr>
-            <p:extLst/>
-          </p:nvPr>
+          <p:nvPr/>
         </p:nvGraphicFramePr>
         <p:xfrm>
           <a:off x="7227842" y="3952040"/>
@@ -23901,9 +25574,7 @@
           <p:cNvGraphicFramePr>
             <a:graphicFrameLocks noGrp="1"/>
           </p:cNvGraphicFramePr>
-          <p:nvPr>
-            <p:extLst/>
-          </p:nvPr>
+          <p:nvPr/>
         </p:nvGraphicFramePr>
         <p:xfrm>
           <a:off x="7227842" y="4997150"/>
@@ -24076,9 +25747,7 @@
           <p:cNvGraphicFramePr>
             <a:graphicFrameLocks noGrp="1"/>
           </p:cNvGraphicFramePr>
-          <p:nvPr>
-            <p:extLst/>
-          </p:nvPr>
+          <p:nvPr/>
         </p:nvGraphicFramePr>
         <p:xfrm>
           <a:off x="7227842" y="6042260"/>
@@ -24256,9 +25925,7 @@
           <p:cNvGraphicFramePr>
             <a:graphicFrameLocks noGrp="1"/>
           </p:cNvGraphicFramePr>
-          <p:nvPr>
-            <p:extLst/>
-          </p:nvPr>
+          <p:nvPr/>
         </p:nvGraphicFramePr>
         <p:xfrm>
           <a:off x="7227842" y="7087370"/>
@@ -24436,9 +26103,7 @@
           <p:cNvGraphicFramePr>
             <a:graphicFrameLocks noGrp="1"/>
           </p:cNvGraphicFramePr>
-          <p:nvPr>
-            <p:extLst/>
-          </p:nvPr>
+          <p:nvPr/>
         </p:nvGraphicFramePr>
         <p:xfrm>
           <a:off x="7227842" y="8132480"/>
@@ -25080,1589 +26745,7 @@
 </p:sld>
 </file>
 
-<file path=ppt/slides/slide5.xml><?xml version="1.0" encoding="utf-8"?>
-<p:sld xmlns:a="http://schemas.openxmlformats.org/drawingml/2006/main" xmlns:r="http://schemas.openxmlformats.org/officeDocument/2006/relationships" xmlns:p="http://schemas.openxmlformats.org/presentationml/2006/main">
-  <p:cSld>
-    <p:spTree>
-      <p:nvGrpSpPr>
-        <p:cNvPr id="1" name=""/>
-        <p:cNvGrpSpPr/>
-        <p:nvPr/>
-      </p:nvGrpSpPr>
-      <p:grpSpPr>
-        <a:xfrm>
-          <a:off x="0" y="0"/>
-          <a:ext cx="0" cy="0"/>
-          <a:chOff x="0" y="0"/>
-          <a:chExt cx="0" cy="0"/>
-        </a:xfrm>
-      </p:grpSpPr>
-      <mc:AlternateContent xmlns:mc="http://schemas.openxmlformats.org/markup-compatibility/2006" xmlns:a14="http://schemas.microsoft.com/office/drawing/2010/main">
-        <mc:Choice Requires="a14">
-          <p:sp>
-            <p:nvSpPr>
-              <p:cNvPr id="3" name="Text Placeholder 2"/>
-              <p:cNvSpPr>
-                <a:spLocks noGrp="1"/>
-              </p:cNvSpPr>
-              <p:nvPr>
-                <p:ph type="body" idx="1"/>
-              </p:nvPr>
-            </p:nvSpPr>
-            <p:spPr>
-              <a:xfrm>
-                <a:off x="361950" y="4583637"/>
-                <a:ext cx="12306300" cy="3936999"/>
-              </a:xfrm>
-            </p:spPr>
-            <p:txBody>
-              <a:bodyPr>
-                <a:normAutofit/>
-              </a:bodyPr>
-              <a:lstStyle/>
-              <a:p>
-                <a:r>
-                  <a:rPr lang="en-US" dirty="0"/>
-                  <a:t>Two nested loops </a:t>
-                </a:r>
-              </a:p>
-              <a:p>
-                <a:r>
-                  <a:rPr lang="en-US" dirty="0"/>
-                  <a:t>Inner loop executed once per each element in array</a:t>
-                </a:r>
-              </a:p>
-              <a:p>
-                <a:r>
-                  <a:rPr lang="en-US" dirty="0"/>
-                  <a:t>So, </a:t>
-                </a:r>
-                <a14:m>
-                  <m:oMath xmlns:m="http://schemas.openxmlformats.org/officeDocument/2006/math">
-                    <m:r>
-                      <a:rPr lang="en-US" b="0" i="1" smtClean="0">
-                        <a:latin typeface="Cambria Math" panose="02040503050406030204" pitchFamily="18" charset="0"/>
-                      </a:rPr>
-                      <m:t>𝑁</m:t>
-                    </m:r>
-                    <m:r>
-                      <a:rPr lang="en-US" b="0" i="1" smtClean="0">
-                        <a:latin typeface="Cambria Math" panose="02040503050406030204" pitchFamily="18" charset="0"/>
-                      </a:rPr>
-                      <m:t>∗</m:t>
-                    </m:r>
-                    <m:r>
-                      <a:rPr lang="en-US" b="0" i="1" smtClean="0">
-                        <a:latin typeface="Cambria Math" panose="02040503050406030204" pitchFamily="18" charset="0"/>
-                      </a:rPr>
-                      <m:t>𝑁</m:t>
-                    </m:r>
-                    <m:r>
-                      <a:rPr lang="en-US" b="0" i="1" smtClean="0">
-                        <a:latin typeface="Cambria Math" panose="02040503050406030204" pitchFamily="18" charset="0"/>
-                      </a:rPr>
-                      <m:t>=</m:t>
-                    </m:r>
-                    <m:sSup>
-                      <m:sSupPr>
-                        <m:ctrlPr>
-                          <a:rPr lang="en-US" b="0" i="1" smtClean="0">
-                            <a:latin typeface="Cambria Math" panose="02040503050406030204" pitchFamily="18" charset="0"/>
-                          </a:rPr>
-                        </m:ctrlPr>
-                      </m:sSupPr>
-                      <m:e>
-                        <m:r>
-                          <a:rPr lang="en-US" b="0" i="1" smtClean="0">
-                            <a:latin typeface="Cambria Math" panose="02040503050406030204" pitchFamily="18" charset="0"/>
-                          </a:rPr>
-                          <m:t>𝑁</m:t>
-                        </m:r>
-                      </m:e>
-                      <m:sup>
-                        <m:r>
-                          <a:rPr lang="en-US" b="0" i="1" smtClean="0">
-                            <a:latin typeface="Cambria Math" panose="02040503050406030204" pitchFamily="18" charset="0"/>
-                          </a:rPr>
-                          <m:t>2</m:t>
-                        </m:r>
-                      </m:sup>
-                    </m:sSup>
-                  </m:oMath>
-                </a14:m>
-                <a:endParaRPr lang="en-US" b="0" dirty="0"/>
-              </a:p>
-              <a:p>
-                <a:r>
-                  <a:rPr lang="en-US" dirty="0"/>
-                  <a:t>Twice as big is now </a:t>
-                </a:r>
-                <a14:m>
-                  <m:oMath xmlns:m="http://schemas.openxmlformats.org/officeDocument/2006/math">
-                    <m:r>
-                      <a:rPr lang="en-US" b="0" i="1" smtClean="0">
-                        <a:latin typeface="Cambria Math" panose="02040503050406030204" pitchFamily="18" charset="0"/>
-                      </a:rPr>
-                      <m:t>2∗2=4</m:t>
-                    </m:r>
-                  </m:oMath>
-                </a14:m>
-                <a:r>
-                  <a:rPr lang="en-US" dirty="0"/>
-                  <a:t> times as slow!!! (roughly)</a:t>
-                </a:r>
-              </a:p>
-            </p:txBody>
-          </p:sp>
-        </mc:Choice>
-        <mc:Fallback xmlns="">
-          <p:sp>
-            <p:nvSpPr>
-              <p:cNvPr id="3" name="Text Placeholder 2"/>
-              <p:cNvSpPr>
-                <a:spLocks noGrp="1" noRot="1" noChangeAspect="1" noMove="1" noResize="1" noEditPoints="1" noAdjustHandles="1" noChangeArrowheads="1" noChangeShapeType="1" noTextEdit="1"/>
-              </p:cNvSpPr>
-              <p:nvPr>
-                <p:ph type="body" idx="1"/>
-              </p:nvPr>
-            </p:nvSpPr>
-            <p:spPr>
-              <a:xfrm>
-                <a:off x="361950" y="4583637"/>
-                <a:ext cx="12306300" cy="3936999"/>
-              </a:xfrm>
-              <a:blipFill>
-                <a:blip r:embed="rId2"/>
-                <a:stretch>
-                  <a:fillRect l="-1139" t="-1703" b="-5108"/>
-                </a:stretch>
-              </a:blipFill>
-            </p:spPr>
-            <p:txBody>
-              <a:bodyPr/>
-              <a:lstStyle/>
-              <a:p>
-                <a:r>
-                  <a:rPr lang="en-US">
-                    <a:noFill/>
-                  </a:rPr>
-                  <a:t> </a:t>
-                </a:r>
-              </a:p>
-            </p:txBody>
-          </p:sp>
-        </mc:Fallback>
-      </mc:AlternateContent>
-      <p:sp>
-        <p:nvSpPr>
-          <p:cNvPr id="4" name="Rectangle 1"/>
-          <p:cNvSpPr>
-            <a:spLocks noChangeArrowheads="1"/>
-          </p:cNvSpPr>
-          <p:nvPr/>
-        </p:nvSpPr>
-        <p:spPr bwMode="auto">
-          <a:xfrm>
-            <a:off x="552451" y="759885"/>
-            <a:ext cx="7143750" cy="3785652"/>
-          </a:xfrm>
-          <a:prstGeom prst="rect">
-            <a:avLst/>
-          </a:prstGeom>
-          <a:solidFill>
-            <a:srgbClr val="FFFFFF"/>
-          </a:solidFill>
-          <a:ln>
-            <a:noFill/>
-          </a:ln>
-          <a:effectLst/>
-          <a:extLst>
-            <a:ext uri="{91240B29-F687-4F45-9708-019B960494DF}">
-              <a14:hiddenLine xmlns:a14="http://schemas.microsoft.com/office/drawing/2010/main" w="9525">
-                <a:solidFill>
-                  <a:schemeClr val="tx1"/>
-                </a:solidFill>
-                <a:miter lim="800000"/>
-                <a:headEnd/>
-                <a:tailEnd/>
-              </a14:hiddenLine>
-            </a:ext>
-            <a:ext uri="{AF507438-7753-43E0-B8FC-AC1667EBCBE1}">
-              <a14:hiddenEffects xmlns:a14="http://schemas.microsoft.com/office/drawing/2010/main">
-                <a:effectLst>
-                  <a:outerShdw dist="35921" dir="2700000" algn="ctr" rotWithShape="0">
-                    <a:schemeClr val="bg2"/>
-                  </a:outerShdw>
-                </a:effectLst>
-              </a14:hiddenEffects>
-            </a:ext>
-          </a:extLst>
-        </p:spPr>
-        <p:txBody>
-          <a:bodyPr vert="horz" wrap="square" lIns="91440" tIns="45720" rIns="91440" bIns="45720" numCol="1" anchor="ctr" anchorCtr="0" compatLnSpc="1">
-            <a:prstTxWarp prst="textNoShape">
-              <a:avLst/>
-            </a:prstTxWarp>
-            <a:spAutoFit/>
-          </a:bodyPr>
-          <a:lstStyle/>
-          <a:p>
-            <a:pPr marL="0" marR="0" lvl="0" indent="0" algn="l" defTabSz="914400" rtl="0" eaLnBrk="0" fontAlgn="base" latinLnBrk="0" hangingPunct="0">
-              <a:lnSpc>
-                <a:spcPct val="100000"/>
-              </a:lnSpc>
-              <a:spcBef>
-                <a:spcPct val="0"/>
-              </a:spcBef>
-              <a:spcAft>
-                <a:spcPct val="0"/>
-              </a:spcAft>
-              <a:buClrTx/>
-              <a:buSzTx/>
-              <a:buFontTx/>
-              <a:buNone/>
-              <a:tabLst/>
-            </a:pPr>
-            <a:r>
-              <a:rPr kumimoji="0" lang="en-US" altLang="en-US" sz="2000" b="1" i="0" u="none" strike="noStrike" cap="none" normalizeH="0" baseline="0" dirty="0">
-                <a:ln>
-                  <a:noFill/>
-                </a:ln>
-                <a:solidFill>
-                  <a:srgbClr val="000080"/>
-                </a:solidFill>
-                <a:effectLst/>
-                <a:latin typeface="Courier New" panose="02070309020205020404" pitchFamily="49" charset="0"/>
-                <a:cs typeface="Courier New" panose="02070309020205020404" pitchFamily="49" charset="0"/>
-              </a:rPr>
-              <a:t>public static </a:t>
-            </a:r>
-            <a:r>
-              <a:rPr kumimoji="0" lang="en-US" altLang="en-US" sz="2000" b="1" i="0" u="none" strike="noStrike" cap="none" normalizeH="0" baseline="0" dirty="0" err="1">
-                <a:ln>
-                  <a:noFill/>
-                </a:ln>
-                <a:solidFill>
-                  <a:srgbClr val="000080"/>
-                </a:solidFill>
-                <a:effectLst/>
-                <a:latin typeface="Courier New" panose="02070309020205020404" pitchFamily="49" charset="0"/>
-                <a:cs typeface="Courier New" panose="02070309020205020404" pitchFamily="49" charset="0"/>
-              </a:rPr>
-              <a:t>int</a:t>
-            </a:r>
-            <a:r>
-              <a:rPr kumimoji="0" lang="en-US" altLang="en-US" sz="2000" b="1" i="0" u="none" strike="noStrike" cap="none" normalizeH="0" baseline="0" dirty="0">
-                <a:ln>
-                  <a:noFill/>
-                </a:ln>
-                <a:solidFill>
-                  <a:srgbClr val="000080"/>
-                </a:solidFill>
-                <a:effectLst/>
-                <a:latin typeface="Courier New" panose="02070309020205020404" pitchFamily="49" charset="0"/>
-                <a:cs typeface="Courier New" panose="02070309020205020404" pitchFamily="49" charset="0"/>
-              </a:rPr>
-              <a:t> </a:t>
-            </a:r>
-            <a:r>
-              <a:rPr kumimoji="0" lang="en-US" altLang="en-US" sz="2000" b="0" i="0" u="none" strike="noStrike" cap="none" normalizeH="0" baseline="0" dirty="0">
-                <a:ln>
-                  <a:noFill/>
-                </a:ln>
-                <a:solidFill>
-                  <a:srgbClr val="000000"/>
-                </a:solidFill>
-                <a:effectLst/>
-                <a:latin typeface="Courier New" panose="02070309020205020404" pitchFamily="49" charset="0"/>
-                <a:cs typeface="Courier New" panose="02070309020205020404" pitchFamily="49" charset="0"/>
-              </a:rPr>
-              <a:t>pairs(</a:t>
-            </a:r>
-            <a:r>
-              <a:rPr kumimoji="0" lang="en-US" altLang="en-US" sz="2000" b="1" i="0" u="none" strike="noStrike" cap="none" normalizeH="0" baseline="0" dirty="0" err="1">
-                <a:ln>
-                  <a:noFill/>
-                </a:ln>
-                <a:solidFill>
-                  <a:srgbClr val="000080"/>
-                </a:solidFill>
-                <a:effectLst/>
-                <a:latin typeface="Courier New" panose="02070309020205020404" pitchFamily="49" charset="0"/>
-                <a:cs typeface="Courier New" panose="02070309020205020404" pitchFamily="49" charset="0"/>
-              </a:rPr>
-              <a:t>int</a:t>
-            </a:r>
-            <a:r>
-              <a:rPr kumimoji="0" lang="en-US" altLang="en-US" sz="2000" b="0" i="0" u="none" strike="noStrike" cap="none" normalizeH="0" baseline="0" dirty="0">
-                <a:ln>
-                  <a:noFill/>
-                </a:ln>
-                <a:solidFill>
-                  <a:srgbClr val="000000"/>
-                </a:solidFill>
-                <a:effectLst/>
-                <a:latin typeface="Courier New" panose="02070309020205020404" pitchFamily="49" charset="0"/>
-                <a:cs typeface="Courier New" panose="02070309020205020404" pitchFamily="49" charset="0"/>
-              </a:rPr>
-              <a:t>[] array){</a:t>
-            </a:r>
-            <a:br>
-              <a:rPr kumimoji="0" lang="en-US" altLang="en-US" sz="2000" b="0" i="0" u="none" strike="noStrike" cap="none" normalizeH="0" baseline="0" dirty="0">
-                <a:ln>
-                  <a:noFill/>
-                </a:ln>
-                <a:solidFill>
-                  <a:srgbClr val="000000"/>
-                </a:solidFill>
-                <a:effectLst/>
-                <a:latin typeface="Courier New" panose="02070309020205020404" pitchFamily="49" charset="0"/>
-                <a:cs typeface="Courier New" panose="02070309020205020404" pitchFamily="49" charset="0"/>
-              </a:rPr>
-            </a:br>
-            <a:r>
-              <a:rPr kumimoji="0" lang="en-US" altLang="en-US" sz="2000" b="0" i="0" u="none" strike="noStrike" cap="none" normalizeH="0" baseline="0" dirty="0">
-                <a:ln>
-                  <a:noFill/>
-                </a:ln>
-                <a:solidFill>
-                  <a:srgbClr val="000000"/>
-                </a:solidFill>
-                <a:effectLst/>
-                <a:latin typeface="Courier New" panose="02070309020205020404" pitchFamily="49" charset="0"/>
-                <a:cs typeface="Courier New" panose="02070309020205020404" pitchFamily="49" charset="0"/>
-              </a:rPr>
-              <a:t>    </a:t>
-            </a:r>
-            <a:r>
-              <a:rPr kumimoji="0" lang="en-US" altLang="en-US" sz="2000" b="1" i="0" u="none" strike="noStrike" cap="none" normalizeH="0" baseline="0" dirty="0" err="1">
-                <a:ln>
-                  <a:noFill/>
-                </a:ln>
-                <a:solidFill>
-                  <a:srgbClr val="000080"/>
-                </a:solidFill>
-                <a:effectLst/>
-                <a:latin typeface="Courier New" panose="02070309020205020404" pitchFamily="49" charset="0"/>
-                <a:cs typeface="Courier New" panose="02070309020205020404" pitchFamily="49" charset="0"/>
-              </a:rPr>
-              <a:t>int</a:t>
-            </a:r>
-            <a:r>
-              <a:rPr kumimoji="0" lang="en-US" altLang="en-US" sz="2000" b="1" i="0" u="none" strike="noStrike" cap="none" normalizeH="0" baseline="0" dirty="0">
-                <a:ln>
-                  <a:noFill/>
-                </a:ln>
-                <a:solidFill>
-                  <a:srgbClr val="000080"/>
-                </a:solidFill>
-                <a:effectLst/>
-                <a:latin typeface="Courier New" panose="02070309020205020404" pitchFamily="49" charset="0"/>
-                <a:cs typeface="Courier New" panose="02070309020205020404" pitchFamily="49" charset="0"/>
-              </a:rPr>
-              <a:t> </a:t>
-            </a:r>
-            <a:r>
-              <a:rPr kumimoji="0" lang="en-US" altLang="en-US" sz="2000" b="0" i="0" u="none" strike="noStrike" cap="none" normalizeH="0" baseline="0" dirty="0">
-                <a:ln>
-                  <a:noFill/>
-                </a:ln>
-                <a:solidFill>
-                  <a:srgbClr val="000000"/>
-                </a:solidFill>
-                <a:effectLst/>
-                <a:latin typeface="Courier New" panose="02070309020205020404" pitchFamily="49" charset="0"/>
-                <a:cs typeface="Courier New" panose="02070309020205020404" pitchFamily="49" charset="0"/>
-              </a:rPr>
-              <a:t>pairs = </a:t>
-            </a:r>
-            <a:r>
-              <a:rPr kumimoji="0" lang="en-US" altLang="en-US" sz="2000" b="0" i="0" u="none" strike="noStrike" cap="none" normalizeH="0" baseline="0" dirty="0">
-                <a:ln>
-                  <a:noFill/>
-                </a:ln>
-                <a:solidFill>
-                  <a:srgbClr val="0000FF"/>
-                </a:solidFill>
-                <a:effectLst/>
-                <a:latin typeface="Courier New" panose="02070309020205020404" pitchFamily="49" charset="0"/>
-                <a:cs typeface="Courier New" panose="02070309020205020404" pitchFamily="49" charset="0"/>
-              </a:rPr>
-              <a:t>0</a:t>
-            </a:r>
-            <a:r>
-              <a:rPr kumimoji="0" lang="en-US" altLang="en-US" sz="2000" b="0" i="0" u="none" strike="noStrike" cap="none" normalizeH="0" baseline="0" dirty="0">
-                <a:ln>
-                  <a:noFill/>
-                </a:ln>
-                <a:solidFill>
-                  <a:srgbClr val="000000"/>
-                </a:solidFill>
-                <a:effectLst/>
-                <a:latin typeface="Courier New" panose="02070309020205020404" pitchFamily="49" charset="0"/>
-                <a:cs typeface="Courier New" panose="02070309020205020404" pitchFamily="49" charset="0"/>
-              </a:rPr>
-              <a:t>;</a:t>
-            </a:r>
-          </a:p>
-          <a:p>
-            <a:pPr marL="0" marR="0" lvl="0" indent="0" algn="l" defTabSz="914400" rtl="0" eaLnBrk="0" fontAlgn="base" latinLnBrk="0" hangingPunct="0">
-              <a:lnSpc>
-                <a:spcPct val="100000"/>
-              </a:lnSpc>
-              <a:spcBef>
-                <a:spcPct val="0"/>
-              </a:spcBef>
-              <a:spcAft>
-                <a:spcPct val="0"/>
-              </a:spcAft>
-              <a:buClrTx/>
-              <a:buSzTx/>
-              <a:buFontTx/>
-              <a:buNone/>
-              <a:tabLst/>
-            </a:pPr>
-            <a:br>
-              <a:rPr kumimoji="0" lang="en-US" altLang="en-US" sz="2000" b="0" i="0" u="none" strike="noStrike" cap="none" normalizeH="0" baseline="0" dirty="0">
-                <a:ln>
-                  <a:noFill/>
-                </a:ln>
-                <a:solidFill>
-                  <a:srgbClr val="000000"/>
-                </a:solidFill>
-                <a:effectLst/>
-                <a:latin typeface="Courier New" panose="02070309020205020404" pitchFamily="49" charset="0"/>
-                <a:cs typeface="Courier New" panose="02070309020205020404" pitchFamily="49" charset="0"/>
-              </a:rPr>
-            </a:br>
-            <a:r>
-              <a:rPr kumimoji="0" lang="en-US" altLang="en-US" sz="2000" b="0" i="0" u="none" strike="noStrike" cap="none" normalizeH="0" baseline="0" dirty="0">
-                <a:ln>
-                  <a:noFill/>
-                </a:ln>
-                <a:solidFill>
-                  <a:srgbClr val="000000"/>
-                </a:solidFill>
-                <a:effectLst/>
-                <a:latin typeface="Courier New" panose="02070309020205020404" pitchFamily="49" charset="0"/>
-                <a:cs typeface="Courier New" panose="02070309020205020404" pitchFamily="49" charset="0"/>
-              </a:rPr>
-              <a:t>    </a:t>
-            </a:r>
-            <a:r>
-              <a:rPr kumimoji="0" lang="en-US" altLang="en-US" sz="2000" b="1" i="0" u="none" strike="noStrike" cap="none" normalizeH="0" baseline="0" dirty="0">
-                <a:ln>
-                  <a:noFill/>
-                </a:ln>
-                <a:solidFill>
-                  <a:srgbClr val="000080"/>
-                </a:solidFill>
-                <a:effectLst/>
-                <a:latin typeface="Courier New" panose="02070309020205020404" pitchFamily="49" charset="0"/>
-                <a:cs typeface="Courier New" panose="02070309020205020404" pitchFamily="49" charset="0"/>
-              </a:rPr>
-              <a:t>for</a:t>
-            </a:r>
-            <a:r>
-              <a:rPr kumimoji="0" lang="en-US" altLang="en-US" sz="2000" b="0" i="0" u="none" strike="noStrike" cap="none" normalizeH="0" baseline="0" dirty="0">
-                <a:ln>
-                  <a:noFill/>
-                </a:ln>
-                <a:solidFill>
-                  <a:srgbClr val="000000"/>
-                </a:solidFill>
-                <a:effectLst/>
-                <a:latin typeface="Courier New" panose="02070309020205020404" pitchFamily="49" charset="0"/>
-                <a:cs typeface="Courier New" panose="02070309020205020404" pitchFamily="49" charset="0"/>
-              </a:rPr>
-              <a:t>(</a:t>
-            </a:r>
-            <a:r>
-              <a:rPr kumimoji="0" lang="en-US" altLang="en-US" sz="2000" b="1" i="0" u="none" strike="noStrike" cap="none" normalizeH="0" baseline="0" dirty="0" err="1">
-                <a:ln>
-                  <a:noFill/>
-                </a:ln>
-                <a:solidFill>
-                  <a:srgbClr val="000080"/>
-                </a:solidFill>
-                <a:effectLst/>
-                <a:latin typeface="Courier New" panose="02070309020205020404" pitchFamily="49" charset="0"/>
-                <a:cs typeface="Courier New" panose="02070309020205020404" pitchFamily="49" charset="0"/>
-              </a:rPr>
-              <a:t>int</a:t>
-            </a:r>
-            <a:r>
-              <a:rPr kumimoji="0" lang="en-US" altLang="en-US" sz="2000" b="1" i="0" u="none" strike="noStrike" cap="none" normalizeH="0" baseline="0" dirty="0">
-                <a:ln>
-                  <a:noFill/>
-                </a:ln>
-                <a:solidFill>
-                  <a:srgbClr val="000080"/>
-                </a:solidFill>
-                <a:effectLst/>
-                <a:latin typeface="Courier New" panose="02070309020205020404" pitchFamily="49" charset="0"/>
-                <a:cs typeface="Courier New" panose="02070309020205020404" pitchFamily="49" charset="0"/>
-              </a:rPr>
-              <a:t> </a:t>
-            </a:r>
-            <a:r>
-              <a:rPr kumimoji="0" lang="en-US" altLang="en-US" sz="2000" b="0" i="0" u="none" strike="noStrike" cap="none" normalizeH="0" baseline="0" dirty="0" err="1">
-                <a:ln>
-                  <a:noFill/>
-                </a:ln>
-                <a:solidFill>
-                  <a:srgbClr val="000000"/>
-                </a:solidFill>
-                <a:effectLst/>
-                <a:latin typeface="Courier New" panose="02070309020205020404" pitchFamily="49" charset="0"/>
-                <a:cs typeface="Courier New" panose="02070309020205020404" pitchFamily="49" charset="0"/>
-              </a:rPr>
-              <a:t>i</a:t>
-            </a:r>
-            <a:r>
-              <a:rPr kumimoji="0" lang="en-US" altLang="en-US" sz="2000" b="0" i="0" u="none" strike="noStrike" cap="none" normalizeH="0" baseline="0" dirty="0">
-                <a:ln>
-                  <a:noFill/>
-                </a:ln>
-                <a:solidFill>
-                  <a:srgbClr val="000000"/>
-                </a:solidFill>
-                <a:effectLst/>
-                <a:latin typeface="Courier New" panose="02070309020205020404" pitchFamily="49" charset="0"/>
-                <a:cs typeface="Courier New" panose="02070309020205020404" pitchFamily="49" charset="0"/>
-              </a:rPr>
-              <a:t>=</a:t>
-            </a:r>
-            <a:r>
-              <a:rPr kumimoji="0" lang="en-US" altLang="en-US" sz="2000" b="0" i="0" u="none" strike="noStrike" cap="none" normalizeH="0" baseline="0" dirty="0">
-                <a:ln>
-                  <a:noFill/>
-                </a:ln>
-                <a:solidFill>
-                  <a:srgbClr val="0000FF"/>
-                </a:solidFill>
-                <a:effectLst/>
-                <a:latin typeface="Courier New" panose="02070309020205020404" pitchFamily="49" charset="0"/>
-                <a:cs typeface="Courier New" panose="02070309020205020404" pitchFamily="49" charset="0"/>
-              </a:rPr>
-              <a:t>0</a:t>
-            </a:r>
-            <a:r>
-              <a:rPr kumimoji="0" lang="en-US" altLang="en-US" sz="2000" b="0" i="0" u="none" strike="noStrike" cap="none" normalizeH="0" baseline="0" dirty="0">
-                <a:ln>
-                  <a:noFill/>
-                </a:ln>
-                <a:solidFill>
-                  <a:srgbClr val="000000"/>
-                </a:solidFill>
-                <a:effectLst/>
-                <a:latin typeface="Courier New" panose="02070309020205020404" pitchFamily="49" charset="0"/>
-                <a:cs typeface="Courier New" panose="02070309020205020404" pitchFamily="49" charset="0"/>
-              </a:rPr>
-              <a:t>; </a:t>
-            </a:r>
-            <a:r>
-              <a:rPr kumimoji="0" lang="en-US" altLang="en-US" sz="2000" b="0" i="0" u="none" strike="noStrike" cap="none" normalizeH="0" baseline="0" dirty="0" err="1">
-                <a:ln>
-                  <a:noFill/>
-                </a:ln>
-                <a:solidFill>
-                  <a:srgbClr val="000000"/>
-                </a:solidFill>
-                <a:effectLst/>
-                <a:latin typeface="Courier New" panose="02070309020205020404" pitchFamily="49" charset="0"/>
-                <a:cs typeface="Courier New" panose="02070309020205020404" pitchFamily="49" charset="0"/>
-              </a:rPr>
-              <a:t>i</a:t>
-            </a:r>
-            <a:r>
-              <a:rPr kumimoji="0" lang="en-US" altLang="en-US" sz="2000" b="0" i="0" u="none" strike="noStrike" cap="none" normalizeH="0" baseline="0" dirty="0">
-                <a:ln>
-                  <a:noFill/>
-                </a:ln>
-                <a:solidFill>
-                  <a:srgbClr val="000000"/>
-                </a:solidFill>
-                <a:effectLst/>
-                <a:latin typeface="Courier New" panose="02070309020205020404" pitchFamily="49" charset="0"/>
-                <a:cs typeface="Courier New" panose="02070309020205020404" pitchFamily="49" charset="0"/>
-              </a:rPr>
-              <a:t>&lt;</a:t>
-            </a:r>
-            <a:r>
-              <a:rPr kumimoji="0" lang="en-US" altLang="en-US" sz="2000" b="0" i="0" u="none" strike="noStrike" cap="none" normalizeH="0" baseline="0" dirty="0" err="1">
-                <a:ln>
-                  <a:noFill/>
-                </a:ln>
-                <a:solidFill>
-                  <a:srgbClr val="000000"/>
-                </a:solidFill>
-                <a:effectLst/>
-                <a:latin typeface="Courier New" panose="02070309020205020404" pitchFamily="49" charset="0"/>
-                <a:cs typeface="Courier New" panose="02070309020205020404" pitchFamily="49" charset="0"/>
-              </a:rPr>
-              <a:t>array.</a:t>
-            </a:r>
-            <a:r>
-              <a:rPr kumimoji="0" lang="en-US" altLang="en-US" sz="2000" b="1" i="0" u="none" strike="noStrike" cap="none" normalizeH="0" baseline="0" dirty="0" err="1">
-                <a:ln>
-                  <a:noFill/>
-                </a:ln>
-                <a:solidFill>
-                  <a:srgbClr val="660E7A"/>
-                </a:solidFill>
-                <a:effectLst/>
-                <a:latin typeface="Courier New" panose="02070309020205020404" pitchFamily="49" charset="0"/>
-                <a:cs typeface="Courier New" panose="02070309020205020404" pitchFamily="49" charset="0"/>
-              </a:rPr>
-              <a:t>length</a:t>
-            </a:r>
-            <a:r>
-              <a:rPr kumimoji="0" lang="en-US" altLang="en-US" sz="2000" b="0" i="0" u="none" strike="noStrike" cap="none" normalizeH="0" baseline="0" dirty="0">
-                <a:ln>
-                  <a:noFill/>
-                </a:ln>
-                <a:solidFill>
-                  <a:srgbClr val="000000"/>
-                </a:solidFill>
-                <a:effectLst/>
-                <a:latin typeface="Courier New" panose="02070309020205020404" pitchFamily="49" charset="0"/>
-                <a:cs typeface="Courier New" panose="02070309020205020404" pitchFamily="49" charset="0"/>
-              </a:rPr>
-              <a:t>; </a:t>
-            </a:r>
-            <a:r>
-              <a:rPr kumimoji="0" lang="en-US" altLang="en-US" sz="2000" b="0" i="0" u="none" strike="noStrike" cap="none" normalizeH="0" baseline="0" dirty="0" err="1">
-                <a:ln>
-                  <a:noFill/>
-                </a:ln>
-                <a:solidFill>
-                  <a:srgbClr val="000000"/>
-                </a:solidFill>
-                <a:effectLst/>
-                <a:latin typeface="Courier New" panose="02070309020205020404" pitchFamily="49" charset="0"/>
-                <a:cs typeface="Courier New" panose="02070309020205020404" pitchFamily="49" charset="0"/>
-              </a:rPr>
-              <a:t>i</a:t>
-            </a:r>
-            <a:r>
-              <a:rPr kumimoji="0" lang="en-US" altLang="en-US" sz="2000" b="0" i="0" u="none" strike="noStrike" cap="none" normalizeH="0" baseline="0" dirty="0">
-                <a:ln>
-                  <a:noFill/>
-                </a:ln>
-                <a:solidFill>
-                  <a:srgbClr val="000000"/>
-                </a:solidFill>
-                <a:effectLst/>
-                <a:latin typeface="Courier New" panose="02070309020205020404" pitchFamily="49" charset="0"/>
-                <a:cs typeface="Courier New" panose="02070309020205020404" pitchFamily="49" charset="0"/>
-              </a:rPr>
-              <a:t>++){</a:t>
-            </a:r>
-            <a:br>
-              <a:rPr kumimoji="0" lang="en-US" altLang="en-US" sz="2000" b="0" i="0" u="none" strike="noStrike" cap="none" normalizeH="0" baseline="0" dirty="0">
-                <a:ln>
-                  <a:noFill/>
-                </a:ln>
-                <a:solidFill>
-                  <a:srgbClr val="000000"/>
-                </a:solidFill>
-                <a:effectLst/>
-                <a:latin typeface="Courier New" panose="02070309020205020404" pitchFamily="49" charset="0"/>
-                <a:cs typeface="Courier New" panose="02070309020205020404" pitchFamily="49" charset="0"/>
-              </a:rPr>
-            </a:br>
-            <a:r>
-              <a:rPr kumimoji="0" lang="en-US" altLang="en-US" sz="2000" b="0" i="0" u="none" strike="noStrike" cap="none" normalizeH="0" baseline="0" dirty="0">
-                <a:ln>
-                  <a:noFill/>
-                </a:ln>
-                <a:solidFill>
-                  <a:srgbClr val="000000"/>
-                </a:solidFill>
-                <a:effectLst/>
-                <a:latin typeface="Courier New" panose="02070309020205020404" pitchFamily="49" charset="0"/>
-                <a:cs typeface="Courier New" panose="02070309020205020404" pitchFamily="49" charset="0"/>
-              </a:rPr>
-              <a:t>        </a:t>
-            </a:r>
-            <a:r>
-              <a:rPr kumimoji="0" lang="en-US" altLang="en-US" sz="2000" b="1" i="0" u="none" strike="noStrike" cap="none" normalizeH="0" baseline="0" dirty="0">
-                <a:ln>
-                  <a:noFill/>
-                </a:ln>
-                <a:solidFill>
-                  <a:srgbClr val="000080"/>
-                </a:solidFill>
-                <a:effectLst/>
-                <a:latin typeface="Courier New" panose="02070309020205020404" pitchFamily="49" charset="0"/>
-                <a:cs typeface="Courier New" panose="02070309020205020404" pitchFamily="49" charset="0"/>
-              </a:rPr>
-              <a:t>for</a:t>
-            </a:r>
-            <a:r>
-              <a:rPr kumimoji="0" lang="en-US" altLang="en-US" sz="2000" b="0" i="0" u="none" strike="noStrike" cap="none" normalizeH="0" baseline="0" dirty="0">
-                <a:ln>
-                  <a:noFill/>
-                </a:ln>
-                <a:solidFill>
-                  <a:srgbClr val="000000"/>
-                </a:solidFill>
-                <a:effectLst/>
-                <a:latin typeface="Courier New" panose="02070309020205020404" pitchFamily="49" charset="0"/>
-                <a:cs typeface="Courier New" panose="02070309020205020404" pitchFamily="49" charset="0"/>
-              </a:rPr>
-              <a:t>(</a:t>
-            </a:r>
-            <a:r>
-              <a:rPr kumimoji="0" lang="en-US" altLang="en-US" sz="2000" b="1" i="0" u="none" strike="noStrike" cap="none" normalizeH="0" baseline="0" dirty="0" err="1">
-                <a:ln>
-                  <a:noFill/>
-                </a:ln>
-                <a:solidFill>
-                  <a:srgbClr val="000080"/>
-                </a:solidFill>
-                <a:effectLst/>
-                <a:latin typeface="Courier New" panose="02070309020205020404" pitchFamily="49" charset="0"/>
-                <a:cs typeface="Courier New" panose="02070309020205020404" pitchFamily="49" charset="0"/>
-              </a:rPr>
-              <a:t>int</a:t>
-            </a:r>
-            <a:r>
-              <a:rPr kumimoji="0" lang="en-US" altLang="en-US" sz="2000" b="1" i="0" u="none" strike="noStrike" cap="none" normalizeH="0" baseline="0" dirty="0">
-                <a:ln>
-                  <a:noFill/>
-                </a:ln>
-                <a:solidFill>
-                  <a:srgbClr val="000080"/>
-                </a:solidFill>
-                <a:effectLst/>
-                <a:latin typeface="Courier New" panose="02070309020205020404" pitchFamily="49" charset="0"/>
-                <a:cs typeface="Courier New" panose="02070309020205020404" pitchFamily="49" charset="0"/>
-              </a:rPr>
-              <a:t> </a:t>
-            </a:r>
-            <a:r>
-              <a:rPr kumimoji="0" lang="en-US" altLang="en-US" sz="2000" b="0" i="0" u="none" strike="noStrike" cap="none" normalizeH="0" baseline="0" dirty="0">
-                <a:ln>
-                  <a:noFill/>
-                </a:ln>
-                <a:solidFill>
-                  <a:srgbClr val="000000"/>
-                </a:solidFill>
-                <a:effectLst/>
-                <a:latin typeface="Courier New" panose="02070309020205020404" pitchFamily="49" charset="0"/>
-                <a:cs typeface="Courier New" panose="02070309020205020404" pitchFamily="49" charset="0"/>
-              </a:rPr>
-              <a:t>j=</a:t>
-            </a:r>
-            <a:r>
-              <a:rPr kumimoji="0" lang="en-US" altLang="en-US" sz="2000" b="0" i="0" u="none" strike="noStrike" cap="none" normalizeH="0" baseline="0" dirty="0">
-                <a:ln>
-                  <a:noFill/>
-                </a:ln>
-                <a:solidFill>
-                  <a:srgbClr val="0000FF"/>
-                </a:solidFill>
-                <a:effectLst/>
-                <a:latin typeface="Courier New" panose="02070309020205020404" pitchFamily="49" charset="0"/>
-                <a:cs typeface="Courier New" panose="02070309020205020404" pitchFamily="49" charset="0"/>
-              </a:rPr>
-              <a:t>0</a:t>
-            </a:r>
-            <a:r>
-              <a:rPr kumimoji="0" lang="en-US" altLang="en-US" sz="2000" b="0" i="0" u="none" strike="noStrike" cap="none" normalizeH="0" baseline="0" dirty="0">
-                <a:ln>
-                  <a:noFill/>
-                </a:ln>
-                <a:solidFill>
-                  <a:srgbClr val="000000"/>
-                </a:solidFill>
-                <a:effectLst/>
-                <a:latin typeface="Courier New" panose="02070309020205020404" pitchFamily="49" charset="0"/>
-                <a:cs typeface="Courier New" panose="02070309020205020404" pitchFamily="49" charset="0"/>
-              </a:rPr>
-              <a:t>; j&lt;</a:t>
-            </a:r>
-            <a:r>
-              <a:rPr kumimoji="0" lang="en-US" altLang="en-US" sz="2000" b="0" i="0" u="none" strike="noStrike" cap="none" normalizeH="0" baseline="0" dirty="0" err="1">
-                <a:ln>
-                  <a:noFill/>
-                </a:ln>
-                <a:solidFill>
-                  <a:srgbClr val="000000"/>
-                </a:solidFill>
-                <a:effectLst/>
-                <a:latin typeface="Courier New" panose="02070309020205020404" pitchFamily="49" charset="0"/>
-                <a:cs typeface="Courier New" panose="02070309020205020404" pitchFamily="49" charset="0"/>
-              </a:rPr>
-              <a:t>array.</a:t>
-            </a:r>
-            <a:r>
-              <a:rPr kumimoji="0" lang="en-US" altLang="en-US" sz="2000" b="1" i="0" u="none" strike="noStrike" cap="none" normalizeH="0" baseline="0" dirty="0" err="1">
-                <a:ln>
-                  <a:noFill/>
-                </a:ln>
-                <a:solidFill>
-                  <a:srgbClr val="660E7A"/>
-                </a:solidFill>
-                <a:effectLst/>
-                <a:latin typeface="Courier New" panose="02070309020205020404" pitchFamily="49" charset="0"/>
-                <a:cs typeface="Courier New" panose="02070309020205020404" pitchFamily="49" charset="0"/>
-              </a:rPr>
-              <a:t>length</a:t>
-            </a:r>
-            <a:r>
-              <a:rPr kumimoji="0" lang="en-US" altLang="en-US" sz="2000" b="0" i="0" u="none" strike="noStrike" cap="none" normalizeH="0" baseline="0" dirty="0">
-                <a:ln>
-                  <a:noFill/>
-                </a:ln>
-                <a:solidFill>
-                  <a:srgbClr val="000000"/>
-                </a:solidFill>
-                <a:effectLst/>
-                <a:latin typeface="Courier New" panose="02070309020205020404" pitchFamily="49" charset="0"/>
-                <a:cs typeface="Courier New" panose="02070309020205020404" pitchFamily="49" charset="0"/>
-              </a:rPr>
-              <a:t>; </a:t>
-            </a:r>
-            <a:r>
-              <a:rPr kumimoji="0" lang="en-US" altLang="en-US" sz="2000" b="0" i="0" u="none" strike="noStrike" cap="none" normalizeH="0" baseline="0" dirty="0" err="1">
-                <a:ln>
-                  <a:noFill/>
-                </a:ln>
-                <a:solidFill>
-                  <a:srgbClr val="000000"/>
-                </a:solidFill>
-                <a:effectLst/>
-                <a:latin typeface="Courier New" panose="02070309020205020404" pitchFamily="49" charset="0"/>
-                <a:cs typeface="Courier New" panose="02070309020205020404" pitchFamily="49" charset="0"/>
-              </a:rPr>
-              <a:t>j++</a:t>
-            </a:r>
-            <a:r>
-              <a:rPr kumimoji="0" lang="en-US" altLang="en-US" sz="2000" b="0" i="0" u="none" strike="noStrike" cap="none" normalizeH="0" baseline="0" dirty="0">
-                <a:ln>
-                  <a:noFill/>
-                </a:ln>
-                <a:solidFill>
-                  <a:srgbClr val="000000"/>
-                </a:solidFill>
-                <a:effectLst/>
-                <a:latin typeface="Courier New" panose="02070309020205020404" pitchFamily="49" charset="0"/>
-                <a:cs typeface="Courier New" panose="02070309020205020404" pitchFamily="49" charset="0"/>
-              </a:rPr>
-              <a:t>){</a:t>
-            </a:r>
-            <a:br>
-              <a:rPr kumimoji="0" lang="en-US" altLang="en-US" sz="2000" b="0" i="0" u="none" strike="noStrike" cap="none" normalizeH="0" baseline="0" dirty="0">
-                <a:ln>
-                  <a:noFill/>
-                </a:ln>
-                <a:solidFill>
-                  <a:srgbClr val="000000"/>
-                </a:solidFill>
-                <a:effectLst/>
-                <a:latin typeface="Courier New" panose="02070309020205020404" pitchFamily="49" charset="0"/>
-                <a:cs typeface="Courier New" panose="02070309020205020404" pitchFamily="49" charset="0"/>
-              </a:rPr>
-            </a:br>
-            <a:r>
-              <a:rPr kumimoji="0" lang="en-US" altLang="en-US" sz="2000" b="0" i="0" u="none" strike="noStrike" cap="none" normalizeH="0" baseline="0" dirty="0">
-                <a:ln>
-                  <a:noFill/>
-                </a:ln>
-                <a:solidFill>
-                  <a:srgbClr val="000000"/>
-                </a:solidFill>
-                <a:effectLst/>
-                <a:latin typeface="Courier New" panose="02070309020205020404" pitchFamily="49" charset="0"/>
-                <a:cs typeface="Courier New" panose="02070309020205020404" pitchFamily="49" charset="0"/>
-              </a:rPr>
-              <a:t>            </a:t>
-            </a:r>
-            <a:r>
-              <a:rPr kumimoji="0" lang="en-US" altLang="en-US" sz="2000" b="1" i="0" u="none" strike="noStrike" cap="none" normalizeH="0" baseline="0" dirty="0">
-                <a:ln>
-                  <a:noFill/>
-                </a:ln>
-                <a:solidFill>
-                  <a:srgbClr val="000080"/>
-                </a:solidFill>
-                <a:effectLst/>
-                <a:latin typeface="Courier New" panose="02070309020205020404" pitchFamily="49" charset="0"/>
-                <a:cs typeface="Courier New" panose="02070309020205020404" pitchFamily="49" charset="0"/>
-              </a:rPr>
-              <a:t>if</a:t>
-            </a:r>
-            <a:r>
-              <a:rPr kumimoji="0" lang="en-US" altLang="en-US" sz="2000" b="0" i="0" u="none" strike="noStrike" cap="none" normalizeH="0" baseline="0" dirty="0">
-                <a:ln>
-                  <a:noFill/>
-                </a:ln>
-                <a:solidFill>
-                  <a:srgbClr val="000000"/>
-                </a:solidFill>
-                <a:effectLst/>
-                <a:latin typeface="Courier New" panose="02070309020205020404" pitchFamily="49" charset="0"/>
-                <a:cs typeface="Courier New" panose="02070309020205020404" pitchFamily="49" charset="0"/>
-              </a:rPr>
-              <a:t>(</a:t>
-            </a:r>
-            <a:r>
-              <a:rPr kumimoji="0" lang="en-US" altLang="en-US" sz="2000" b="0" i="0" u="none" strike="noStrike" cap="none" normalizeH="0" baseline="0" dirty="0" err="1">
-                <a:ln>
-                  <a:noFill/>
-                </a:ln>
-                <a:solidFill>
-                  <a:srgbClr val="000000"/>
-                </a:solidFill>
-                <a:effectLst/>
-                <a:latin typeface="Courier New" panose="02070309020205020404" pitchFamily="49" charset="0"/>
-                <a:cs typeface="Courier New" panose="02070309020205020404" pitchFamily="49" charset="0"/>
-              </a:rPr>
-              <a:t>i</a:t>
-            </a:r>
-            <a:r>
-              <a:rPr kumimoji="0" lang="en-US" altLang="en-US" sz="2000" b="0" i="0" u="none" strike="noStrike" cap="none" normalizeH="0" baseline="0" dirty="0">
-                <a:ln>
-                  <a:noFill/>
-                </a:ln>
-                <a:solidFill>
-                  <a:srgbClr val="000000"/>
-                </a:solidFill>
-                <a:effectLst/>
-                <a:latin typeface="Courier New" panose="02070309020205020404" pitchFamily="49" charset="0"/>
-                <a:cs typeface="Courier New" panose="02070309020205020404" pitchFamily="49" charset="0"/>
-              </a:rPr>
-              <a:t>!=j &amp;&amp; array[</a:t>
-            </a:r>
-            <a:r>
-              <a:rPr kumimoji="0" lang="en-US" altLang="en-US" sz="2000" b="0" i="0" u="none" strike="noStrike" cap="none" normalizeH="0" baseline="0" dirty="0" err="1">
-                <a:ln>
-                  <a:noFill/>
-                </a:ln>
-                <a:solidFill>
-                  <a:srgbClr val="000000"/>
-                </a:solidFill>
-                <a:effectLst/>
-                <a:latin typeface="Courier New" panose="02070309020205020404" pitchFamily="49" charset="0"/>
-                <a:cs typeface="Courier New" panose="02070309020205020404" pitchFamily="49" charset="0"/>
-              </a:rPr>
-              <a:t>i</a:t>
-            </a:r>
-            <a:r>
-              <a:rPr kumimoji="0" lang="en-US" altLang="en-US" sz="2000" b="0" i="0" u="none" strike="noStrike" cap="none" normalizeH="0" baseline="0" dirty="0">
-                <a:ln>
-                  <a:noFill/>
-                </a:ln>
-                <a:solidFill>
-                  <a:srgbClr val="000000"/>
-                </a:solidFill>
-                <a:effectLst/>
-                <a:latin typeface="Courier New" panose="02070309020205020404" pitchFamily="49" charset="0"/>
-                <a:cs typeface="Courier New" panose="02070309020205020404" pitchFamily="49" charset="0"/>
-              </a:rPr>
-              <a:t>] == array[j]){</a:t>
-            </a:r>
-            <a:br>
-              <a:rPr kumimoji="0" lang="en-US" altLang="en-US" sz="2000" b="0" i="0" u="none" strike="noStrike" cap="none" normalizeH="0" baseline="0" dirty="0">
-                <a:ln>
-                  <a:noFill/>
-                </a:ln>
-                <a:solidFill>
-                  <a:srgbClr val="000000"/>
-                </a:solidFill>
-                <a:effectLst/>
-                <a:latin typeface="Courier New" panose="02070309020205020404" pitchFamily="49" charset="0"/>
-                <a:cs typeface="Courier New" panose="02070309020205020404" pitchFamily="49" charset="0"/>
-              </a:rPr>
-            </a:br>
-            <a:r>
-              <a:rPr kumimoji="0" lang="en-US" altLang="en-US" sz="2000" b="0" i="0" u="none" strike="noStrike" cap="none" normalizeH="0" baseline="0" dirty="0">
-                <a:ln>
-                  <a:noFill/>
-                </a:ln>
-                <a:solidFill>
-                  <a:srgbClr val="000000"/>
-                </a:solidFill>
-                <a:effectLst/>
-                <a:latin typeface="Courier New" panose="02070309020205020404" pitchFamily="49" charset="0"/>
-                <a:cs typeface="Courier New" panose="02070309020205020404" pitchFamily="49" charset="0"/>
-              </a:rPr>
-              <a:t>                pairs++;</a:t>
-            </a:r>
-            <a:br>
-              <a:rPr kumimoji="0" lang="en-US" altLang="en-US" sz="2000" b="0" i="0" u="none" strike="noStrike" cap="none" normalizeH="0" baseline="0" dirty="0">
-                <a:ln>
-                  <a:noFill/>
-                </a:ln>
-                <a:solidFill>
-                  <a:srgbClr val="000000"/>
-                </a:solidFill>
-                <a:effectLst/>
-                <a:latin typeface="Courier New" panose="02070309020205020404" pitchFamily="49" charset="0"/>
-                <a:cs typeface="Courier New" panose="02070309020205020404" pitchFamily="49" charset="0"/>
-              </a:rPr>
-            </a:br>
-            <a:r>
-              <a:rPr kumimoji="0" lang="en-US" altLang="en-US" sz="2000" b="0" i="0" u="none" strike="noStrike" cap="none" normalizeH="0" baseline="0" dirty="0">
-                <a:ln>
-                  <a:noFill/>
-                </a:ln>
-                <a:solidFill>
-                  <a:srgbClr val="000000"/>
-                </a:solidFill>
-                <a:effectLst/>
-                <a:latin typeface="Courier New" panose="02070309020205020404" pitchFamily="49" charset="0"/>
-                <a:cs typeface="Courier New" panose="02070309020205020404" pitchFamily="49" charset="0"/>
-              </a:rPr>
-              <a:t>            }</a:t>
-            </a:r>
-            <a:br>
-              <a:rPr kumimoji="0" lang="en-US" altLang="en-US" sz="2000" b="0" i="0" u="none" strike="noStrike" cap="none" normalizeH="0" baseline="0" dirty="0">
-                <a:ln>
-                  <a:noFill/>
-                </a:ln>
-                <a:solidFill>
-                  <a:srgbClr val="000000"/>
-                </a:solidFill>
-                <a:effectLst/>
-                <a:latin typeface="Courier New" panose="02070309020205020404" pitchFamily="49" charset="0"/>
-                <a:cs typeface="Courier New" panose="02070309020205020404" pitchFamily="49" charset="0"/>
-              </a:rPr>
-            </a:br>
-            <a:r>
-              <a:rPr kumimoji="0" lang="en-US" altLang="en-US" sz="2000" b="0" i="0" u="none" strike="noStrike" cap="none" normalizeH="0" baseline="0" dirty="0">
-                <a:ln>
-                  <a:noFill/>
-                </a:ln>
-                <a:solidFill>
-                  <a:srgbClr val="000000"/>
-                </a:solidFill>
-                <a:effectLst/>
-                <a:latin typeface="Courier New" panose="02070309020205020404" pitchFamily="49" charset="0"/>
-                <a:cs typeface="Courier New" panose="02070309020205020404" pitchFamily="49" charset="0"/>
-              </a:rPr>
-              <a:t>        }</a:t>
-            </a:r>
-            <a:br>
-              <a:rPr kumimoji="0" lang="en-US" altLang="en-US" sz="2000" b="0" i="0" u="none" strike="noStrike" cap="none" normalizeH="0" baseline="0" dirty="0">
-                <a:ln>
-                  <a:noFill/>
-                </a:ln>
-                <a:solidFill>
-                  <a:srgbClr val="000000"/>
-                </a:solidFill>
-                <a:effectLst/>
-                <a:latin typeface="Courier New" panose="02070309020205020404" pitchFamily="49" charset="0"/>
-                <a:cs typeface="Courier New" panose="02070309020205020404" pitchFamily="49" charset="0"/>
-              </a:rPr>
-            </a:br>
-            <a:r>
-              <a:rPr kumimoji="0" lang="en-US" altLang="en-US" sz="2000" b="0" i="0" u="none" strike="noStrike" cap="none" normalizeH="0" baseline="0" dirty="0">
-                <a:ln>
-                  <a:noFill/>
-                </a:ln>
-                <a:solidFill>
-                  <a:srgbClr val="000000"/>
-                </a:solidFill>
-                <a:effectLst/>
-                <a:latin typeface="Courier New" panose="02070309020205020404" pitchFamily="49" charset="0"/>
-                <a:cs typeface="Courier New" panose="02070309020205020404" pitchFamily="49" charset="0"/>
-              </a:rPr>
-              <a:t>    }</a:t>
-            </a:r>
-            <a:br>
-              <a:rPr kumimoji="0" lang="en-US" altLang="en-US" sz="2000" b="0" i="0" u="none" strike="noStrike" cap="none" normalizeH="0" baseline="0" dirty="0">
-                <a:ln>
-                  <a:noFill/>
-                </a:ln>
-                <a:solidFill>
-                  <a:srgbClr val="000000"/>
-                </a:solidFill>
-                <a:effectLst/>
-                <a:latin typeface="Courier New" panose="02070309020205020404" pitchFamily="49" charset="0"/>
-                <a:cs typeface="Courier New" panose="02070309020205020404" pitchFamily="49" charset="0"/>
-              </a:rPr>
-            </a:br>
-            <a:r>
-              <a:rPr kumimoji="0" lang="en-US" altLang="en-US" sz="2000" b="0" i="0" u="none" strike="noStrike" cap="none" normalizeH="0" baseline="0" dirty="0">
-                <a:ln>
-                  <a:noFill/>
-                </a:ln>
-                <a:solidFill>
-                  <a:srgbClr val="000000"/>
-                </a:solidFill>
-                <a:effectLst/>
-                <a:latin typeface="Courier New" panose="02070309020205020404" pitchFamily="49" charset="0"/>
-                <a:cs typeface="Courier New" panose="02070309020205020404" pitchFamily="49" charset="0"/>
-              </a:rPr>
-              <a:t>    </a:t>
-            </a:r>
-            <a:r>
-              <a:rPr kumimoji="0" lang="en-US" altLang="en-US" sz="2000" b="1" i="0" u="none" strike="noStrike" cap="none" normalizeH="0" baseline="0" dirty="0">
-                <a:ln>
-                  <a:noFill/>
-                </a:ln>
-                <a:solidFill>
-                  <a:srgbClr val="000080"/>
-                </a:solidFill>
-                <a:effectLst/>
-                <a:latin typeface="Courier New" panose="02070309020205020404" pitchFamily="49" charset="0"/>
-                <a:cs typeface="Courier New" panose="02070309020205020404" pitchFamily="49" charset="0"/>
-              </a:rPr>
-              <a:t>return </a:t>
-            </a:r>
-            <a:r>
-              <a:rPr kumimoji="0" lang="en-US" altLang="en-US" sz="2000" b="0" i="0" u="none" strike="noStrike" cap="none" normalizeH="0" baseline="0" dirty="0">
-                <a:ln>
-                  <a:noFill/>
-                </a:ln>
-                <a:solidFill>
-                  <a:srgbClr val="000000"/>
-                </a:solidFill>
-                <a:effectLst/>
-                <a:latin typeface="Courier New" panose="02070309020205020404" pitchFamily="49" charset="0"/>
-                <a:cs typeface="Courier New" panose="02070309020205020404" pitchFamily="49" charset="0"/>
-              </a:rPr>
-              <a:t>pairs;</a:t>
-            </a:r>
-            <a:br>
-              <a:rPr kumimoji="0" lang="en-US" altLang="en-US" sz="2000" b="0" i="0" u="none" strike="noStrike" cap="none" normalizeH="0" baseline="0" dirty="0">
-                <a:ln>
-                  <a:noFill/>
-                </a:ln>
-                <a:solidFill>
-                  <a:srgbClr val="000000"/>
-                </a:solidFill>
-                <a:effectLst/>
-                <a:latin typeface="Courier New" panose="02070309020205020404" pitchFamily="49" charset="0"/>
-                <a:cs typeface="Courier New" panose="02070309020205020404" pitchFamily="49" charset="0"/>
-              </a:rPr>
-            </a:br>
-            <a:r>
-              <a:rPr kumimoji="0" lang="en-US" altLang="en-US" sz="2000" b="0" i="0" u="none" strike="noStrike" cap="none" normalizeH="0" baseline="0" dirty="0">
-                <a:ln>
-                  <a:noFill/>
-                </a:ln>
-                <a:solidFill>
-                  <a:srgbClr val="000000"/>
-                </a:solidFill>
-                <a:effectLst/>
-                <a:latin typeface="Courier New" panose="02070309020205020404" pitchFamily="49" charset="0"/>
-                <a:cs typeface="Courier New" panose="02070309020205020404" pitchFamily="49" charset="0"/>
-              </a:rPr>
-              <a:t>}</a:t>
-            </a:r>
-            <a:endParaRPr kumimoji="0" lang="en-US" altLang="en-US" sz="2000" b="0" i="0" u="none" strike="noStrike" cap="none" normalizeH="0" baseline="0" dirty="0">
-              <a:ln>
-                <a:noFill/>
-              </a:ln>
-              <a:solidFill>
-                <a:schemeClr val="tx1"/>
-              </a:solidFill>
-              <a:effectLst/>
-              <a:latin typeface="Arial" panose="020B0604020202020204" pitchFamily="34" charset="0"/>
-            </a:endParaRPr>
-          </a:p>
-        </p:txBody>
-      </p:sp>
-      <p:sp>
-        <p:nvSpPr>
-          <p:cNvPr id="5" name="Rectangle 2"/>
-          <p:cNvSpPr>
-            <a:spLocks noChangeArrowheads="1"/>
-          </p:cNvSpPr>
-          <p:nvPr/>
-        </p:nvSpPr>
-        <p:spPr bwMode="auto">
-          <a:xfrm>
-            <a:off x="7524750" y="201602"/>
-            <a:ext cx="5372100" cy="3416320"/>
-          </a:xfrm>
-          <a:prstGeom prst="rect">
-            <a:avLst/>
-          </a:prstGeom>
-          <a:solidFill>
-            <a:srgbClr val="FFFFFF"/>
-          </a:solidFill>
-          <a:ln>
-            <a:noFill/>
-          </a:ln>
-          <a:effectLst/>
-          <a:extLst>
-            <a:ext uri="{91240B29-F687-4F45-9708-019B960494DF}">
-              <a14:hiddenLine xmlns:a14="http://schemas.microsoft.com/office/drawing/2010/main" w="9525">
-                <a:solidFill>
-                  <a:schemeClr val="tx1"/>
-                </a:solidFill>
-                <a:miter lim="800000"/>
-                <a:headEnd/>
-                <a:tailEnd/>
-              </a14:hiddenLine>
-            </a:ext>
-            <a:ext uri="{AF507438-7753-43E0-B8FC-AC1667EBCBE1}">
-              <a14:hiddenEffects xmlns:a14="http://schemas.microsoft.com/office/drawing/2010/main">
-                <a:effectLst>
-                  <a:outerShdw dist="35921" dir="2700000" algn="ctr" rotWithShape="0">
-                    <a:schemeClr val="bg2"/>
-                  </a:outerShdw>
-                </a:effectLst>
-              </a14:hiddenEffects>
-            </a:ext>
-          </a:extLst>
-        </p:spPr>
-        <p:txBody>
-          <a:bodyPr vert="horz" wrap="square" lIns="91440" tIns="45720" rIns="91440" bIns="45720" numCol="1" anchor="ctr" anchorCtr="0" compatLnSpc="1">
-            <a:prstTxWarp prst="textNoShape">
-              <a:avLst/>
-            </a:prstTxWarp>
-            <a:spAutoFit/>
-          </a:bodyPr>
-          <a:lstStyle/>
-          <a:p>
-            <a:pPr marL="0" marR="0" lvl="0" indent="0" algn="l" defTabSz="914400" rtl="0" eaLnBrk="0" fontAlgn="base" latinLnBrk="0" hangingPunct="0">
-              <a:lnSpc>
-                <a:spcPct val="100000"/>
-              </a:lnSpc>
-              <a:spcBef>
-                <a:spcPct val="0"/>
-              </a:spcBef>
-              <a:spcAft>
-                <a:spcPct val="0"/>
-              </a:spcAft>
-              <a:buClrTx/>
-              <a:buSzTx/>
-              <a:buFontTx/>
-              <a:buNone/>
-              <a:tabLst/>
-            </a:pPr>
-            <a:r>
-              <a:rPr kumimoji="0" lang="en-US" altLang="en-US" sz="1800" b="0" i="1" u="none" strike="noStrike" cap="none" normalizeH="0" baseline="0" dirty="0">
-                <a:ln>
-                  <a:noFill/>
-                </a:ln>
-                <a:solidFill>
-                  <a:srgbClr val="808080"/>
-                </a:solidFill>
-                <a:effectLst/>
-                <a:latin typeface="Courier New" panose="02070309020205020404" pitchFamily="49" charset="0"/>
-                <a:cs typeface="Courier New" panose="02070309020205020404" pitchFamily="49" charset="0"/>
-              </a:rPr>
-              <a:t>/*</a:t>
-            </a:r>
-            <a:br>
-              <a:rPr kumimoji="0" lang="en-US" altLang="en-US" sz="1800" b="0" i="1" u="none" strike="noStrike" cap="none" normalizeH="0" baseline="0" dirty="0">
-                <a:ln>
-                  <a:noFill/>
-                </a:ln>
-                <a:solidFill>
-                  <a:srgbClr val="808080"/>
-                </a:solidFill>
-                <a:effectLst/>
-                <a:latin typeface="Courier New" panose="02070309020205020404" pitchFamily="49" charset="0"/>
-                <a:cs typeface="Courier New" panose="02070309020205020404" pitchFamily="49" charset="0"/>
-              </a:rPr>
-            </a:br>
-            <a:r>
-              <a:rPr kumimoji="0" lang="en-US" altLang="en-US" sz="1800" b="0" i="1" u="none" strike="noStrike" cap="none" normalizeH="0" baseline="0" dirty="0">
-                <a:ln>
-                  <a:noFill/>
-                </a:ln>
-                <a:solidFill>
-                  <a:srgbClr val="808080"/>
-                </a:solidFill>
-                <a:effectLst/>
-                <a:latin typeface="Courier New" panose="02070309020205020404" pitchFamily="49" charset="0"/>
-                <a:cs typeface="Courier New" panose="02070309020205020404" pitchFamily="49" charset="0"/>
-              </a:rPr>
-              <a:t>    On my machine, repeated 100 times:</a:t>
-            </a:r>
-            <a:br>
-              <a:rPr kumimoji="0" lang="en-US" altLang="en-US" sz="1800" b="0" i="1" u="none" strike="noStrike" cap="none" normalizeH="0" baseline="0" dirty="0">
-                <a:ln>
-                  <a:noFill/>
-                </a:ln>
-                <a:solidFill>
-                  <a:srgbClr val="808080"/>
-                </a:solidFill>
-                <a:effectLst/>
-                <a:latin typeface="Courier New" panose="02070309020205020404" pitchFamily="49" charset="0"/>
-                <a:cs typeface="Courier New" panose="02070309020205020404" pitchFamily="49" charset="0"/>
-              </a:rPr>
-            </a:br>
-            <a:br>
-              <a:rPr kumimoji="0" lang="en-US" altLang="en-US" sz="1800" b="0" i="1" u="none" strike="noStrike" cap="none" normalizeH="0" baseline="0" dirty="0">
-                <a:ln>
-                  <a:noFill/>
-                </a:ln>
-                <a:solidFill>
-                  <a:srgbClr val="808080"/>
-                </a:solidFill>
-                <a:effectLst/>
-                <a:latin typeface="Courier New" panose="02070309020205020404" pitchFamily="49" charset="0"/>
-                <a:cs typeface="Courier New" panose="02070309020205020404" pitchFamily="49" charset="0"/>
-              </a:rPr>
-            </a:br>
-            <a:r>
-              <a:rPr kumimoji="0" lang="en-US" altLang="en-US" sz="1800" b="0" i="1" u="none" strike="noStrike" cap="none" normalizeH="0" baseline="0" dirty="0">
-                <a:ln>
-                  <a:noFill/>
-                </a:ln>
-                <a:solidFill>
-                  <a:srgbClr val="808080"/>
-                </a:solidFill>
-                <a:effectLst/>
-                <a:latin typeface="Courier New" panose="02070309020205020404" pitchFamily="49" charset="0"/>
-                <a:cs typeface="Courier New" panose="02070309020205020404" pitchFamily="49" charset="0"/>
-              </a:rPr>
-              <a:t>    N=100   seconds=0.005</a:t>
-            </a:r>
-            <a:br>
-              <a:rPr kumimoji="0" lang="en-US" altLang="en-US" sz="1800" b="0" i="1" u="none" strike="noStrike" cap="none" normalizeH="0" baseline="0" dirty="0">
-                <a:ln>
-                  <a:noFill/>
-                </a:ln>
-                <a:solidFill>
-                  <a:srgbClr val="808080"/>
-                </a:solidFill>
-                <a:effectLst/>
-                <a:latin typeface="Courier New" panose="02070309020205020404" pitchFamily="49" charset="0"/>
-                <a:cs typeface="Courier New" panose="02070309020205020404" pitchFamily="49" charset="0"/>
-              </a:rPr>
-            </a:br>
-            <a:r>
-              <a:rPr kumimoji="0" lang="en-US" altLang="en-US" sz="1800" b="0" i="1" u="none" strike="noStrike" cap="none" normalizeH="0" baseline="0" dirty="0">
-                <a:ln>
-                  <a:noFill/>
-                </a:ln>
-                <a:solidFill>
-                  <a:srgbClr val="808080"/>
-                </a:solidFill>
-                <a:effectLst/>
-                <a:latin typeface="Courier New" panose="02070309020205020404" pitchFamily="49" charset="0"/>
-                <a:cs typeface="Courier New" panose="02070309020205020404" pitchFamily="49" charset="0"/>
-              </a:rPr>
-              <a:t>    N=200   seconds=0.005</a:t>
-            </a:r>
-            <a:br>
-              <a:rPr kumimoji="0" lang="en-US" altLang="en-US" sz="1800" b="0" i="1" u="none" strike="noStrike" cap="none" normalizeH="0" baseline="0" dirty="0">
-                <a:ln>
-                  <a:noFill/>
-                </a:ln>
-                <a:solidFill>
-                  <a:srgbClr val="808080"/>
-                </a:solidFill>
-                <a:effectLst/>
-                <a:latin typeface="Courier New" panose="02070309020205020404" pitchFamily="49" charset="0"/>
-                <a:cs typeface="Courier New" panose="02070309020205020404" pitchFamily="49" charset="0"/>
-              </a:rPr>
-            </a:br>
-            <a:r>
-              <a:rPr kumimoji="0" lang="en-US" altLang="en-US" sz="1800" b="0" i="1" u="none" strike="noStrike" cap="none" normalizeH="0" baseline="0" dirty="0">
-                <a:ln>
-                  <a:noFill/>
-                </a:ln>
-                <a:solidFill>
-                  <a:srgbClr val="808080"/>
-                </a:solidFill>
-                <a:effectLst/>
-                <a:latin typeface="Courier New" panose="02070309020205020404" pitchFamily="49" charset="0"/>
-                <a:cs typeface="Courier New" panose="02070309020205020404" pitchFamily="49" charset="0"/>
-              </a:rPr>
-              <a:t>    N=400   seconds=0.012</a:t>
-            </a:r>
-            <a:br>
-              <a:rPr kumimoji="0" lang="en-US" altLang="en-US" sz="1800" b="0" i="1" u="none" strike="noStrike" cap="none" normalizeH="0" baseline="0" dirty="0">
-                <a:ln>
-                  <a:noFill/>
-                </a:ln>
-                <a:solidFill>
-                  <a:srgbClr val="808080"/>
-                </a:solidFill>
-                <a:effectLst/>
-                <a:latin typeface="Courier New" panose="02070309020205020404" pitchFamily="49" charset="0"/>
-                <a:cs typeface="Courier New" panose="02070309020205020404" pitchFamily="49" charset="0"/>
-              </a:rPr>
-            </a:br>
-            <a:r>
-              <a:rPr kumimoji="0" lang="en-US" altLang="en-US" sz="1800" b="0" i="1" u="none" strike="noStrike" cap="none" normalizeH="0" baseline="0" dirty="0">
-                <a:ln>
-                  <a:noFill/>
-                </a:ln>
-                <a:solidFill>
-                  <a:srgbClr val="808080"/>
-                </a:solidFill>
-                <a:effectLst/>
-                <a:latin typeface="Courier New" panose="02070309020205020404" pitchFamily="49" charset="0"/>
-                <a:cs typeface="Courier New" panose="02070309020205020404" pitchFamily="49" charset="0"/>
-              </a:rPr>
-              <a:t>    N=800   seconds=0.072</a:t>
-            </a:r>
-            <a:br>
-              <a:rPr kumimoji="0" lang="en-US" altLang="en-US" sz="1800" b="0" i="1" u="none" strike="noStrike" cap="none" normalizeH="0" baseline="0" dirty="0">
-                <a:ln>
-                  <a:noFill/>
-                </a:ln>
-                <a:solidFill>
-                  <a:srgbClr val="808080"/>
-                </a:solidFill>
-                <a:effectLst/>
-                <a:latin typeface="Courier New" panose="02070309020205020404" pitchFamily="49" charset="0"/>
-                <a:cs typeface="Courier New" panose="02070309020205020404" pitchFamily="49" charset="0"/>
-              </a:rPr>
-            </a:br>
-            <a:r>
-              <a:rPr kumimoji="0" lang="en-US" altLang="en-US" sz="1800" b="0" i="1" u="none" strike="noStrike" cap="none" normalizeH="0" baseline="0" dirty="0">
-                <a:ln>
-                  <a:noFill/>
-                </a:ln>
-                <a:solidFill>
-                  <a:srgbClr val="808080"/>
-                </a:solidFill>
-                <a:effectLst/>
-                <a:latin typeface="Courier New" panose="02070309020205020404" pitchFamily="49" charset="0"/>
-                <a:cs typeface="Courier New" panose="02070309020205020404" pitchFamily="49" charset="0"/>
-              </a:rPr>
-              <a:t>    N=1600  seconds=0.211</a:t>
-            </a:r>
-            <a:br>
-              <a:rPr kumimoji="0" lang="en-US" altLang="en-US" sz="1800" b="0" i="1" u="none" strike="noStrike" cap="none" normalizeH="0" baseline="0" dirty="0">
-                <a:ln>
-                  <a:noFill/>
-                </a:ln>
-                <a:solidFill>
-                  <a:srgbClr val="808080"/>
-                </a:solidFill>
-                <a:effectLst/>
-                <a:latin typeface="Courier New" panose="02070309020205020404" pitchFamily="49" charset="0"/>
-                <a:cs typeface="Courier New" panose="02070309020205020404" pitchFamily="49" charset="0"/>
-              </a:rPr>
-            </a:br>
-            <a:r>
-              <a:rPr kumimoji="0" lang="en-US" altLang="en-US" sz="1800" b="0" i="1" u="none" strike="noStrike" cap="none" normalizeH="0" baseline="0" dirty="0">
-                <a:ln>
-                  <a:noFill/>
-                </a:ln>
-                <a:solidFill>
-                  <a:srgbClr val="808080"/>
-                </a:solidFill>
-                <a:effectLst/>
-                <a:latin typeface="Courier New" panose="02070309020205020404" pitchFamily="49" charset="0"/>
-                <a:cs typeface="Courier New" panose="02070309020205020404" pitchFamily="49" charset="0"/>
-              </a:rPr>
-              <a:t>    N=3200  seconds=0.754</a:t>
-            </a:r>
-            <a:br>
-              <a:rPr kumimoji="0" lang="en-US" altLang="en-US" sz="1800" b="0" i="1" u="none" strike="noStrike" cap="none" normalizeH="0" baseline="0" dirty="0">
-                <a:ln>
-                  <a:noFill/>
-                </a:ln>
-                <a:solidFill>
-                  <a:srgbClr val="808080"/>
-                </a:solidFill>
-                <a:effectLst/>
-                <a:latin typeface="Courier New" panose="02070309020205020404" pitchFamily="49" charset="0"/>
-                <a:cs typeface="Courier New" panose="02070309020205020404" pitchFamily="49" charset="0"/>
-              </a:rPr>
-            </a:br>
-            <a:r>
-              <a:rPr kumimoji="0" lang="en-US" altLang="en-US" sz="1800" b="0" i="1" u="none" strike="noStrike" cap="none" normalizeH="0" baseline="0" dirty="0">
-                <a:ln>
-                  <a:noFill/>
-                </a:ln>
-                <a:solidFill>
-                  <a:srgbClr val="808080"/>
-                </a:solidFill>
-                <a:effectLst/>
-                <a:latin typeface="Courier New" panose="02070309020205020404" pitchFamily="49" charset="0"/>
-                <a:cs typeface="Courier New" panose="02070309020205020404" pitchFamily="49" charset="0"/>
-              </a:rPr>
-              <a:t>    N=6400  seconds=2.829</a:t>
-            </a:r>
-            <a:br>
-              <a:rPr kumimoji="0" lang="en-US" altLang="en-US" sz="1800" b="0" i="1" u="none" strike="noStrike" cap="none" normalizeH="0" baseline="0" dirty="0">
-                <a:ln>
-                  <a:noFill/>
-                </a:ln>
-                <a:solidFill>
-                  <a:srgbClr val="808080"/>
-                </a:solidFill>
-                <a:effectLst/>
-                <a:latin typeface="Courier New" panose="02070309020205020404" pitchFamily="49" charset="0"/>
-                <a:cs typeface="Courier New" panose="02070309020205020404" pitchFamily="49" charset="0"/>
-              </a:rPr>
-            </a:br>
-            <a:r>
-              <a:rPr kumimoji="0" lang="en-US" altLang="en-US" sz="1800" b="0" i="1" u="none" strike="noStrike" cap="none" normalizeH="0" baseline="0" dirty="0">
-                <a:ln>
-                  <a:noFill/>
-                </a:ln>
-                <a:solidFill>
-                  <a:srgbClr val="808080"/>
-                </a:solidFill>
-                <a:effectLst/>
-                <a:latin typeface="Courier New" panose="02070309020205020404" pitchFamily="49" charset="0"/>
-                <a:cs typeface="Courier New" panose="02070309020205020404" pitchFamily="49" charset="0"/>
-              </a:rPr>
-              <a:t>    N=12800 seconds=11.48</a:t>
-            </a:r>
-            <a:br>
-              <a:rPr kumimoji="0" lang="en-US" altLang="en-US" sz="1800" b="0" i="1" u="none" strike="noStrike" cap="none" normalizeH="0" baseline="0" dirty="0">
-                <a:ln>
-                  <a:noFill/>
-                </a:ln>
-                <a:solidFill>
-                  <a:srgbClr val="808080"/>
-                </a:solidFill>
-                <a:effectLst/>
-                <a:latin typeface="Courier New" panose="02070309020205020404" pitchFamily="49" charset="0"/>
-                <a:cs typeface="Courier New" panose="02070309020205020404" pitchFamily="49" charset="0"/>
-              </a:rPr>
-            </a:br>
-            <a:r>
-              <a:rPr kumimoji="0" lang="en-US" altLang="en-US" sz="1800" b="0" i="1" u="none" strike="noStrike" cap="none" normalizeH="0" baseline="0" dirty="0">
-                <a:ln>
-                  <a:noFill/>
-                </a:ln>
-                <a:solidFill>
-                  <a:srgbClr val="808080"/>
-                </a:solidFill>
-                <a:effectLst/>
-                <a:latin typeface="Courier New" panose="02070309020205020404" pitchFamily="49" charset="0"/>
-                <a:cs typeface="Courier New" panose="02070309020205020404" pitchFamily="49" charset="0"/>
-              </a:rPr>
-              <a:t> */</a:t>
-            </a:r>
-            <a:endParaRPr kumimoji="0" lang="en-US" altLang="en-US" sz="1800" b="0" i="0" u="none" strike="noStrike" cap="none" normalizeH="0" baseline="0" dirty="0">
-              <a:ln>
-                <a:noFill/>
-              </a:ln>
-              <a:solidFill>
-                <a:schemeClr val="tx1"/>
-              </a:solidFill>
-              <a:effectLst/>
-              <a:latin typeface="Arial" panose="020B0604020202020204" pitchFamily="34" charset="0"/>
-            </a:endParaRPr>
-          </a:p>
-        </p:txBody>
-      </p:sp>
-    </p:spTree>
-    <p:extLst>
-      <p:ext uri="{BB962C8B-B14F-4D97-AF65-F5344CB8AC3E}">
-        <p14:creationId xmlns:p14="http://schemas.microsoft.com/office/powerpoint/2010/main" val="1405945670"/>
-      </p:ext>
-    </p:extLst>
-  </p:cSld>
-  <p:clrMapOvr>
-    <a:masterClrMapping/>
-  </p:clrMapOvr>
-  <p:transition spd="med"/>
-</p:sld>
-</file>
-
-<file path=ppt/slides/slide50.xml><?xml version="1.0" encoding="utf-8"?>
+<file path=ppt/slides/slide51.xml><?xml version="1.0" encoding="utf-8"?>
 <p:sld xmlns:a="http://schemas.openxmlformats.org/drawingml/2006/main" xmlns:r="http://schemas.openxmlformats.org/officeDocument/2006/relationships" xmlns:p="http://schemas.openxmlformats.org/presentationml/2006/main">
   <p:cSld>
     <p:spTree>
@@ -26714,9 +26797,7 @@
           <p:cNvGraphicFramePr>
             <a:graphicFrameLocks noGrp="1"/>
           </p:cNvGraphicFramePr>
-          <p:nvPr>
-            <p:extLst/>
-          </p:nvPr>
+          <p:nvPr/>
         </p:nvGraphicFramePr>
         <p:xfrm>
           <a:off x="479821" y="2003722"/>
@@ -26899,9 +26980,7 @@
           <p:cNvGraphicFramePr>
             <a:graphicFrameLocks noGrp="1"/>
           </p:cNvGraphicFramePr>
-          <p:nvPr>
-            <p:extLst/>
-          </p:nvPr>
+          <p:nvPr/>
         </p:nvGraphicFramePr>
         <p:xfrm>
           <a:off x="479821" y="2811683"/>
@@ -27084,9 +27163,7 @@
           <p:cNvGraphicFramePr>
             <a:graphicFrameLocks noGrp="1"/>
           </p:cNvGraphicFramePr>
-          <p:nvPr>
-            <p:extLst/>
-          </p:nvPr>
+          <p:nvPr/>
         </p:nvGraphicFramePr>
         <p:xfrm>
           <a:off x="479821" y="3614564"/>
@@ -27269,9 +27346,7 @@
           <p:cNvGraphicFramePr>
             <a:graphicFrameLocks noGrp="1"/>
           </p:cNvGraphicFramePr>
-          <p:nvPr>
-            <p:extLst/>
-          </p:nvPr>
+          <p:nvPr/>
         </p:nvGraphicFramePr>
         <p:xfrm>
           <a:off x="479821" y="4422525"/>
@@ -27459,9 +27534,7 @@
           <p:cNvGraphicFramePr>
             <a:graphicFrameLocks noGrp="1"/>
           </p:cNvGraphicFramePr>
-          <p:nvPr>
-            <p:extLst/>
-          </p:nvPr>
+          <p:nvPr/>
         </p:nvGraphicFramePr>
         <p:xfrm>
           <a:off x="479821" y="5230486"/>
@@ -27649,9 +27722,7 @@
           <p:cNvGraphicFramePr>
             <a:graphicFrameLocks noGrp="1"/>
           </p:cNvGraphicFramePr>
-          <p:nvPr>
-            <p:extLst/>
-          </p:nvPr>
+          <p:nvPr/>
         </p:nvGraphicFramePr>
         <p:xfrm>
           <a:off x="479821" y="6038447"/>
@@ -27839,9 +27910,7 @@
           <p:cNvGraphicFramePr>
             <a:graphicFrameLocks noGrp="1"/>
           </p:cNvGraphicFramePr>
-          <p:nvPr>
-            <p:extLst/>
-          </p:nvPr>
+          <p:nvPr/>
         </p:nvGraphicFramePr>
         <p:xfrm>
           <a:off x="479821" y="6852017"/>
@@ -28029,9 +28098,7 @@
           <p:cNvGraphicFramePr>
             <a:graphicFrameLocks noGrp="1"/>
           </p:cNvGraphicFramePr>
-          <p:nvPr>
-            <p:extLst/>
-          </p:nvPr>
+          <p:nvPr/>
         </p:nvGraphicFramePr>
         <p:xfrm>
           <a:off x="479821" y="7665587"/>
@@ -29125,7 +29192,7 @@
 </p:sld>
 </file>
 
-<file path=ppt/slides/slide51.xml><?xml version="1.0" encoding="utf-8"?>
+<file path=ppt/slides/slide52.xml><?xml version="1.0" encoding="utf-8"?>
 <p:sld xmlns:a="http://schemas.openxmlformats.org/drawingml/2006/main" xmlns:r="http://schemas.openxmlformats.org/officeDocument/2006/relationships" xmlns:p="http://schemas.openxmlformats.org/presentationml/2006/main">
   <p:cSld>
     <p:spTree>
@@ -29278,11 +29345,7 @@
                 <a:pPr lvl="1"/>
                 <a:r>
                   <a:rPr lang="en-US" dirty="0"/>
-                  <a:t>that is why we talk about BEST and WORST cases </a:t>
-                </a:r>
-                <a:r>
-                  <a:rPr lang="en-US"/>
-                  <a:t>in relation to </a:t>
+                  <a:t>that is why we talk about BEST and WORST cases in relation to </a:t>
                 </a:r>
                 <a:r>
                   <a:rPr lang="en-US" b="1" dirty="0"/>
@@ -29350,7 +29413,7 @@
 </p:sld>
 </file>
 
-<file path=ppt/slides/slide52.xml><?xml version="1.0" encoding="utf-8"?>
+<file path=ppt/slides/slide53.xml><?xml version="1.0" encoding="utf-8"?>
 <p:sld xmlns:a="http://schemas.openxmlformats.org/drawingml/2006/main" xmlns:r="http://schemas.openxmlformats.org/officeDocument/2006/relationships" xmlns:p="http://schemas.openxmlformats.org/presentationml/2006/main">
   <p:cSld>
     <p:spTree>

</xml_diff>